<commit_message>
Nouvelle version de la présentation.
</commit_message>
<xml_diff>
--- a/AAP/docs/Presentation.pptx
+++ b/AAP/docs/Presentation.pptx
@@ -1,11 +1,21 @@
 
 <file path=ppt/presentation.xml><?xml version="1.0" encoding="utf-8"?>
-<p:presentation xmlns:a="http://schemas.openxmlformats.org/drawingml/2006/main" xmlns:r="http://schemas.openxmlformats.org/officeDocument/2006/relationships" xmlns:p="http://schemas.openxmlformats.org/presentationml/2006/main" saveSubsetFonts="1">
+<p:presentation xmlns:a="http://schemas.openxmlformats.org/drawingml/2006/main" xmlns:r="http://schemas.openxmlformats.org/officeDocument/2006/relationships" xmlns:p="http://schemas.openxmlformats.org/presentationml/2006/main" showSpecialPlsOnTitleSld="0" saveSubsetFonts="1">
   <p:sldMasterIdLst>
     <p:sldMasterId id="2147483648" r:id="rId1"/>
   </p:sldMasterIdLst>
+  <p:notesMasterIdLst>
+    <p:notesMasterId r:id="rId10"/>
+  </p:notesMasterIdLst>
   <p:sldIdLst>
     <p:sldId id="256" r:id="rId2"/>
+    <p:sldId id="257" r:id="rId3"/>
+    <p:sldId id="258" r:id="rId4"/>
+    <p:sldId id="260" r:id="rId5"/>
+    <p:sldId id="261" r:id="rId6"/>
+    <p:sldId id="262" r:id="rId7"/>
+    <p:sldId id="263" r:id="rId8"/>
+    <p:sldId id="259" r:id="rId9"/>
   </p:sldIdLst>
   <p:sldSz cx="9144000" cy="6858000" type="screen4x3"/>
   <p:notesSz cx="6858000" cy="9144000"/>
@@ -107,9 +117,14 @@
 </p:presentation>
 </file>
 
-<file path=ppt/slideLayouts/slideLayout1.xml><?xml version="1.0" encoding="utf-8"?>
-<p:sldLayout xmlns:a="http://schemas.openxmlformats.org/drawingml/2006/main" xmlns:r="http://schemas.openxmlformats.org/officeDocument/2006/relationships" xmlns:p="http://schemas.openxmlformats.org/presentationml/2006/main" type="title" preserve="1">
-  <p:cSld name="Diapositive de titre">
+<file path=ppt/notesMasters/notesMaster1.xml><?xml version="1.0" encoding="utf-8"?>
+<p:notesMaster xmlns:a="http://schemas.openxmlformats.org/drawingml/2006/main" xmlns:r="http://schemas.openxmlformats.org/officeDocument/2006/relationships" xmlns:p="http://schemas.openxmlformats.org/presentationml/2006/main">
+  <p:cSld>
+    <p:bg>
+      <p:bgRef idx="1001">
+        <a:schemeClr val="bg1"/>
+      </p:bgRef>
+    </p:bg>
     <p:spTree>
       <p:nvGrpSpPr>
         <p:cNvPr id="1" name=""/>
@@ -126,6 +141,362 @@
       </p:grpSpPr>
       <p:sp>
         <p:nvSpPr>
+          <p:cNvPr id="2" name="Espace réservé de l'en-tête 1"/>
+          <p:cNvSpPr>
+            <a:spLocks noGrp="1"/>
+          </p:cNvSpPr>
+          <p:nvPr>
+            <p:ph type="hdr" sz="quarter"/>
+          </p:nvPr>
+        </p:nvSpPr>
+        <p:spPr>
+          <a:xfrm>
+            <a:off x="0" y="0"/>
+            <a:ext cx="2971800" cy="457200"/>
+          </a:xfrm>
+          <a:prstGeom prst="rect">
+            <a:avLst/>
+          </a:prstGeom>
+        </p:spPr>
+        <p:txBody>
+          <a:bodyPr vert="horz" lIns="91440" tIns="45720" rIns="91440" bIns="45720" rtlCol="0"/>
+          <a:lstStyle>
+            <a:lvl1pPr algn="l">
+              <a:defRPr sz="1200"/>
+            </a:lvl1pPr>
+          </a:lstStyle>
+          <a:p>
+            <a:endParaRPr lang="fr-FR"/>
+          </a:p>
+        </p:txBody>
+      </p:sp>
+      <p:sp>
+        <p:nvSpPr>
+          <p:cNvPr id="3" name="Espace réservé de la date 2"/>
+          <p:cNvSpPr>
+            <a:spLocks noGrp="1"/>
+          </p:cNvSpPr>
+          <p:nvPr>
+            <p:ph type="dt" idx="1"/>
+          </p:nvPr>
+        </p:nvSpPr>
+        <p:spPr>
+          <a:xfrm>
+            <a:off x="3884613" y="0"/>
+            <a:ext cx="2971800" cy="457200"/>
+          </a:xfrm>
+          <a:prstGeom prst="rect">
+            <a:avLst/>
+          </a:prstGeom>
+        </p:spPr>
+        <p:txBody>
+          <a:bodyPr vert="horz" lIns="91440" tIns="45720" rIns="91440" bIns="45720" rtlCol="0"/>
+          <a:lstStyle>
+            <a:lvl1pPr algn="r">
+              <a:defRPr sz="1200"/>
+            </a:lvl1pPr>
+          </a:lstStyle>
+          <a:p>
+            <a:fld id="{9F7A5740-AB0E-48E6-BCE9-09FA638B6FD3}" type="datetimeFigureOut">
+              <a:rPr lang="fr-FR" smtClean="0"/>
+              <a:t>31/05/2011</a:t>
+            </a:fld>
+            <a:endParaRPr lang="fr-FR"/>
+          </a:p>
+        </p:txBody>
+      </p:sp>
+      <p:sp>
+        <p:nvSpPr>
+          <p:cNvPr id="4" name="Espace réservé de l'image des diapositives 3"/>
+          <p:cNvSpPr>
+            <a:spLocks noGrp="1" noRot="1" noChangeAspect="1"/>
+          </p:cNvSpPr>
+          <p:nvPr>
+            <p:ph type="sldImg" idx="2"/>
+          </p:nvPr>
+        </p:nvSpPr>
+        <p:spPr>
+          <a:xfrm>
+            <a:off x="1143000" y="685800"/>
+            <a:ext cx="4572000" cy="3429000"/>
+          </a:xfrm>
+          <a:prstGeom prst="rect">
+            <a:avLst/>
+          </a:prstGeom>
+          <a:noFill/>
+          <a:ln w="12700">
+            <a:solidFill>
+              <a:prstClr val="black"/>
+            </a:solidFill>
+          </a:ln>
+        </p:spPr>
+        <p:txBody>
+          <a:bodyPr vert="horz" lIns="91440" tIns="45720" rIns="91440" bIns="45720" rtlCol="0" anchor="ctr"/>
+          <a:lstStyle/>
+          <a:p>
+            <a:endParaRPr lang="fr-FR"/>
+          </a:p>
+        </p:txBody>
+      </p:sp>
+      <p:sp>
+        <p:nvSpPr>
+          <p:cNvPr id="5" name="Espace réservé des commentaires 4"/>
+          <p:cNvSpPr>
+            <a:spLocks noGrp="1"/>
+          </p:cNvSpPr>
+          <p:nvPr>
+            <p:ph type="body" sz="quarter" idx="3"/>
+          </p:nvPr>
+        </p:nvSpPr>
+        <p:spPr>
+          <a:xfrm>
+            <a:off x="685800" y="4343400"/>
+            <a:ext cx="5486400" cy="4114800"/>
+          </a:xfrm>
+          <a:prstGeom prst="rect">
+            <a:avLst/>
+          </a:prstGeom>
+        </p:spPr>
+        <p:txBody>
+          <a:bodyPr vert="horz" lIns="91440" tIns="45720" rIns="91440" bIns="45720" rtlCol="0">
+            <a:normAutofit/>
+          </a:bodyPr>
+          <a:lstStyle/>
+          <a:p>
+            <a:pPr lvl="0"/>
+            <a:r>
+              <a:rPr lang="fr-FR" smtClean="0"/>
+              <a:t>Cliquez pour modifier les styles du texte du masque</a:t>
+            </a:r>
+          </a:p>
+          <a:p>
+            <a:pPr lvl="1"/>
+            <a:r>
+              <a:rPr lang="fr-FR" smtClean="0"/>
+              <a:t>Deuxième niveau</a:t>
+            </a:r>
+          </a:p>
+          <a:p>
+            <a:pPr lvl="2"/>
+            <a:r>
+              <a:rPr lang="fr-FR" smtClean="0"/>
+              <a:t>Troisième niveau</a:t>
+            </a:r>
+          </a:p>
+          <a:p>
+            <a:pPr lvl="3"/>
+            <a:r>
+              <a:rPr lang="fr-FR" smtClean="0"/>
+              <a:t>Quatrième niveau</a:t>
+            </a:r>
+          </a:p>
+          <a:p>
+            <a:pPr lvl="4"/>
+            <a:r>
+              <a:rPr lang="fr-FR" smtClean="0"/>
+              <a:t>Cinquième niveau</a:t>
+            </a:r>
+            <a:endParaRPr lang="fr-FR"/>
+          </a:p>
+        </p:txBody>
+      </p:sp>
+      <p:sp>
+        <p:nvSpPr>
+          <p:cNvPr id="6" name="Espace réservé du pied de page 5"/>
+          <p:cNvSpPr>
+            <a:spLocks noGrp="1"/>
+          </p:cNvSpPr>
+          <p:nvPr>
+            <p:ph type="ftr" sz="quarter" idx="4"/>
+          </p:nvPr>
+        </p:nvSpPr>
+        <p:spPr>
+          <a:xfrm>
+            <a:off x="0" y="8685213"/>
+            <a:ext cx="2971800" cy="457200"/>
+          </a:xfrm>
+          <a:prstGeom prst="rect">
+            <a:avLst/>
+          </a:prstGeom>
+        </p:spPr>
+        <p:txBody>
+          <a:bodyPr vert="horz" lIns="91440" tIns="45720" rIns="91440" bIns="45720" rtlCol="0" anchor="b"/>
+          <a:lstStyle>
+            <a:lvl1pPr algn="l">
+              <a:defRPr sz="1200"/>
+            </a:lvl1pPr>
+          </a:lstStyle>
+          <a:p>
+            <a:endParaRPr lang="fr-FR"/>
+          </a:p>
+        </p:txBody>
+      </p:sp>
+      <p:sp>
+        <p:nvSpPr>
+          <p:cNvPr id="7" name="Espace réservé du numéro de diapositive 6"/>
+          <p:cNvSpPr>
+            <a:spLocks noGrp="1"/>
+          </p:cNvSpPr>
+          <p:nvPr>
+            <p:ph type="sldNum" sz="quarter" idx="5"/>
+          </p:nvPr>
+        </p:nvSpPr>
+        <p:spPr>
+          <a:xfrm>
+            <a:off x="3884613" y="8685213"/>
+            <a:ext cx="2971800" cy="457200"/>
+          </a:xfrm>
+          <a:prstGeom prst="rect">
+            <a:avLst/>
+          </a:prstGeom>
+        </p:spPr>
+        <p:txBody>
+          <a:bodyPr vert="horz" lIns="91440" tIns="45720" rIns="91440" bIns="45720" rtlCol="0" anchor="b"/>
+          <a:lstStyle>
+            <a:lvl1pPr algn="r">
+              <a:defRPr sz="1200"/>
+            </a:lvl1pPr>
+          </a:lstStyle>
+          <a:p>
+            <a:fld id="{B533835C-9221-4AF6-8BB4-343DB2540EFC}" type="slidenum">
+              <a:rPr lang="fr-FR" smtClean="0"/>
+              <a:t>‹N°›</a:t>
+            </a:fld>
+            <a:endParaRPr lang="fr-FR"/>
+          </a:p>
+        </p:txBody>
+      </p:sp>
+    </p:spTree>
+  </p:cSld>
+  <p:clrMap bg1="lt1" tx1="dk1" bg2="lt2" tx2="dk2" accent1="accent1" accent2="accent2" accent3="accent3" accent4="accent4" accent5="accent5" accent6="accent6" hlink="hlink" folHlink="folHlink"/>
+  <p:notesStyle>
+    <a:lvl1pPr marL="0" algn="l" defTabSz="914400" rtl="0" eaLnBrk="1" latinLnBrk="0" hangingPunct="1">
+      <a:defRPr sz="1200" kern="1200">
+        <a:solidFill>
+          <a:schemeClr val="tx1"/>
+        </a:solidFill>
+        <a:latin typeface="+mn-lt"/>
+        <a:ea typeface="+mn-ea"/>
+        <a:cs typeface="+mn-cs"/>
+      </a:defRPr>
+    </a:lvl1pPr>
+    <a:lvl2pPr marL="457200" algn="l" defTabSz="914400" rtl="0" eaLnBrk="1" latinLnBrk="0" hangingPunct="1">
+      <a:defRPr sz="1200" kern="1200">
+        <a:solidFill>
+          <a:schemeClr val="tx1"/>
+        </a:solidFill>
+        <a:latin typeface="+mn-lt"/>
+        <a:ea typeface="+mn-ea"/>
+        <a:cs typeface="+mn-cs"/>
+      </a:defRPr>
+    </a:lvl2pPr>
+    <a:lvl3pPr marL="914400" algn="l" defTabSz="914400" rtl="0" eaLnBrk="1" latinLnBrk="0" hangingPunct="1">
+      <a:defRPr sz="1200" kern="1200">
+        <a:solidFill>
+          <a:schemeClr val="tx1"/>
+        </a:solidFill>
+        <a:latin typeface="+mn-lt"/>
+        <a:ea typeface="+mn-ea"/>
+        <a:cs typeface="+mn-cs"/>
+      </a:defRPr>
+    </a:lvl3pPr>
+    <a:lvl4pPr marL="1371600" algn="l" defTabSz="914400" rtl="0" eaLnBrk="1" latinLnBrk="0" hangingPunct="1">
+      <a:defRPr sz="1200" kern="1200">
+        <a:solidFill>
+          <a:schemeClr val="tx1"/>
+        </a:solidFill>
+        <a:latin typeface="+mn-lt"/>
+        <a:ea typeface="+mn-ea"/>
+        <a:cs typeface="+mn-cs"/>
+      </a:defRPr>
+    </a:lvl4pPr>
+    <a:lvl5pPr marL="1828800" algn="l" defTabSz="914400" rtl="0" eaLnBrk="1" latinLnBrk="0" hangingPunct="1">
+      <a:defRPr sz="1200" kern="1200">
+        <a:solidFill>
+          <a:schemeClr val="tx1"/>
+        </a:solidFill>
+        <a:latin typeface="+mn-lt"/>
+        <a:ea typeface="+mn-ea"/>
+        <a:cs typeface="+mn-cs"/>
+      </a:defRPr>
+    </a:lvl5pPr>
+    <a:lvl6pPr marL="2286000" algn="l" defTabSz="914400" rtl="0" eaLnBrk="1" latinLnBrk="0" hangingPunct="1">
+      <a:defRPr sz="1200" kern="1200">
+        <a:solidFill>
+          <a:schemeClr val="tx1"/>
+        </a:solidFill>
+        <a:latin typeface="+mn-lt"/>
+        <a:ea typeface="+mn-ea"/>
+        <a:cs typeface="+mn-cs"/>
+      </a:defRPr>
+    </a:lvl6pPr>
+    <a:lvl7pPr marL="2743200" algn="l" defTabSz="914400" rtl="0" eaLnBrk="1" latinLnBrk="0" hangingPunct="1">
+      <a:defRPr sz="1200" kern="1200">
+        <a:solidFill>
+          <a:schemeClr val="tx1"/>
+        </a:solidFill>
+        <a:latin typeface="+mn-lt"/>
+        <a:ea typeface="+mn-ea"/>
+        <a:cs typeface="+mn-cs"/>
+      </a:defRPr>
+    </a:lvl7pPr>
+    <a:lvl8pPr marL="3200400" algn="l" defTabSz="914400" rtl="0" eaLnBrk="1" latinLnBrk="0" hangingPunct="1">
+      <a:defRPr sz="1200" kern="1200">
+        <a:solidFill>
+          <a:schemeClr val="tx1"/>
+        </a:solidFill>
+        <a:latin typeface="+mn-lt"/>
+        <a:ea typeface="+mn-ea"/>
+        <a:cs typeface="+mn-cs"/>
+      </a:defRPr>
+    </a:lvl8pPr>
+    <a:lvl9pPr marL="3657600" algn="l" defTabSz="914400" rtl="0" eaLnBrk="1" latinLnBrk="0" hangingPunct="1">
+      <a:defRPr sz="1200" kern="1200">
+        <a:solidFill>
+          <a:schemeClr val="tx1"/>
+        </a:solidFill>
+        <a:latin typeface="+mn-lt"/>
+        <a:ea typeface="+mn-ea"/>
+        <a:cs typeface="+mn-cs"/>
+      </a:defRPr>
+    </a:lvl9pPr>
+  </p:notesStyle>
+</p:notesMaster>
+</file>
+
+<file path=ppt/slideLayouts/slideLayout1.xml><?xml version="1.0" encoding="utf-8"?>
+<p:sldLayout xmlns:a="http://schemas.openxmlformats.org/drawingml/2006/main" xmlns:r="http://schemas.openxmlformats.org/officeDocument/2006/relationships" xmlns:p="http://schemas.openxmlformats.org/presentationml/2006/main" type="title" preserve="1">
+  <p:cSld name="Diapositive de titre">
+    <p:bg>
+      <p:bgPr>
+        <a:blipFill dpi="0" rotWithShape="1">
+          <a:blip r:embed="rId2" cstate="print">
+            <a:lum/>
+          </a:blip>
+          <a:srcRect/>
+          <a:stretch>
+            <a:fillRect l="-38000" r="-38000"/>
+          </a:stretch>
+        </a:blipFill>
+        <a:effectLst/>
+      </p:bgPr>
+    </p:bg>
+    <p:spTree>
+      <p:nvGrpSpPr>
+        <p:cNvPr id="1" name=""/>
+        <p:cNvGrpSpPr/>
+        <p:nvPr/>
+      </p:nvGrpSpPr>
+      <p:grpSpPr>
+        <a:xfrm>
+          <a:off x="0" y="0"/>
+          <a:ext cx="0" cy="0"/>
+          <a:chOff x="0" y="0"/>
+          <a:chExt cx="0" cy="0"/>
+        </a:xfrm>
+      </p:grpSpPr>
+      <p:sp>
+        <p:nvSpPr>
           <p:cNvPr id="2" name="Titre 1"/>
           <p:cNvSpPr>
             <a:spLocks noGrp="1"/>
@@ -142,13 +513,22 @@
         </p:spPr>
         <p:txBody>
           <a:bodyPr/>
-          <a:lstStyle/>
-          <a:p>
-            <a:r>
-              <a:rPr lang="fr-FR" smtClean="0"/>
+          <a:lstStyle>
+            <a:lvl1pPr>
+              <a:defRPr>
+                <a:solidFill>
+                  <a:srgbClr val="A4CA39"/>
+                </a:solidFill>
+                <a:latin typeface="Cambria" pitchFamily="18" charset="0"/>
+              </a:defRPr>
+            </a:lvl1pPr>
+          </a:lstStyle>
+          <a:p>
+            <a:r>
+              <a:rPr lang="fr-FR" dirty="0" smtClean="0"/>
               <a:t>Cliquez pour modifier le style du titre</a:t>
             </a:r>
-            <a:endParaRPr lang="fr-BE"/>
+            <a:endParaRPr lang="fr-BE" dirty="0"/>
           </a:p>
         </p:txBody>
       </p:sp>
@@ -175,13 +555,22 @@
               <a:buNone/>
               <a:defRPr>
                 <a:solidFill>
+                  <a:srgbClr val="A4CA39"/>
+                </a:solidFill>
+                <a:latin typeface="Cambria" pitchFamily="18" charset="0"/>
+              </a:defRPr>
+            </a:lvl1pPr>
+            <a:lvl2pPr marL="457200" indent="0" algn="ctr">
+              <a:buNone/>
+              <a:defRPr>
+                <a:solidFill>
                   <a:schemeClr val="tx1">
                     <a:tint val="75000"/>
                   </a:schemeClr>
                 </a:solidFill>
               </a:defRPr>
-            </a:lvl1pPr>
-            <a:lvl2pPr marL="457200" indent="0" algn="ctr">
+            </a:lvl2pPr>
+            <a:lvl3pPr marL="914400" indent="0" algn="ctr">
               <a:buNone/>
               <a:defRPr>
                 <a:solidFill>
@@ -190,8 +579,8 @@
                   </a:schemeClr>
                 </a:solidFill>
               </a:defRPr>
-            </a:lvl2pPr>
-            <a:lvl3pPr marL="914400" indent="0" algn="ctr">
+            </a:lvl3pPr>
+            <a:lvl4pPr marL="1371600" indent="0" algn="ctr">
               <a:buNone/>
               <a:defRPr>
                 <a:solidFill>
@@ -200,8 +589,8 @@
                   </a:schemeClr>
                 </a:solidFill>
               </a:defRPr>
-            </a:lvl3pPr>
-            <a:lvl4pPr marL="1371600" indent="0" algn="ctr">
+            </a:lvl4pPr>
+            <a:lvl5pPr marL="1828800" indent="0" algn="ctr">
               <a:buNone/>
               <a:defRPr>
                 <a:solidFill>
@@ -210,8 +599,8 @@
                   </a:schemeClr>
                 </a:solidFill>
               </a:defRPr>
-            </a:lvl4pPr>
-            <a:lvl5pPr marL="1828800" indent="0" algn="ctr">
+            </a:lvl5pPr>
+            <a:lvl6pPr marL="2286000" indent="0" algn="ctr">
               <a:buNone/>
               <a:defRPr>
                 <a:solidFill>
@@ -220,8 +609,8 @@
                   </a:schemeClr>
                 </a:solidFill>
               </a:defRPr>
-            </a:lvl5pPr>
-            <a:lvl6pPr marL="2286000" indent="0" algn="ctr">
+            </a:lvl6pPr>
+            <a:lvl7pPr marL="2743200" indent="0" algn="ctr">
               <a:buNone/>
               <a:defRPr>
                 <a:solidFill>
@@ -230,8 +619,8 @@
                   </a:schemeClr>
                 </a:solidFill>
               </a:defRPr>
-            </a:lvl6pPr>
-            <a:lvl7pPr marL="2743200" indent="0" algn="ctr">
+            </a:lvl7pPr>
+            <a:lvl8pPr marL="3200400" indent="0" algn="ctr">
               <a:buNone/>
               <a:defRPr>
                 <a:solidFill>
@@ -240,8 +629,8 @@
                   </a:schemeClr>
                 </a:solidFill>
               </a:defRPr>
-            </a:lvl7pPr>
-            <a:lvl8pPr marL="3200400" indent="0" algn="ctr">
+            </a:lvl8pPr>
+            <a:lvl9pPr marL="3657600" indent="0" algn="ctr">
               <a:buNone/>
               <a:defRPr>
                 <a:solidFill>
@@ -250,24 +639,14 @@
                   </a:schemeClr>
                 </a:solidFill>
               </a:defRPr>
-            </a:lvl8pPr>
-            <a:lvl9pPr marL="3657600" indent="0" algn="ctr">
-              <a:buNone/>
-              <a:defRPr>
-                <a:solidFill>
-                  <a:schemeClr val="tx1">
-                    <a:tint val="75000"/>
-                  </a:schemeClr>
-                </a:solidFill>
-              </a:defRPr>
             </a:lvl9pPr>
           </a:lstStyle>
           <a:p>
             <a:r>
-              <a:rPr lang="fr-FR" smtClean="0"/>
+              <a:rPr lang="fr-FR" dirty="0" smtClean="0"/>
               <a:t>Cliquez pour modifier le style des sous-titres du masque</a:t>
             </a:r>
-            <a:endParaRPr lang="fr-BE"/>
+            <a:endParaRPr lang="fr-BE" dirty="0"/>
           </a:p>
         </p:txBody>
       </p:sp>
@@ -286,9 +665,8 @@
           <a:bodyPr/>
           <a:lstStyle/>
           <a:p>
-            <a:fld id="{AA309A6D-C09C-4548-B29A-6CF363A7E532}" type="datetimeFigureOut">
-              <a:rPr lang="fr-FR" smtClean="0"/>
-              <a:pPr/>
+            <a:fld id="{DF9D4494-96E0-4406-9347-E80FE7704387}" type="datetime1">
+              <a:rPr lang="fr-FR" smtClean="0"/>
               <a:t>31/05/2011</a:t>
             </a:fld>
             <a:endParaRPr lang="fr-BE"/>
@@ -310,6 +688,10 @@
           <a:bodyPr/>
           <a:lstStyle/>
           <a:p>
+            <a:r>
+              <a:rPr lang="fr-FR" smtClean="0"/>
+              <a:t>M1 MIAGE - Université de Nice Sophia Antipolis</a:t>
+            </a:r>
             <a:endParaRPr lang="fr-BE"/>
           </a:p>
         </p:txBody>
@@ -317,6 +699,262 @@
       <p:sp>
         <p:nvSpPr>
           <p:cNvPr id="6" name="Espace réservé du numéro de diapositive 5"/>
+          <p:cNvSpPr>
+            <a:spLocks noGrp="1"/>
+          </p:cNvSpPr>
+          <p:nvPr>
+            <p:ph type="sldNum" sz="quarter" idx="12"/>
+          </p:nvPr>
+        </p:nvSpPr>
+        <p:spPr/>
+        <p:txBody>
+          <a:bodyPr/>
+          <a:lstStyle/>
+          <a:p>
+            <a:fld id="{CF4668DC-857F-487D-BFFA-8C0CA5037977}" type="slidenum">
+              <a:rPr lang="fr-BE" smtClean="0"/>
+              <a:pPr/>
+              <a:t>‹N°›</a:t>
+            </a:fld>
+            <a:endParaRPr lang="fr-BE"/>
+          </a:p>
+        </p:txBody>
+      </p:sp>
+    </p:spTree>
+  </p:cSld>
+  <p:clrMapOvr>
+    <a:masterClrMapping/>
+  </p:clrMapOvr>
+  <p:transition>
+    <p:randomBar/>
+  </p:transition>
+</p:sldLayout>
+</file>
+
+<file path=ppt/slideLayouts/slideLayout10.xml><?xml version="1.0" encoding="utf-8"?>
+<p:sldLayout xmlns:a="http://schemas.openxmlformats.org/drawingml/2006/main" xmlns:r="http://schemas.openxmlformats.org/officeDocument/2006/relationships" xmlns:p="http://schemas.openxmlformats.org/presentationml/2006/main" type="picTx" preserve="1">
+  <p:cSld name="Image avec légende">
+    <p:spTree>
+      <p:nvGrpSpPr>
+        <p:cNvPr id="1" name=""/>
+        <p:cNvGrpSpPr/>
+        <p:nvPr/>
+      </p:nvGrpSpPr>
+      <p:grpSpPr>
+        <a:xfrm>
+          <a:off x="0" y="0"/>
+          <a:ext cx="0" cy="0"/>
+          <a:chOff x="0" y="0"/>
+          <a:chExt cx="0" cy="0"/>
+        </a:xfrm>
+      </p:grpSpPr>
+      <p:sp>
+        <p:nvSpPr>
+          <p:cNvPr id="2" name="Titre 1"/>
+          <p:cNvSpPr>
+            <a:spLocks noGrp="1"/>
+          </p:cNvSpPr>
+          <p:nvPr>
+            <p:ph type="title"/>
+          </p:nvPr>
+        </p:nvSpPr>
+        <p:spPr>
+          <a:xfrm>
+            <a:off x="1792288" y="4800600"/>
+            <a:ext cx="5486400" cy="566738"/>
+          </a:xfrm>
+        </p:spPr>
+        <p:txBody>
+          <a:bodyPr anchor="b"/>
+          <a:lstStyle>
+            <a:lvl1pPr algn="l">
+              <a:defRPr sz="2000" b="1"/>
+            </a:lvl1pPr>
+          </a:lstStyle>
+          <a:p>
+            <a:r>
+              <a:rPr lang="fr-FR" smtClean="0"/>
+              <a:t>Cliquez pour modifier le style du titre</a:t>
+            </a:r>
+            <a:endParaRPr lang="fr-BE"/>
+          </a:p>
+        </p:txBody>
+      </p:sp>
+      <p:sp>
+        <p:nvSpPr>
+          <p:cNvPr id="3" name="Espace réservé pour une image  2"/>
+          <p:cNvSpPr>
+            <a:spLocks noGrp="1"/>
+          </p:cNvSpPr>
+          <p:nvPr>
+            <p:ph type="pic" idx="1"/>
+          </p:nvPr>
+        </p:nvSpPr>
+        <p:spPr>
+          <a:xfrm>
+            <a:off x="1792288" y="612775"/>
+            <a:ext cx="5486400" cy="4114800"/>
+          </a:xfrm>
+        </p:spPr>
+        <p:txBody>
+          <a:bodyPr/>
+          <a:lstStyle>
+            <a:lvl1pPr marL="0" indent="0">
+              <a:buNone/>
+              <a:defRPr sz="3200"/>
+            </a:lvl1pPr>
+            <a:lvl2pPr marL="457200" indent="0">
+              <a:buNone/>
+              <a:defRPr sz="2800"/>
+            </a:lvl2pPr>
+            <a:lvl3pPr marL="914400" indent="0">
+              <a:buNone/>
+              <a:defRPr sz="2400"/>
+            </a:lvl3pPr>
+            <a:lvl4pPr marL="1371600" indent="0">
+              <a:buNone/>
+              <a:defRPr sz="2000"/>
+            </a:lvl4pPr>
+            <a:lvl5pPr marL="1828800" indent="0">
+              <a:buNone/>
+              <a:defRPr sz="2000"/>
+            </a:lvl5pPr>
+            <a:lvl6pPr marL="2286000" indent="0">
+              <a:buNone/>
+              <a:defRPr sz="2000"/>
+            </a:lvl6pPr>
+            <a:lvl7pPr marL="2743200" indent="0">
+              <a:buNone/>
+              <a:defRPr sz="2000"/>
+            </a:lvl7pPr>
+            <a:lvl8pPr marL="3200400" indent="0">
+              <a:buNone/>
+              <a:defRPr sz="2000"/>
+            </a:lvl8pPr>
+            <a:lvl9pPr marL="3657600" indent="0">
+              <a:buNone/>
+              <a:defRPr sz="2000"/>
+            </a:lvl9pPr>
+          </a:lstStyle>
+          <a:p>
+            <a:endParaRPr lang="fr-BE"/>
+          </a:p>
+        </p:txBody>
+      </p:sp>
+      <p:sp>
+        <p:nvSpPr>
+          <p:cNvPr id="4" name="Espace réservé du texte 3"/>
+          <p:cNvSpPr>
+            <a:spLocks noGrp="1"/>
+          </p:cNvSpPr>
+          <p:nvPr>
+            <p:ph type="body" sz="half" idx="2"/>
+          </p:nvPr>
+        </p:nvSpPr>
+        <p:spPr>
+          <a:xfrm>
+            <a:off x="1792288" y="5367338"/>
+            <a:ext cx="5486400" cy="804862"/>
+          </a:xfrm>
+        </p:spPr>
+        <p:txBody>
+          <a:bodyPr/>
+          <a:lstStyle>
+            <a:lvl1pPr marL="0" indent="0">
+              <a:buNone/>
+              <a:defRPr sz="1400"/>
+            </a:lvl1pPr>
+            <a:lvl2pPr marL="457200" indent="0">
+              <a:buNone/>
+              <a:defRPr sz="1200"/>
+            </a:lvl2pPr>
+            <a:lvl3pPr marL="914400" indent="0">
+              <a:buNone/>
+              <a:defRPr sz="1000"/>
+            </a:lvl3pPr>
+            <a:lvl4pPr marL="1371600" indent="0">
+              <a:buNone/>
+              <a:defRPr sz="900"/>
+            </a:lvl4pPr>
+            <a:lvl5pPr marL="1828800" indent="0">
+              <a:buNone/>
+              <a:defRPr sz="900"/>
+            </a:lvl5pPr>
+            <a:lvl6pPr marL="2286000" indent="0">
+              <a:buNone/>
+              <a:defRPr sz="900"/>
+            </a:lvl6pPr>
+            <a:lvl7pPr marL="2743200" indent="0">
+              <a:buNone/>
+              <a:defRPr sz="900"/>
+            </a:lvl7pPr>
+            <a:lvl8pPr marL="3200400" indent="0">
+              <a:buNone/>
+              <a:defRPr sz="900"/>
+            </a:lvl8pPr>
+            <a:lvl9pPr marL="3657600" indent="0">
+              <a:buNone/>
+              <a:defRPr sz="900"/>
+            </a:lvl9pPr>
+          </a:lstStyle>
+          <a:p>
+            <a:pPr lvl="0"/>
+            <a:r>
+              <a:rPr lang="fr-FR" smtClean="0"/>
+              <a:t>Cliquez pour modifier les styles du texte du masque</a:t>
+            </a:r>
+          </a:p>
+        </p:txBody>
+      </p:sp>
+      <p:sp>
+        <p:nvSpPr>
+          <p:cNvPr id="5" name="Espace réservé de la date 4"/>
+          <p:cNvSpPr>
+            <a:spLocks noGrp="1"/>
+          </p:cNvSpPr>
+          <p:nvPr>
+            <p:ph type="dt" sz="half" idx="10"/>
+          </p:nvPr>
+        </p:nvSpPr>
+        <p:spPr/>
+        <p:txBody>
+          <a:bodyPr/>
+          <a:lstStyle/>
+          <a:p>
+            <a:fld id="{A89CA437-F84A-4BDD-8C20-46077FA11AD7}" type="datetime1">
+              <a:rPr lang="fr-FR" smtClean="0"/>
+              <a:t>31/05/2011</a:t>
+            </a:fld>
+            <a:endParaRPr lang="fr-BE"/>
+          </a:p>
+        </p:txBody>
+      </p:sp>
+      <p:sp>
+        <p:nvSpPr>
+          <p:cNvPr id="6" name="Espace réservé du pied de page 5"/>
+          <p:cNvSpPr>
+            <a:spLocks noGrp="1"/>
+          </p:cNvSpPr>
+          <p:nvPr>
+            <p:ph type="ftr" sz="quarter" idx="11"/>
+          </p:nvPr>
+        </p:nvSpPr>
+        <p:spPr/>
+        <p:txBody>
+          <a:bodyPr/>
+          <a:lstStyle/>
+          <a:p>
+            <a:r>
+              <a:rPr lang="fr-FR" smtClean="0"/>
+              <a:t>M1 MIAGE - Université de Nice Sophia Antipolis</a:t>
+            </a:r>
+            <a:endParaRPr lang="fr-BE"/>
+          </a:p>
+        </p:txBody>
+      </p:sp>
+      <p:sp>
+        <p:nvSpPr>
+          <p:cNvPr id="7" name="Espace réservé du numéro de diapositive 6"/>
           <p:cNvSpPr>
             <a:spLocks noGrp="1"/>
           </p:cNvSpPr>
@@ -346,7 +984,7 @@
 </p:sldLayout>
 </file>
 
-<file path=ppt/slideLayouts/slideLayout10.xml><?xml version="1.0" encoding="utf-8"?>
+<file path=ppt/slideLayouts/slideLayout11.xml><?xml version="1.0" encoding="utf-8"?>
 <p:sldLayout xmlns:a="http://schemas.openxmlformats.org/drawingml/2006/main" xmlns:r="http://schemas.openxmlformats.org/officeDocument/2006/relationships" xmlns:p="http://schemas.openxmlformats.org/presentationml/2006/main" type="vertTx" preserve="1">
   <p:cSld name="Titre et texte vertical">
     <p:spTree>
@@ -453,9 +1091,8 @@
           <a:bodyPr/>
           <a:lstStyle/>
           <a:p>
-            <a:fld id="{AA309A6D-C09C-4548-B29A-6CF363A7E532}" type="datetimeFigureOut">
-              <a:rPr lang="fr-FR" smtClean="0"/>
-              <a:pPr/>
+            <a:fld id="{24135A20-DC24-4C20-9F62-FD3DD13F2969}" type="datetime1">
+              <a:rPr lang="fr-FR" smtClean="0"/>
               <a:t>31/05/2011</a:t>
             </a:fld>
             <a:endParaRPr lang="fr-BE"/>
@@ -477,6 +1114,10 @@
           <a:bodyPr/>
           <a:lstStyle/>
           <a:p>
+            <a:r>
+              <a:rPr lang="fr-FR" smtClean="0"/>
+              <a:t>M1 MIAGE - Université de Nice Sophia Antipolis</a:t>
+            </a:r>
             <a:endParaRPr lang="fr-BE"/>
           </a:p>
         </p:txBody>
@@ -513,7 +1154,7 @@
 </p:sldLayout>
 </file>
 
-<file path=ppt/slideLayouts/slideLayout11.xml><?xml version="1.0" encoding="utf-8"?>
+<file path=ppt/slideLayouts/slideLayout12.xml><?xml version="1.0" encoding="utf-8"?>
 <p:sldLayout xmlns:a="http://schemas.openxmlformats.org/drawingml/2006/main" xmlns:r="http://schemas.openxmlformats.org/officeDocument/2006/relationships" xmlns:p="http://schemas.openxmlformats.org/presentationml/2006/main" type="vertTitleAndTx" preserve="1">
   <p:cSld name="Titre vertical et texte">
     <p:spTree>
@@ -630,9 +1271,8 @@
           <a:bodyPr/>
           <a:lstStyle/>
           <a:p>
-            <a:fld id="{AA309A6D-C09C-4548-B29A-6CF363A7E532}" type="datetimeFigureOut">
-              <a:rPr lang="fr-FR" smtClean="0"/>
-              <a:pPr/>
+            <a:fld id="{C74C95C5-D393-4D2F-A12B-633BD3C7E534}" type="datetime1">
+              <a:rPr lang="fr-FR" smtClean="0"/>
               <a:t>31/05/2011</a:t>
             </a:fld>
             <a:endParaRPr lang="fr-BE"/>
@@ -654,6 +1294,10 @@
           <a:bodyPr/>
           <a:lstStyle/>
           <a:p>
+            <a:r>
+              <a:rPr lang="fr-FR" smtClean="0"/>
+              <a:t>M1 MIAGE - Université de Nice Sophia Antipolis</a:t>
+            </a:r>
             <a:endParaRPr lang="fr-BE"/>
           </a:p>
         </p:txBody>
@@ -691,8 +1335,22 @@
 </file>
 
 <file path=ppt/slideLayouts/slideLayout2.xml><?xml version="1.0" encoding="utf-8"?>
-<p:sldLayout xmlns:a="http://schemas.openxmlformats.org/drawingml/2006/main" xmlns:r="http://schemas.openxmlformats.org/officeDocument/2006/relationships" xmlns:p="http://schemas.openxmlformats.org/presentationml/2006/main" type="obj" preserve="1">
-  <p:cSld name="Titre et contenu">
+<p:sldLayout xmlns:a="http://schemas.openxmlformats.org/drawingml/2006/main" xmlns:r="http://schemas.openxmlformats.org/officeDocument/2006/relationships" xmlns:p="http://schemas.openxmlformats.org/presentationml/2006/main" type="title" preserve="1">
+  <p:cSld name="1_Diapositive de titre">
+    <p:bg>
+      <p:bgPr>
+        <a:blipFill dpi="0" rotWithShape="1">
+          <a:blip r:embed="rId2" cstate="print">
+            <a:lum/>
+          </a:blip>
+          <a:srcRect/>
+          <a:stretch>
+            <a:fillRect l="-38000" r="-38000"/>
+          </a:stretch>
+        </a:blipFill>
+        <a:effectLst/>
+      </p:bgPr>
+    </p:bg>
     <p:spTree>
       <p:nvGrpSpPr>
         <p:cNvPr id="1" name=""/>
@@ -714,101 +1372,160 @@
             <a:spLocks noGrp="1"/>
           </p:cNvSpPr>
           <p:nvPr>
-            <p:ph type="title"/>
-          </p:nvPr>
-        </p:nvSpPr>
-        <p:spPr/>
-        <p:txBody>
-          <a:bodyPr/>
-          <a:lstStyle/>
-          <a:p>
-            <a:r>
-              <a:rPr lang="fr-FR" smtClean="0"/>
-              <a:t>Cliquez pour modifier le style du titre</a:t>
-            </a:r>
-            <a:endParaRPr lang="fr-BE"/>
-          </a:p>
-        </p:txBody>
-      </p:sp>
-      <p:sp>
-        <p:nvSpPr>
-          <p:cNvPr id="3" name="Espace réservé du contenu 2"/>
-          <p:cNvSpPr>
-            <a:spLocks noGrp="1"/>
-          </p:cNvSpPr>
-          <p:nvPr>
-            <p:ph idx="1"/>
-          </p:nvPr>
-        </p:nvSpPr>
-        <p:spPr/>
-        <p:txBody>
-          <a:bodyPr/>
-          <a:lstStyle/>
-          <a:p>
-            <a:pPr lvl="0"/>
-            <a:r>
-              <a:rPr lang="fr-FR" smtClean="0"/>
-              <a:t>Cliquez pour modifier les styles du texte du masque</a:t>
-            </a:r>
-          </a:p>
-          <a:p>
-            <a:pPr lvl="1"/>
-            <a:r>
-              <a:rPr lang="fr-FR" smtClean="0"/>
-              <a:t>Deuxième niveau</a:t>
-            </a:r>
-          </a:p>
-          <a:p>
-            <a:pPr lvl="2"/>
-            <a:r>
-              <a:rPr lang="fr-FR" smtClean="0"/>
-              <a:t>Troisième niveau</a:t>
-            </a:r>
-          </a:p>
-          <a:p>
-            <a:pPr lvl="3"/>
-            <a:r>
-              <a:rPr lang="fr-FR" smtClean="0"/>
-              <a:t>Quatrième niveau</a:t>
-            </a:r>
-          </a:p>
-          <a:p>
-            <a:pPr lvl="4"/>
-            <a:r>
-              <a:rPr lang="fr-FR" smtClean="0"/>
-              <a:t>Cinquième niveau</a:t>
-            </a:r>
-            <a:endParaRPr lang="fr-BE"/>
-          </a:p>
-        </p:txBody>
-      </p:sp>
-      <p:sp>
-        <p:nvSpPr>
-          <p:cNvPr id="4" name="Espace réservé de la date 3"/>
-          <p:cNvSpPr>
-            <a:spLocks noGrp="1"/>
-          </p:cNvSpPr>
-          <p:nvPr>
-            <p:ph type="dt" sz="half" idx="10"/>
-          </p:nvPr>
-        </p:nvSpPr>
-        <p:spPr/>
-        <p:txBody>
-          <a:bodyPr/>
-          <a:lstStyle/>
-          <a:p>
-            <a:fld id="{AA309A6D-C09C-4548-B29A-6CF363A7E532}" type="datetimeFigureOut">
-              <a:rPr lang="fr-FR" smtClean="0"/>
-              <a:pPr/>
-              <a:t>31/05/2011</a:t>
-            </a:fld>
-            <a:endParaRPr lang="fr-BE"/>
-          </a:p>
-        </p:txBody>
-      </p:sp>
-      <p:sp>
-        <p:nvSpPr>
-          <p:cNvPr id="5" name="Espace réservé du pied de page 4"/>
+            <p:ph type="ctrTitle" hasCustomPrompt="1"/>
+          </p:nvPr>
+        </p:nvSpPr>
+        <p:spPr>
+          <a:xfrm>
+            <a:off x="685800" y="188641"/>
+            <a:ext cx="7772400" cy="1008112"/>
+          </a:xfrm>
+        </p:spPr>
+        <p:txBody>
+          <a:bodyPr/>
+          <a:lstStyle>
+            <a:lvl1pPr>
+              <a:defRPr>
+                <a:solidFill>
+                  <a:srgbClr val="A4CA39"/>
+                </a:solidFill>
+                <a:latin typeface="Cambria" pitchFamily="18" charset="0"/>
+              </a:defRPr>
+            </a:lvl1pPr>
+          </a:lstStyle>
+          <a:p>
+            <a:r>
+              <a:rPr lang="fr-FR" dirty="0" smtClean="0"/>
+              <a:t>Titre</a:t>
+            </a:r>
+            <a:endParaRPr lang="fr-BE" dirty="0"/>
+          </a:p>
+        </p:txBody>
+      </p:sp>
+      <p:sp>
+        <p:nvSpPr>
+          <p:cNvPr id="3" name="Sous-titre 2"/>
+          <p:cNvSpPr>
+            <a:spLocks noGrp="1"/>
+          </p:cNvSpPr>
+          <p:nvPr>
+            <p:ph type="subTitle" idx="1"/>
+          </p:nvPr>
+        </p:nvSpPr>
+        <p:spPr>
+          <a:xfrm>
+            <a:off x="683568" y="1340768"/>
+            <a:ext cx="7776864" cy="4298032"/>
+          </a:xfrm>
+        </p:spPr>
+        <p:txBody>
+          <a:bodyPr/>
+          <a:lstStyle>
+            <a:lvl1pPr marL="0" indent="0" algn="ctr">
+              <a:buNone/>
+              <a:defRPr>
+                <a:solidFill>
+                  <a:schemeClr val="accent3">
+                    <a:lumMod val="40000"/>
+                    <a:lumOff val="60000"/>
+                  </a:schemeClr>
+                </a:solidFill>
+                <a:latin typeface="Cambria" pitchFamily="18" charset="0"/>
+              </a:defRPr>
+            </a:lvl1pPr>
+            <a:lvl2pPr marL="457200" indent="0" algn="ctr">
+              <a:buNone/>
+              <a:defRPr>
+                <a:solidFill>
+                  <a:schemeClr val="tx1">
+                    <a:tint val="75000"/>
+                  </a:schemeClr>
+                </a:solidFill>
+              </a:defRPr>
+            </a:lvl2pPr>
+            <a:lvl3pPr marL="914400" indent="0" algn="ctr">
+              <a:buNone/>
+              <a:defRPr>
+                <a:solidFill>
+                  <a:schemeClr val="tx1">
+                    <a:tint val="75000"/>
+                  </a:schemeClr>
+                </a:solidFill>
+              </a:defRPr>
+            </a:lvl3pPr>
+            <a:lvl4pPr marL="1371600" indent="0" algn="ctr">
+              <a:buNone/>
+              <a:defRPr>
+                <a:solidFill>
+                  <a:schemeClr val="tx1">
+                    <a:tint val="75000"/>
+                  </a:schemeClr>
+                </a:solidFill>
+              </a:defRPr>
+            </a:lvl4pPr>
+            <a:lvl5pPr marL="1828800" indent="0" algn="ctr">
+              <a:buNone/>
+              <a:defRPr>
+                <a:solidFill>
+                  <a:schemeClr val="tx1">
+                    <a:tint val="75000"/>
+                  </a:schemeClr>
+                </a:solidFill>
+              </a:defRPr>
+            </a:lvl5pPr>
+            <a:lvl6pPr marL="2286000" indent="0" algn="ctr">
+              <a:buNone/>
+              <a:defRPr>
+                <a:solidFill>
+                  <a:schemeClr val="tx1">
+                    <a:tint val="75000"/>
+                  </a:schemeClr>
+                </a:solidFill>
+              </a:defRPr>
+            </a:lvl6pPr>
+            <a:lvl7pPr marL="2743200" indent="0" algn="ctr">
+              <a:buNone/>
+              <a:defRPr>
+                <a:solidFill>
+                  <a:schemeClr val="tx1">
+                    <a:tint val="75000"/>
+                  </a:schemeClr>
+                </a:solidFill>
+              </a:defRPr>
+            </a:lvl7pPr>
+            <a:lvl8pPr marL="3200400" indent="0" algn="ctr">
+              <a:buNone/>
+              <a:defRPr>
+                <a:solidFill>
+                  <a:schemeClr val="tx1">
+                    <a:tint val="75000"/>
+                  </a:schemeClr>
+                </a:solidFill>
+              </a:defRPr>
+            </a:lvl8pPr>
+            <a:lvl9pPr marL="3657600" indent="0" algn="ctr">
+              <a:buNone/>
+              <a:defRPr>
+                <a:solidFill>
+                  <a:schemeClr val="tx1">
+                    <a:tint val="75000"/>
+                  </a:schemeClr>
+                </a:solidFill>
+              </a:defRPr>
+            </a:lvl9pPr>
+          </a:lstStyle>
+          <a:p>
+            <a:r>
+              <a:rPr lang="fr-FR" dirty="0" smtClean="0"/>
+              <a:t>Cliquez pour modifier le style des sous-titres du masque</a:t>
+            </a:r>
+            <a:endParaRPr lang="fr-BE" dirty="0"/>
+          </a:p>
+        </p:txBody>
+      </p:sp>
+      <p:sp>
+        <p:nvSpPr>
+          <p:cNvPr id="10" name="Espace réservé du pied de page 4"/>
           <p:cNvSpPr>
             <a:spLocks noGrp="1"/>
           </p:cNvSpPr>
@@ -816,18 +1533,42 @@
             <p:ph type="ftr" sz="quarter" idx="11"/>
           </p:nvPr>
         </p:nvSpPr>
-        <p:spPr/>
-        <p:txBody>
-          <a:bodyPr/>
-          <a:lstStyle/>
-          <a:p>
-            <a:endParaRPr lang="fr-BE"/>
-          </a:p>
-        </p:txBody>
-      </p:sp>
-      <p:sp>
-        <p:nvSpPr>
-          <p:cNvPr id="6" name="Espace réservé du numéro de diapositive 5"/>
+        <p:spPr>
+          <a:xfrm>
+            <a:off x="92224" y="6376243"/>
+            <a:ext cx="2751584" cy="365125"/>
+          </a:xfrm>
+        </p:spPr>
+        <p:txBody>
+          <a:bodyPr/>
+          <a:lstStyle>
+            <a:lvl1pPr algn="l">
+              <a:defRPr>
+                <a:solidFill>
+                  <a:schemeClr val="bg1"/>
+                </a:solidFill>
+                <a:latin typeface="Cambria" pitchFamily="18" charset="0"/>
+              </a:defRPr>
+            </a:lvl1pPr>
+          </a:lstStyle>
+          <a:p>
+            <a:r>
+              <a:rPr lang="fr-FR" dirty="0" smtClean="0"/>
+              <a:t>M1 MIAGE  - 2010/2011</a:t>
+            </a:r>
+          </a:p>
+          <a:p>
+            <a:r>
+              <a:rPr lang="fr-FR" dirty="0" smtClean="0"/>
+              <a:t>Université de Nice Sophia Antipolis</a:t>
+            </a:r>
+            <a:endParaRPr lang="fr-BE" dirty="0"/>
+          </a:p>
+        </p:txBody>
+      </p:sp>
+      <p:sp>
+        <p:nvSpPr>
+          <p:cNvPr id="11" name="Espace réservé du numéro de diapositive 5"/>
           <p:cNvSpPr>
             <a:spLocks noGrp="1"/>
           </p:cNvSpPr>
@@ -835,17 +1576,35 @@
             <p:ph type="sldNum" sz="quarter" idx="12"/>
           </p:nvPr>
         </p:nvSpPr>
-        <p:spPr/>
-        <p:txBody>
-          <a:bodyPr/>
-          <a:lstStyle/>
+        <p:spPr>
+          <a:xfrm>
+            <a:off x="6974904" y="6376243"/>
+            <a:ext cx="2133600" cy="365125"/>
+          </a:xfrm>
+        </p:spPr>
+        <p:txBody>
+          <a:bodyPr/>
+          <a:lstStyle>
+            <a:lvl1pPr>
+              <a:defRPr>
+                <a:solidFill>
+                  <a:schemeClr val="bg1"/>
+                </a:solidFill>
+                <a:latin typeface="Cambria" pitchFamily="18" charset="0"/>
+              </a:defRPr>
+            </a:lvl1pPr>
+          </a:lstStyle>
           <a:p>
             <a:fld id="{CF4668DC-857F-487D-BFFA-8C0CA5037977}" type="slidenum">
               <a:rPr lang="fr-BE" smtClean="0"/>
               <a:pPr/>
               <a:t>‹N°›</a:t>
             </a:fld>
-            <a:endParaRPr lang="fr-BE"/>
+            <a:r>
+              <a:rPr lang="fr-BE" dirty="0" smtClean="0"/>
+              <a:t> sur ?</a:t>
+            </a:r>
+            <a:endParaRPr lang="fr-BE" dirty="0"/>
           </a:p>
         </p:txBody>
       </p:sp>
@@ -854,10 +1613,358 @@
   <p:clrMapOvr>
     <a:masterClrMapping/>
   </p:clrMapOvr>
+  <p:transition>
+    <p:randomBar/>
+  </p:transition>
 </p:sldLayout>
 </file>
 
 <file path=ppt/slideLayouts/slideLayout3.xml><?xml version="1.0" encoding="utf-8"?>
+<p:sldLayout xmlns:a="http://schemas.openxmlformats.org/drawingml/2006/main" xmlns:r="http://schemas.openxmlformats.org/officeDocument/2006/relationships" xmlns:p="http://schemas.openxmlformats.org/presentationml/2006/main" preserve="1" userDrawn="1">
+  <p:cSld name="Titre et contenu">
+    <p:bg>
+      <p:bgPr>
+        <a:blipFill dpi="0" rotWithShape="1">
+          <a:blip r:embed="rId2" cstate="print">
+            <a:lum/>
+          </a:blip>
+          <a:srcRect/>
+          <a:stretch>
+            <a:fillRect l="-38000" r="-38000"/>
+          </a:stretch>
+        </a:blipFill>
+        <a:effectLst/>
+      </p:bgPr>
+    </p:bg>
+    <p:spTree>
+      <p:nvGrpSpPr>
+        <p:cNvPr id="1" name=""/>
+        <p:cNvGrpSpPr/>
+        <p:nvPr/>
+      </p:nvGrpSpPr>
+      <p:grpSpPr>
+        <a:xfrm>
+          <a:off x="0" y="0"/>
+          <a:ext cx="0" cy="0"/>
+          <a:chOff x="0" y="0"/>
+          <a:chExt cx="0" cy="0"/>
+        </a:xfrm>
+      </p:grpSpPr>
+      <p:sp>
+        <p:nvSpPr>
+          <p:cNvPr id="2" name="Titre 1"/>
+          <p:cNvSpPr>
+            <a:spLocks noGrp="1"/>
+          </p:cNvSpPr>
+          <p:nvPr>
+            <p:ph type="title" hasCustomPrompt="1"/>
+          </p:nvPr>
+        </p:nvSpPr>
+        <p:spPr>
+          <a:xfrm>
+            <a:off x="457200" y="34464"/>
+            <a:ext cx="8229600" cy="812408"/>
+          </a:xfrm>
+        </p:spPr>
+        <p:txBody>
+          <a:bodyPr/>
+          <a:lstStyle>
+            <a:lvl1pPr>
+              <a:defRPr>
+                <a:solidFill>
+                  <a:srgbClr val="A4CA39"/>
+                </a:solidFill>
+              </a:defRPr>
+            </a:lvl1pPr>
+          </a:lstStyle>
+          <a:p>
+            <a:r>
+              <a:rPr lang="fr-FR" dirty="0" smtClean="0"/>
+              <a:t>Titre</a:t>
+            </a:r>
+            <a:endParaRPr lang="fr-BE" dirty="0"/>
+          </a:p>
+        </p:txBody>
+      </p:sp>
+      <p:sp>
+        <p:nvSpPr>
+          <p:cNvPr id="5" name="Espace réservé du pied de page 4"/>
+          <p:cNvSpPr>
+            <a:spLocks noGrp="1"/>
+          </p:cNvSpPr>
+          <p:nvPr>
+            <p:ph type="ftr" sz="quarter" idx="11"/>
+          </p:nvPr>
+        </p:nvSpPr>
+        <p:spPr>
+          <a:xfrm>
+            <a:off x="92224" y="6376243"/>
+            <a:ext cx="2751584" cy="365125"/>
+          </a:xfrm>
+        </p:spPr>
+        <p:txBody>
+          <a:bodyPr/>
+          <a:lstStyle>
+            <a:lvl1pPr algn="l">
+              <a:defRPr>
+                <a:solidFill>
+                  <a:schemeClr val="bg1"/>
+                </a:solidFill>
+                <a:latin typeface="Cambria" pitchFamily="18" charset="0"/>
+              </a:defRPr>
+            </a:lvl1pPr>
+          </a:lstStyle>
+          <a:p>
+            <a:r>
+              <a:rPr lang="fr-FR" dirty="0" smtClean="0"/>
+              <a:t>M1 MIAGE  - 2010/2011</a:t>
+            </a:r>
+          </a:p>
+          <a:p>
+            <a:r>
+              <a:rPr lang="fr-FR" dirty="0" smtClean="0"/>
+              <a:t>Université de Nice Sophia Antipolis</a:t>
+            </a:r>
+            <a:endParaRPr lang="fr-BE" dirty="0"/>
+          </a:p>
+        </p:txBody>
+      </p:sp>
+      <p:sp>
+        <p:nvSpPr>
+          <p:cNvPr id="6" name="Espace réservé du numéro de diapositive 5"/>
+          <p:cNvSpPr>
+            <a:spLocks noGrp="1"/>
+          </p:cNvSpPr>
+          <p:nvPr>
+            <p:ph type="sldNum" sz="quarter" idx="12"/>
+          </p:nvPr>
+        </p:nvSpPr>
+        <p:spPr>
+          <a:xfrm>
+            <a:off x="6974904" y="6376243"/>
+            <a:ext cx="2133600" cy="365125"/>
+          </a:xfrm>
+        </p:spPr>
+        <p:txBody>
+          <a:bodyPr/>
+          <a:lstStyle>
+            <a:lvl1pPr>
+              <a:defRPr>
+                <a:solidFill>
+                  <a:schemeClr val="bg1"/>
+                </a:solidFill>
+                <a:latin typeface="Cambria" pitchFamily="18" charset="0"/>
+              </a:defRPr>
+            </a:lvl1pPr>
+          </a:lstStyle>
+          <a:p>
+            <a:fld id="{CF4668DC-857F-487D-BFFA-8C0CA5037977}" type="slidenum">
+              <a:rPr lang="fr-BE" smtClean="0"/>
+              <a:pPr/>
+              <a:t>‹N°›</a:t>
+            </a:fld>
+            <a:r>
+              <a:rPr lang="fr-BE" dirty="0" smtClean="0"/>
+              <a:t> sur ?</a:t>
+            </a:r>
+            <a:endParaRPr lang="fr-BE" dirty="0"/>
+          </a:p>
+        </p:txBody>
+      </p:sp>
+      <p:sp>
+        <p:nvSpPr>
+          <p:cNvPr id="11" name="Espace réservé du contenu 10"/>
+          <p:cNvSpPr>
+            <a:spLocks noGrp="1"/>
+          </p:cNvSpPr>
+          <p:nvPr>
+            <p:ph sz="quarter" idx="13"/>
+          </p:nvPr>
+        </p:nvSpPr>
+        <p:spPr>
+          <a:xfrm>
+            <a:off x="0" y="908720"/>
+            <a:ext cx="1763688" cy="5040560"/>
+          </a:xfrm>
+          <a:noFill/>
+        </p:spPr>
+        <p:txBody>
+          <a:bodyPr lIns="0" tIns="36000" rIns="0" bIns="36000"/>
+          <a:lstStyle>
+            <a:lvl2pPr algn="l">
+              <a:buFontTx/>
+              <a:buNone/>
+              <a:defRPr>
+                <a:solidFill>
+                  <a:srgbClr val="D8FBC1"/>
+                </a:solidFill>
+                <a:latin typeface="Cambria" pitchFamily="18" charset="0"/>
+              </a:defRPr>
+            </a:lvl2pPr>
+          </a:lstStyle>
+          <a:p>
+            <a:pPr lvl="1"/>
+            <a:endParaRPr lang="fr-FR" dirty="0"/>
+          </a:p>
+        </p:txBody>
+      </p:sp>
+      <p:sp>
+        <p:nvSpPr>
+          <p:cNvPr id="14" name="Espace réservé du contenu 13"/>
+          <p:cNvSpPr>
+            <a:spLocks noGrp="1"/>
+          </p:cNvSpPr>
+          <p:nvPr>
+            <p:ph sz="quarter" idx="14"/>
+          </p:nvPr>
+        </p:nvSpPr>
+        <p:spPr>
+          <a:xfrm>
+            <a:off x="1763688" y="908720"/>
+            <a:ext cx="7380312" cy="5112568"/>
+          </a:xfrm>
+          <a:solidFill>
+            <a:schemeClr val="bg1"/>
+          </a:solidFill>
+        </p:spPr>
+        <p:txBody>
+          <a:bodyPr/>
+          <a:lstStyle>
+            <a:lvl1pPr>
+              <a:defRPr>
+                <a:latin typeface="Cambria" pitchFamily="18" charset="0"/>
+              </a:defRPr>
+            </a:lvl1pPr>
+            <a:lvl2pPr>
+              <a:defRPr>
+                <a:latin typeface="Cambria" pitchFamily="18" charset="0"/>
+              </a:defRPr>
+            </a:lvl2pPr>
+            <a:lvl3pPr>
+              <a:defRPr>
+                <a:latin typeface="Cambria" pitchFamily="18" charset="0"/>
+              </a:defRPr>
+            </a:lvl3pPr>
+            <a:lvl4pPr>
+              <a:defRPr>
+                <a:latin typeface="Cambria" pitchFamily="18" charset="0"/>
+              </a:defRPr>
+            </a:lvl4pPr>
+            <a:lvl5pPr>
+              <a:defRPr>
+                <a:latin typeface="Cambria" pitchFamily="18" charset="0"/>
+              </a:defRPr>
+            </a:lvl5pPr>
+          </a:lstStyle>
+          <a:p>
+            <a:pPr lvl="0"/>
+            <a:r>
+              <a:rPr lang="fr-FR" dirty="0" smtClean="0"/>
+              <a:t>Cliquez pour modifier les styles du texte du masque</a:t>
+            </a:r>
+          </a:p>
+          <a:p>
+            <a:pPr lvl="1"/>
+            <a:r>
+              <a:rPr lang="fr-FR" dirty="0" smtClean="0"/>
+              <a:t>Deuxième niveau</a:t>
+            </a:r>
+          </a:p>
+          <a:p>
+            <a:pPr lvl="2"/>
+            <a:r>
+              <a:rPr lang="fr-FR" dirty="0" smtClean="0"/>
+              <a:t>Troisième niveau</a:t>
+            </a:r>
+          </a:p>
+          <a:p>
+            <a:pPr lvl="3"/>
+            <a:r>
+              <a:rPr lang="fr-FR" dirty="0" smtClean="0"/>
+              <a:t>Quatrième niveau</a:t>
+            </a:r>
+          </a:p>
+          <a:p>
+            <a:pPr lvl="4"/>
+            <a:r>
+              <a:rPr lang="fr-FR" dirty="0" smtClean="0"/>
+              <a:t>Cinquième niveau</a:t>
+            </a:r>
+            <a:endParaRPr lang="fr-FR" dirty="0"/>
+          </a:p>
+        </p:txBody>
+      </p:sp>
+      <p:sp>
+        <p:nvSpPr>
+          <p:cNvPr id="18" name="Espace réservé du texte 17"/>
+          <p:cNvSpPr>
+            <a:spLocks noGrp="1"/>
+          </p:cNvSpPr>
+          <p:nvPr>
+            <p:ph type="body" sz="quarter" idx="15"/>
+          </p:nvPr>
+        </p:nvSpPr>
+        <p:spPr>
+          <a:xfrm>
+            <a:off x="0" y="0"/>
+            <a:ext cx="9144000" cy="908720"/>
+          </a:xfrm>
+        </p:spPr>
+        <p:txBody>
+          <a:bodyPr/>
+          <a:lstStyle>
+            <a:lvl1pPr algn="ctr">
+              <a:buNone/>
+              <a:defRPr>
+                <a:solidFill>
+                  <a:srgbClr val="A4CA39"/>
+                </a:solidFill>
+                <a:latin typeface="Cambria" pitchFamily="18" charset="0"/>
+              </a:defRPr>
+            </a:lvl1pPr>
+          </a:lstStyle>
+          <a:p>
+            <a:pPr lvl="0"/>
+            <a:endParaRPr lang="fr-FR" dirty="0"/>
+          </a:p>
+        </p:txBody>
+      </p:sp>
+      <p:pic>
+        <p:nvPicPr>
+          <p:cNvPr id="19" name="Image 18" descr="bugdroid_head.PNG"/>
+          <p:cNvPicPr>
+            <a:picLocks noChangeAspect="1"/>
+          </p:cNvPicPr>
+          <p:nvPr userDrawn="1"/>
+        </p:nvPicPr>
+        <p:blipFill>
+          <a:blip r:embed="rId3" cstate="print"/>
+          <a:stretch>
+            <a:fillRect/>
+          </a:stretch>
+        </p:blipFill>
+        <p:spPr>
+          <a:xfrm>
+            <a:off x="2699792" y="6021288"/>
+            <a:ext cx="4303209" cy="836712"/>
+          </a:xfrm>
+          <a:prstGeom prst="rect">
+            <a:avLst/>
+          </a:prstGeom>
+        </p:spPr>
+      </p:pic>
+    </p:spTree>
+  </p:cSld>
+  <p:clrMapOvr>
+    <a:masterClrMapping/>
+  </p:clrMapOvr>
+  <p:transition>
+    <p:fade/>
+  </p:transition>
+</p:sldLayout>
+</file>
+
+<file path=ppt/slideLayouts/slideLayout4.xml><?xml version="1.0" encoding="utf-8"?>
 <p:sldLayout xmlns:a="http://schemas.openxmlformats.org/drawingml/2006/main" xmlns:r="http://schemas.openxmlformats.org/officeDocument/2006/relationships" xmlns:p="http://schemas.openxmlformats.org/presentationml/2006/main" type="secHead" preserve="1">
   <p:cSld name="Titre de section">
     <p:spTree>
@@ -1040,9 +2147,8 @@
           <a:bodyPr/>
           <a:lstStyle/>
           <a:p>
-            <a:fld id="{AA309A6D-C09C-4548-B29A-6CF363A7E532}" type="datetimeFigureOut">
-              <a:rPr lang="fr-FR" smtClean="0"/>
-              <a:pPr/>
+            <a:fld id="{9DEFE777-74D9-46A9-AF63-ECD7CA5CB743}" type="datetime1">
+              <a:rPr lang="fr-FR" smtClean="0"/>
               <a:t>31/05/2011</a:t>
             </a:fld>
             <a:endParaRPr lang="fr-BE"/>
@@ -1064,6 +2170,10 @@
           <a:bodyPr/>
           <a:lstStyle/>
           <a:p>
+            <a:r>
+              <a:rPr lang="fr-FR" smtClean="0"/>
+              <a:t>M1 MIAGE - Université de Nice Sophia Antipolis</a:t>
+            </a:r>
             <a:endParaRPr lang="fr-BE"/>
           </a:p>
         </p:txBody>
@@ -1100,7 +2210,7 @@
 </p:sldLayout>
 </file>
 
-<file path=ppt/slideLayouts/slideLayout4.xml><?xml version="1.0" encoding="utf-8"?>
+<file path=ppt/slideLayouts/slideLayout5.xml><?xml version="1.0" encoding="utf-8"?>
 <p:sldLayout xmlns:a="http://schemas.openxmlformats.org/drawingml/2006/main" xmlns:r="http://schemas.openxmlformats.org/officeDocument/2006/relationships" xmlns:p="http://schemas.openxmlformats.org/presentationml/2006/main" type="twoObj" preserve="1">
   <p:cSld name="Deux contenus">
     <p:spTree>
@@ -1325,9 +2435,8 @@
           <a:bodyPr/>
           <a:lstStyle/>
           <a:p>
-            <a:fld id="{AA309A6D-C09C-4548-B29A-6CF363A7E532}" type="datetimeFigureOut">
-              <a:rPr lang="fr-FR" smtClean="0"/>
-              <a:pPr/>
+            <a:fld id="{9ACF5AB4-72D0-4411-8F4F-4D9D79E948BF}" type="datetime1">
+              <a:rPr lang="fr-FR" smtClean="0"/>
               <a:t>31/05/2011</a:t>
             </a:fld>
             <a:endParaRPr lang="fr-BE"/>
@@ -1349,6 +2458,10 @@
           <a:bodyPr/>
           <a:lstStyle/>
           <a:p>
+            <a:r>
+              <a:rPr lang="fr-FR" smtClean="0"/>
+              <a:t>M1 MIAGE - Université de Nice Sophia Antipolis</a:t>
+            </a:r>
             <a:endParaRPr lang="fr-BE"/>
           </a:p>
         </p:txBody>
@@ -1385,7 +2498,7 @@
 </p:sldLayout>
 </file>
 
-<file path=ppt/slideLayouts/slideLayout5.xml><?xml version="1.0" encoding="utf-8"?>
+<file path=ppt/slideLayouts/slideLayout6.xml><?xml version="1.0" encoding="utf-8"?>
 <p:sldLayout xmlns:a="http://schemas.openxmlformats.org/drawingml/2006/main" xmlns:r="http://schemas.openxmlformats.org/officeDocument/2006/relationships" xmlns:p="http://schemas.openxmlformats.org/presentationml/2006/main" type="twoTxTwoObj" preserve="1">
   <p:cSld name="Comparaison">
     <p:spTree>
@@ -1744,9 +2857,8 @@
           <a:bodyPr/>
           <a:lstStyle/>
           <a:p>
-            <a:fld id="{AA309A6D-C09C-4548-B29A-6CF363A7E532}" type="datetimeFigureOut">
-              <a:rPr lang="fr-FR" smtClean="0"/>
-              <a:pPr/>
+            <a:fld id="{D2811741-81B4-41E5-A5E9-7992F4B62001}" type="datetime1">
+              <a:rPr lang="fr-FR" smtClean="0"/>
               <a:t>31/05/2011</a:t>
             </a:fld>
             <a:endParaRPr lang="fr-BE"/>
@@ -1768,6 +2880,10 @@
           <a:bodyPr/>
           <a:lstStyle/>
           <a:p>
+            <a:r>
+              <a:rPr lang="fr-FR" smtClean="0"/>
+              <a:t>M1 MIAGE - Université de Nice Sophia Antipolis</a:t>
+            </a:r>
             <a:endParaRPr lang="fr-BE"/>
           </a:p>
         </p:txBody>
@@ -1804,7 +2920,7 @@
 </p:sldLayout>
 </file>
 
-<file path=ppt/slideLayouts/slideLayout6.xml><?xml version="1.0" encoding="utf-8"?>
+<file path=ppt/slideLayouts/slideLayout7.xml><?xml version="1.0" encoding="utf-8"?>
 <p:sldLayout xmlns:a="http://schemas.openxmlformats.org/drawingml/2006/main" xmlns:r="http://schemas.openxmlformats.org/officeDocument/2006/relationships" xmlns:p="http://schemas.openxmlformats.org/presentationml/2006/main" type="titleOnly" preserve="1">
   <p:cSld name="Titre seul">
     <p:spTree>
@@ -1859,9 +2975,8 @@
           <a:bodyPr/>
           <a:lstStyle/>
           <a:p>
-            <a:fld id="{AA309A6D-C09C-4548-B29A-6CF363A7E532}" type="datetimeFigureOut">
-              <a:rPr lang="fr-FR" smtClean="0"/>
-              <a:pPr/>
+            <a:fld id="{FA06DA9A-0216-4D5C-BA8D-BFCD89B87CAB}" type="datetime1">
+              <a:rPr lang="fr-FR" smtClean="0"/>
               <a:t>31/05/2011</a:t>
             </a:fld>
             <a:endParaRPr lang="fr-BE"/>
@@ -1883,6 +2998,10 @@
           <a:bodyPr/>
           <a:lstStyle/>
           <a:p>
+            <a:r>
+              <a:rPr lang="fr-FR" smtClean="0"/>
+              <a:t>M1 MIAGE - Université de Nice Sophia Antipolis</a:t>
+            </a:r>
             <a:endParaRPr lang="fr-BE"/>
           </a:p>
         </p:txBody>
@@ -1919,7 +3038,7 @@
 </p:sldLayout>
 </file>
 
-<file path=ppt/slideLayouts/slideLayout7.xml><?xml version="1.0" encoding="utf-8"?>
+<file path=ppt/slideLayouts/slideLayout8.xml><?xml version="1.0" encoding="utf-8"?>
 <p:sldLayout xmlns:a="http://schemas.openxmlformats.org/drawingml/2006/main" xmlns:r="http://schemas.openxmlformats.org/officeDocument/2006/relationships" xmlns:p="http://schemas.openxmlformats.org/presentationml/2006/main" type="blank" preserve="1">
   <p:cSld name="Vide">
     <p:spTree>
@@ -1951,9 +3070,8 @@
           <a:bodyPr/>
           <a:lstStyle/>
           <a:p>
-            <a:fld id="{AA309A6D-C09C-4548-B29A-6CF363A7E532}" type="datetimeFigureOut">
-              <a:rPr lang="fr-FR" smtClean="0"/>
-              <a:pPr/>
+            <a:fld id="{3EDB268D-CAC0-4A46-8E29-E987593C3F48}" type="datetime1">
+              <a:rPr lang="fr-FR" smtClean="0"/>
               <a:t>31/05/2011</a:t>
             </a:fld>
             <a:endParaRPr lang="fr-BE"/>
@@ -1975,6 +3093,10 @@
           <a:bodyPr/>
           <a:lstStyle/>
           <a:p>
+            <a:r>
+              <a:rPr lang="fr-FR" smtClean="0"/>
+              <a:t>M1 MIAGE - Université de Nice Sophia Antipolis</a:t>
+            </a:r>
             <a:endParaRPr lang="fr-BE"/>
           </a:p>
         </p:txBody>
@@ -2011,7 +3133,7 @@
 </p:sldLayout>
 </file>
 
-<file path=ppt/slideLayouts/slideLayout8.xml><?xml version="1.0" encoding="utf-8"?>
+<file path=ppt/slideLayouts/slideLayout9.xml><?xml version="1.0" encoding="utf-8"?>
 <p:sldLayout xmlns:a="http://schemas.openxmlformats.org/drawingml/2006/main" xmlns:r="http://schemas.openxmlformats.org/officeDocument/2006/relationships" xmlns:p="http://schemas.openxmlformats.org/presentationml/2006/main" type="objTx" preserve="1">
   <p:cSld name="Contenu avec légende">
     <p:spTree>
@@ -2225,9 +3347,8 @@
           <a:bodyPr/>
           <a:lstStyle/>
           <a:p>
-            <a:fld id="{AA309A6D-C09C-4548-B29A-6CF363A7E532}" type="datetimeFigureOut">
-              <a:rPr lang="fr-FR" smtClean="0"/>
-              <a:pPr/>
+            <a:fld id="{5B09ACAE-89F7-4AA2-AF12-DFB25BECD9F8}" type="datetime1">
+              <a:rPr lang="fr-FR" smtClean="0"/>
               <a:t>31/05/2011</a:t>
             </a:fld>
             <a:endParaRPr lang="fr-BE"/>
@@ -2249,256 +3370,10 @@
           <a:bodyPr/>
           <a:lstStyle/>
           <a:p>
-            <a:endParaRPr lang="fr-BE"/>
-          </a:p>
-        </p:txBody>
-      </p:sp>
-      <p:sp>
-        <p:nvSpPr>
-          <p:cNvPr id="7" name="Espace réservé du numéro de diapositive 6"/>
-          <p:cNvSpPr>
-            <a:spLocks noGrp="1"/>
-          </p:cNvSpPr>
-          <p:nvPr>
-            <p:ph type="sldNum" sz="quarter" idx="12"/>
-          </p:nvPr>
-        </p:nvSpPr>
-        <p:spPr/>
-        <p:txBody>
-          <a:bodyPr/>
-          <a:lstStyle/>
-          <a:p>
-            <a:fld id="{CF4668DC-857F-487D-BFFA-8C0CA5037977}" type="slidenum">
-              <a:rPr lang="fr-BE" smtClean="0"/>
-              <a:pPr/>
-              <a:t>‹N°›</a:t>
-            </a:fld>
-            <a:endParaRPr lang="fr-BE"/>
-          </a:p>
-        </p:txBody>
-      </p:sp>
-    </p:spTree>
-  </p:cSld>
-  <p:clrMapOvr>
-    <a:masterClrMapping/>
-  </p:clrMapOvr>
-</p:sldLayout>
-</file>
-
-<file path=ppt/slideLayouts/slideLayout9.xml><?xml version="1.0" encoding="utf-8"?>
-<p:sldLayout xmlns:a="http://schemas.openxmlformats.org/drawingml/2006/main" xmlns:r="http://schemas.openxmlformats.org/officeDocument/2006/relationships" xmlns:p="http://schemas.openxmlformats.org/presentationml/2006/main" type="picTx" preserve="1">
-  <p:cSld name="Image avec légende">
-    <p:spTree>
-      <p:nvGrpSpPr>
-        <p:cNvPr id="1" name=""/>
-        <p:cNvGrpSpPr/>
-        <p:nvPr/>
-      </p:nvGrpSpPr>
-      <p:grpSpPr>
-        <a:xfrm>
-          <a:off x="0" y="0"/>
-          <a:ext cx="0" cy="0"/>
-          <a:chOff x="0" y="0"/>
-          <a:chExt cx="0" cy="0"/>
-        </a:xfrm>
-      </p:grpSpPr>
-      <p:sp>
-        <p:nvSpPr>
-          <p:cNvPr id="2" name="Titre 1"/>
-          <p:cNvSpPr>
-            <a:spLocks noGrp="1"/>
-          </p:cNvSpPr>
-          <p:nvPr>
-            <p:ph type="title"/>
-          </p:nvPr>
-        </p:nvSpPr>
-        <p:spPr>
-          <a:xfrm>
-            <a:off x="1792288" y="4800600"/>
-            <a:ext cx="5486400" cy="566738"/>
-          </a:xfrm>
-        </p:spPr>
-        <p:txBody>
-          <a:bodyPr anchor="b"/>
-          <a:lstStyle>
-            <a:lvl1pPr algn="l">
-              <a:defRPr sz="2000" b="1"/>
-            </a:lvl1pPr>
-          </a:lstStyle>
-          <a:p>
-            <a:r>
-              <a:rPr lang="fr-FR" smtClean="0"/>
-              <a:t>Cliquez pour modifier le style du titre</a:t>
-            </a:r>
-            <a:endParaRPr lang="fr-BE"/>
-          </a:p>
-        </p:txBody>
-      </p:sp>
-      <p:sp>
-        <p:nvSpPr>
-          <p:cNvPr id="3" name="Espace réservé pour une image  2"/>
-          <p:cNvSpPr>
-            <a:spLocks noGrp="1"/>
-          </p:cNvSpPr>
-          <p:nvPr>
-            <p:ph type="pic" idx="1"/>
-          </p:nvPr>
-        </p:nvSpPr>
-        <p:spPr>
-          <a:xfrm>
-            <a:off x="1792288" y="612775"/>
-            <a:ext cx="5486400" cy="4114800"/>
-          </a:xfrm>
-        </p:spPr>
-        <p:txBody>
-          <a:bodyPr/>
-          <a:lstStyle>
-            <a:lvl1pPr marL="0" indent="0">
-              <a:buNone/>
-              <a:defRPr sz="3200"/>
-            </a:lvl1pPr>
-            <a:lvl2pPr marL="457200" indent="0">
-              <a:buNone/>
-              <a:defRPr sz="2800"/>
-            </a:lvl2pPr>
-            <a:lvl3pPr marL="914400" indent="0">
-              <a:buNone/>
-              <a:defRPr sz="2400"/>
-            </a:lvl3pPr>
-            <a:lvl4pPr marL="1371600" indent="0">
-              <a:buNone/>
-              <a:defRPr sz="2000"/>
-            </a:lvl4pPr>
-            <a:lvl5pPr marL="1828800" indent="0">
-              <a:buNone/>
-              <a:defRPr sz="2000"/>
-            </a:lvl5pPr>
-            <a:lvl6pPr marL="2286000" indent="0">
-              <a:buNone/>
-              <a:defRPr sz="2000"/>
-            </a:lvl6pPr>
-            <a:lvl7pPr marL="2743200" indent="0">
-              <a:buNone/>
-              <a:defRPr sz="2000"/>
-            </a:lvl7pPr>
-            <a:lvl8pPr marL="3200400" indent="0">
-              <a:buNone/>
-              <a:defRPr sz="2000"/>
-            </a:lvl8pPr>
-            <a:lvl9pPr marL="3657600" indent="0">
-              <a:buNone/>
-              <a:defRPr sz="2000"/>
-            </a:lvl9pPr>
-          </a:lstStyle>
-          <a:p>
-            <a:endParaRPr lang="fr-BE"/>
-          </a:p>
-        </p:txBody>
-      </p:sp>
-      <p:sp>
-        <p:nvSpPr>
-          <p:cNvPr id="4" name="Espace réservé du texte 3"/>
-          <p:cNvSpPr>
-            <a:spLocks noGrp="1"/>
-          </p:cNvSpPr>
-          <p:nvPr>
-            <p:ph type="body" sz="half" idx="2"/>
-          </p:nvPr>
-        </p:nvSpPr>
-        <p:spPr>
-          <a:xfrm>
-            <a:off x="1792288" y="5367338"/>
-            <a:ext cx="5486400" cy="804862"/>
-          </a:xfrm>
-        </p:spPr>
-        <p:txBody>
-          <a:bodyPr/>
-          <a:lstStyle>
-            <a:lvl1pPr marL="0" indent="0">
-              <a:buNone/>
-              <a:defRPr sz="1400"/>
-            </a:lvl1pPr>
-            <a:lvl2pPr marL="457200" indent="0">
-              <a:buNone/>
-              <a:defRPr sz="1200"/>
-            </a:lvl2pPr>
-            <a:lvl3pPr marL="914400" indent="0">
-              <a:buNone/>
-              <a:defRPr sz="1000"/>
-            </a:lvl3pPr>
-            <a:lvl4pPr marL="1371600" indent="0">
-              <a:buNone/>
-              <a:defRPr sz="900"/>
-            </a:lvl4pPr>
-            <a:lvl5pPr marL="1828800" indent="0">
-              <a:buNone/>
-              <a:defRPr sz="900"/>
-            </a:lvl5pPr>
-            <a:lvl6pPr marL="2286000" indent="0">
-              <a:buNone/>
-              <a:defRPr sz="900"/>
-            </a:lvl6pPr>
-            <a:lvl7pPr marL="2743200" indent="0">
-              <a:buNone/>
-              <a:defRPr sz="900"/>
-            </a:lvl7pPr>
-            <a:lvl8pPr marL="3200400" indent="0">
-              <a:buNone/>
-              <a:defRPr sz="900"/>
-            </a:lvl8pPr>
-            <a:lvl9pPr marL="3657600" indent="0">
-              <a:buNone/>
-              <a:defRPr sz="900"/>
-            </a:lvl9pPr>
-          </a:lstStyle>
-          <a:p>
-            <a:pPr lvl="0"/>
-            <a:r>
-              <a:rPr lang="fr-FR" smtClean="0"/>
-              <a:t>Cliquez pour modifier les styles du texte du masque</a:t>
-            </a:r>
-          </a:p>
-        </p:txBody>
-      </p:sp>
-      <p:sp>
-        <p:nvSpPr>
-          <p:cNvPr id="5" name="Espace réservé de la date 4"/>
-          <p:cNvSpPr>
-            <a:spLocks noGrp="1"/>
-          </p:cNvSpPr>
-          <p:nvPr>
-            <p:ph type="dt" sz="half" idx="10"/>
-          </p:nvPr>
-        </p:nvSpPr>
-        <p:spPr/>
-        <p:txBody>
-          <a:bodyPr/>
-          <a:lstStyle/>
-          <a:p>
-            <a:fld id="{AA309A6D-C09C-4548-B29A-6CF363A7E532}" type="datetimeFigureOut">
-              <a:rPr lang="fr-FR" smtClean="0"/>
-              <a:pPr/>
-              <a:t>31/05/2011</a:t>
-            </a:fld>
-            <a:endParaRPr lang="fr-BE"/>
-          </a:p>
-        </p:txBody>
-      </p:sp>
-      <p:sp>
-        <p:nvSpPr>
-          <p:cNvPr id="6" name="Espace réservé du pied de page 5"/>
-          <p:cNvSpPr>
-            <a:spLocks noGrp="1"/>
-          </p:cNvSpPr>
-          <p:nvPr>
-            <p:ph type="ftr" sz="quarter" idx="11"/>
-          </p:nvPr>
-        </p:nvSpPr>
-        <p:spPr/>
-        <p:txBody>
-          <a:bodyPr/>
-          <a:lstStyle/>
-          <a:p>
+            <a:r>
+              <a:rPr lang="fr-FR" smtClean="0"/>
+              <a:t>M1 MIAGE - Université de Nice Sophia Antipolis</a:t>
+            </a:r>
             <a:endParaRPr lang="fr-BE"/>
           </a:p>
         </p:txBody>
@@ -2685,9 +3560,8 @@
             </a:lvl1pPr>
           </a:lstStyle>
           <a:p>
-            <a:fld id="{AA309A6D-C09C-4548-B29A-6CF363A7E532}" type="datetimeFigureOut">
-              <a:rPr lang="fr-FR" smtClean="0"/>
-              <a:pPr/>
+            <a:fld id="{C2D67580-B034-40FA-BDF9-08E33D7DD05F}" type="datetime1">
+              <a:rPr lang="fr-FR" smtClean="0"/>
               <a:t>31/05/2011</a:t>
             </a:fld>
             <a:endParaRPr lang="fr-BE"/>
@@ -2727,6 +3601,10 @@
             </a:lvl1pPr>
           </a:lstStyle>
           <a:p>
+            <a:r>
+              <a:rPr lang="fr-FR" smtClean="0"/>
+              <a:t>M1 MIAGE - Université de Nice Sophia Antipolis</a:t>
+            </a:r>
             <a:endParaRPr lang="fr-BE"/>
           </a:p>
         </p:txBody>
@@ -2778,17 +3656,19 @@
   <p:clrMap bg1="lt1" tx1="dk1" bg2="lt2" tx2="dk2" accent1="accent1" accent2="accent2" accent3="accent3" accent4="accent4" accent5="accent5" accent6="accent6" hlink="hlink" folHlink="folHlink"/>
   <p:sldLayoutIdLst>
     <p:sldLayoutId id="2147483649" r:id="rId1"/>
-    <p:sldLayoutId id="2147483650" r:id="rId2"/>
-    <p:sldLayoutId id="2147483651" r:id="rId3"/>
-    <p:sldLayoutId id="2147483652" r:id="rId4"/>
-    <p:sldLayoutId id="2147483653" r:id="rId5"/>
-    <p:sldLayoutId id="2147483654" r:id="rId6"/>
-    <p:sldLayoutId id="2147483655" r:id="rId7"/>
-    <p:sldLayoutId id="2147483656" r:id="rId8"/>
-    <p:sldLayoutId id="2147483657" r:id="rId9"/>
-    <p:sldLayoutId id="2147483658" r:id="rId10"/>
-    <p:sldLayoutId id="2147483659" r:id="rId11"/>
+    <p:sldLayoutId id="2147483660" r:id="rId2"/>
+    <p:sldLayoutId id="2147483650" r:id="rId3"/>
+    <p:sldLayoutId id="2147483651" r:id="rId4"/>
+    <p:sldLayoutId id="2147483652" r:id="rId5"/>
+    <p:sldLayoutId id="2147483653" r:id="rId6"/>
+    <p:sldLayoutId id="2147483654" r:id="rId7"/>
+    <p:sldLayoutId id="2147483655" r:id="rId8"/>
+    <p:sldLayoutId id="2147483656" r:id="rId9"/>
+    <p:sldLayoutId id="2147483657" r:id="rId10"/>
+    <p:sldLayoutId id="2147483658" r:id="rId11"/>
+    <p:sldLayoutId id="2147483659" r:id="rId12"/>
   </p:sldLayoutIdLst>
+  <p:hf hdr="0" dt="0"/>
   <p:txStyles>
     <p:titleStyle>
       <a:lvl1pPr algn="ctr" defTabSz="914400" rtl="0" eaLnBrk="1" latinLnBrk="0" hangingPunct="1">
@@ -3085,10 +3965,47 @@
         </p:nvSpPr>
         <p:spPr/>
         <p:txBody>
-          <a:bodyPr/>
-          <a:lstStyle/>
-          <a:p>
-            <a:endParaRPr lang="fr-FR"/>
+          <a:bodyPr>
+            <a:normAutofit fontScale="90000"/>
+          </a:bodyPr>
+          <a:lstStyle/>
+          <a:p>
+            <a:r>
+              <a:rPr lang="fr-FR" dirty="0" smtClean="0">
+                <a:solidFill>
+                  <a:srgbClr val="A4CA39"/>
+                </a:solidFill>
+              </a:rPr>
+              <a:t>Projet d’Année</a:t>
+            </a:r>
+            <a:br>
+              <a:rPr lang="fr-FR" dirty="0" smtClean="0">
+                <a:solidFill>
+                  <a:srgbClr val="A4CA39"/>
+                </a:solidFill>
+              </a:rPr>
+            </a:br>
+            <a:r>
+              <a:rPr lang="fr-FR" sz="3600" dirty="0" smtClean="0">
+                <a:solidFill>
+                  <a:srgbClr val="A4CA39"/>
+                </a:solidFill>
+              </a:rPr>
+              <a:t>Lecteur MP3 pour musiciens sous </a:t>
+            </a:r>
+            <a:r>
+              <a:rPr lang="fr-FR" sz="3600" dirty="0" err="1" smtClean="0">
+                <a:solidFill>
+                  <a:srgbClr val="A4CA39"/>
+                </a:solidFill>
+              </a:rPr>
+              <a:t>Android</a:t>
+            </a:r>
+            <a:endParaRPr lang="fr-FR" dirty="0">
+              <a:solidFill>
+                <a:srgbClr val="A4CA39"/>
+              </a:solidFill>
+            </a:endParaRPr>
           </a:p>
         </p:txBody>
       </p:sp>
@@ -3102,12 +4019,148 @@
             <p:ph type="subTitle" idx="1"/>
           </p:nvPr>
         </p:nvSpPr>
-        <p:spPr/>
-        <p:txBody>
-          <a:bodyPr/>
-          <a:lstStyle/>
-          <a:p>
-            <a:endParaRPr lang="fr-FR"/>
+        <p:spPr>
+          <a:xfrm>
+            <a:off x="1371600" y="3886200"/>
+            <a:ext cx="6400800" cy="2423120"/>
+          </a:xfrm>
+        </p:spPr>
+        <p:txBody>
+          <a:bodyPr>
+            <a:normAutofit fontScale="70000" lnSpcReduction="20000"/>
+          </a:bodyPr>
+          <a:lstStyle/>
+          <a:p>
+            <a:pPr algn="l"/>
+            <a:r>
+              <a:rPr lang="fr-FR" dirty="0" smtClean="0">
+                <a:solidFill>
+                  <a:srgbClr val="C0F9A9"/>
+                </a:solidFill>
+              </a:rPr>
+              <a:t>Enseignant tuteur : Michel BUFFA</a:t>
+            </a:r>
+          </a:p>
+          <a:p>
+            <a:pPr algn="l"/>
+            <a:endParaRPr lang="fr-FR" dirty="0" smtClean="0">
+              <a:solidFill>
+                <a:srgbClr val="C0F9A9"/>
+              </a:solidFill>
+            </a:endParaRPr>
+          </a:p>
+          <a:p>
+            <a:pPr algn="l"/>
+            <a:r>
+              <a:rPr lang="fr-FR" dirty="0" smtClean="0">
+                <a:solidFill>
+                  <a:srgbClr val="C0F9A9"/>
+                </a:solidFill>
+              </a:rPr>
+              <a:t>Étudiants :</a:t>
+            </a:r>
+          </a:p>
+          <a:p>
+            <a:pPr lvl="1" algn="l">
+              <a:buFont typeface="Arial" pitchFamily="34" charset="0"/>
+              <a:buChar char="•"/>
+            </a:pPr>
+            <a:r>
+              <a:rPr lang="fr-FR" dirty="0" smtClean="0">
+                <a:solidFill>
+                  <a:srgbClr val="C0F9A9"/>
+                </a:solidFill>
+                <a:latin typeface="Cambria" pitchFamily="18" charset="0"/>
+              </a:rPr>
+              <a:t> </a:t>
+            </a:r>
+            <a:r>
+              <a:rPr lang="fr-FR" dirty="0" smtClean="0">
+                <a:solidFill>
+                  <a:srgbClr val="C0F9A9"/>
+                </a:solidFill>
+                <a:latin typeface="Cambria" pitchFamily="18" charset="0"/>
+              </a:rPr>
+              <a:t>Julien LESPAGNARD</a:t>
+            </a:r>
+          </a:p>
+          <a:p>
+            <a:pPr lvl="1" algn="l">
+              <a:buFont typeface="Arial" pitchFamily="34" charset="0"/>
+              <a:buChar char="•"/>
+            </a:pPr>
+            <a:r>
+              <a:rPr lang="fr-FR" dirty="0" smtClean="0">
+                <a:solidFill>
+                  <a:srgbClr val="C0F9A9"/>
+                </a:solidFill>
+                <a:latin typeface="Cambria" pitchFamily="18" charset="0"/>
+              </a:rPr>
+              <a:t> </a:t>
+            </a:r>
+            <a:r>
+              <a:rPr lang="fr-FR" dirty="0" smtClean="0">
+                <a:solidFill>
+                  <a:srgbClr val="C0F9A9"/>
+                </a:solidFill>
+                <a:latin typeface="Cambria" pitchFamily="18" charset="0"/>
+              </a:rPr>
+              <a:t>A</a:t>
+            </a:r>
+            <a:r>
+              <a:rPr lang="fr-FR" dirty="0" smtClean="0">
+                <a:solidFill>
+                  <a:srgbClr val="C0F9A9"/>
+                </a:solidFill>
+                <a:latin typeface="Cambria" pitchFamily="18" charset="0"/>
+              </a:rPr>
+              <a:t>nthony BONIN</a:t>
+            </a:r>
+          </a:p>
+          <a:p>
+            <a:pPr lvl="1" algn="l">
+              <a:buFont typeface="Arial" pitchFamily="34" charset="0"/>
+              <a:buChar char="•"/>
+            </a:pPr>
+            <a:r>
+              <a:rPr lang="fr-FR" dirty="0" smtClean="0">
+                <a:solidFill>
+                  <a:srgbClr val="C0F9A9"/>
+                </a:solidFill>
+                <a:latin typeface="Cambria" pitchFamily="18" charset="0"/>
+              </a:rPr>
+              <a:t> </a:t>
+            </a:r>
+            <a:r>
+              <a:rPr lang="fr-FR" dirty="0" smtClean="0">
+                <a:solidFill>
+                  <a:srgbClr val="C0F9A9"/>
+                </a:solidFill>
+                <a:latin typeface="Cambria" pitchFamily="18" charset="0"/>
+              </a:rPr>
+              <a:t>Élodie MAZUEL</a:t>
+            </a:r>
+          </a:p>
+          <a:p>
+            <a:pPr lvl="1" algn="l">
+              <a:buFont typeface="Arial" pitchFamily="34" charset="0"/>
+              <a:buChar char="•"/>
+            </a:pPr>
+            <a:r>
+              <a:rPr lang="fr-FR" dirty="0" smtClean="0">
+                <a:solidFill>
+                  <a:srgbClr val="C0F9A9"/>
+                </a:solidFill>
+                <a:latin typeface="Cambria" pitchFamily="18" charset="0"/>
+              </a:rPr>
+              <a:t> Michel CARTIER</a:t>
+            </a:r>
+            <a:endParaRPr lang="fr-FR" dirty="0">
+              <a:solidFill>
+                <a:srgbClr val="C0F9A9"/>
+              </a:solidFill>
+              <a:latin typeface="Cambria" pitchFamily="18" charset="0"/>
+            </a:endParaRPr>
           </a:p>
         </p:txBody>
       </p:sp>
@@ -3116,6 +4169,1941 @@
   <p:clrMapOvr>
     <a:masterClrMapping/>
   </p:clrMapOvr>
+  <p:transition>
+    <p:randomBar/>
+  </p:transition>
+  <p:timing>
+    <p:tnLst>
+      <p:par>
+        <p:cTn id="1" dur="indefinite" restart="never" nodeType="tmRoot"/>
+      </p:par>
+    </p:tnLst>
+  </p:timing>
+</p:sld>
+</file>
+
+<file path=ppt/slides/slide2.xml><?xml version="1.0" encoding="utf-8"?>
+<p:sld xmlns:a="http://schemas.openxmlformats.org/drawingml/2006/main" xmlns:r="http://schemas.openxmlformats.org/officeDocument/2006/relationships" xmlns:p="http://schemas.openxmlformats.org/presentationml/2006/main">
+  <p:cSld>
+    <p:spTree>
+      <p:nvGrpSpPr>
+        <p:cNvPr id="1" name=""/>
+        <p:cNvGrpSpPr/>
+        <p:nvPr/>
+      </p:nvGrpSpPr>
+      <p:grpSpPr>
+        <a:xfrm>
+          <a:off x="0" y="0"/>
+          <a:ext cx="0" cy="0"/>
+          <a:chOff x="0" y="0"/>
+          <a:chExt cx="0" cy="0"/>
+        </a:xfrm>
+      </p:grpSpPr>
+      <p:sp>
+        <p:nvSpPr>
+          <p:cNvPr id="2" name="Titre 1"/>
+          <p:cNvSpPr>
+            <a:spLocks noGrp="1"/>
+          </p:cNvSpPr>
+          <p:nvPr>
+            <p:ph type="ctrTitle"/>
+          </p:nvPr>
+        </p:nvSpPr>
+        <p:spPr/>
+        <p:txBody>
+          <a:bodyPr/>
+          <a:lstStyle/>
+          <a:p>
+            <a:r>
+              <a:rPr lang="fr-FR" dirty="0" smtClean="0">
+                <a:solidFill>
+                  <a:srgbClr val="A4CA39"/>
+                </a:solidFill>
+              </a:rPr>
+              <a:t>Plan</a:t>
+            </a:r>
+            <a:endParaRPr lang="fr-FR" dirty="0">
+              <a:solidFill>
+                <a:srgbClr val="A4CA39"/>
+              </a:solidFill>
+            </a:endParaRPr>
+          </a:p>
+        </p:txBody>
+      </p:sp>
+      <p:sp>
+        <p:nvSpPr>
+          <p:cNvPr id="3" name="Sous-titre 2"/>
+          <p:cNvSpPr>
+            <a:spLocks noGrp="1"/>
+          </p:cNvSpPr>
+          <p:nvPr>
+            <p:ph type="subTitle" idx="1"/>
+          </p:nvPr>
+        </p:nvSpPr>
+        <p:spPr>
+          <a:xfrm>
+            <a:off x="683568" y="1340768"/>
+            <a:ext cx="7776864" cy="4896544"/>
+          </a:xfrm>
+        </p:spPr>
+        <p:txBody>
+          <a:bodyPr>
+            <a:normAutofit fontScale="92500" lnSpcReduction="10000"/>
+          </a:bodyPr>
+          <a:lstStyle/>
+          <a:p>
+            <a:pPr marL="514350" indent="-514350" algn="l">
+              <a:buFont typeface="+mj-lt"/>
+              <a:buAutoNum type="arabicPeriod"/>
+            </a:pPr>
+            <a:r>
+              <a:rPr lang="fr-FR" sz="3000" dirty="0" smtClean="0">
+                <a:solidFill>
+                  <a:srgbClr val="A4CA39"/>
+                </a:solidFill>
+              </a:rPr>
+              <a:t>Introduction</a:t>
+            </a:r>
+          </a:p>
+          <a:p>
+            <a:pPr marL="971550" lvl="1" indent="-514350" algn="l">
+              <a:buFont typeface="Wingdings" pitchFamily="2" charset="2"/>
+              <a:buChar char="Ø"/>
+            </a:pPr>
+            <a:r>
+              <a:rPr lang="fr-FR" sz="2400" dirty="0" smtClean="0">
+                <a:solidFill>
+                  <a:srgbClr val="D8FBC1"/>
+                </a:solidFill>
+              </a:rPr>
+              <a:t>Objectif du projet</a:t>
+            </a:r>
+          </a:p>
+          <a:p>
+            <a:pPr marL="971550" lvl="1" indent="-514350" algn="l">
+              <a:buFont typeface="Wingdings" pitchFamily="2" charset="2"/>
+              <a:buChar char="Ø"/>
+            </a:pPr>
+            <a:r>
+              <a:rPr lang="fr-FR" sz="2400" dirty="0" smtClean="0">
+                <a:solidFill>
+                  <a:srgbClr val="D8FBC1"/>
+                </a:solidFill>
+              </a:rPr>
+              <a:t>Présentation d’</a:t>
+            </a:r>
+            <a:r>
+              <a:rPr lang="fr-FR" sz="2400" dirty="0" err="1" smtClean="0">
+                <a:solidFill>
+                  <a:srgbClr val="D8FBC1"/>
+                </a:solidFill>
+              </a:rPr>
+              <a:t>Android</a:t>
+            </a:r>
+            <a:r>
+              <a:rPr lang="fr-FR" sz="2400" dirty="0" smtClean="0">
+                <a:solidFill>
+                  <a:srgbClr val="D8FBC1"/>
+                </a:solidFill>
+              </a:rPr>
+              <a:t> ?</a:t>
+            </a:r>
+          </a:p>
+          <a:p>
+            <a:pPr marL="514350" indent="-514350" algn="l">
+              <a:buFont typeface="+mj-lt"/>
+              <a:buAutoNum type="arabicPeriod"/>
+            </a:pPr>
+            <a:r>
+              <a:rPr lang="fr-FR" sz="3000" dirty="0" smtClean="0">
+                <a:solidFill>
+                  <a:srgbClr val="A4CA39"/>
+                </a:solidFill>
+              </a:rPr>
+              <a:t>Déroulement du projet</a:t>
+            </a:r>
+          </a:p>
+          <a:p>
+            <a:pPr marL="971550" lvl="1" indent="-514350" algn="l">
+              <a:buFont typeface="Wingdings" pitchFamily="2" charset="2"/>
+              <a:buChar char="Ø"/>
+            </a:pPr>
+            <a:r>
+              <a:rPr lang="fr-FR" sz="2400" dirty="0" smtClean="0">
+                <a:solidFill>
+                  <a:srgbClr val="D8FBC1"/>
+                </a:solidFill>
+              </a:rPr>
+              <a:t>Diagramme de Gantt prévisionnel</a:t>
+            </a:r>
+          </a:p>
+          <a:p>
+            <a:pPr marL="971550" lvl="1" indent="-514350" algn="l">
+              <a:buFont typeface="Wingdings" pitchFamily="2" charset="2"/>
+              <a:buChar char="Ø"/>
+            </a:pPr>
+            <a:r>
+              <a:rPr lang="fr-FR" sz="2400" dirty="0" smtClean="0">
+                <a:solidFill>
+                  <a:srgbClr val="D8FBC1"/>
+                </a:solidFill>
+              </a:rPr>
+              <a:t>Diagramme </a:t>
+            </a:r>
+            <a:r>
+              <a:rPr lang="fr-FR" sz="2400" dirty="0" smtClean="0">
+                <a:solidFill>
+                  <a:srgbClr val="D8FBC1"/>
+                </a:solidFill>
+              </a:rPr>
+              <a:t>de Gantt </a:t>
+            </a:r>
+            <a:r>
+              <a:rPr lang="fr-FR" sz="2400" dirty="0" smtClean="0">
+                <a:solidFill>
+                  <a:srgbClr val="D8FBC1"/>
+                </a:solidFill>
+              </a:rPr>
+              <a:t>effectif</a:t>
+            </a:r>
+          </a:p>
+          <a:p>
+            <a:pPr marL="514350" indent="-514350" algn="l">
+              <a:buFont typeface="+mj-lt"/>
+              <a:buAutoNum type="arabicPeriod"/>
+            </a:pPr>
+            <a:r>
+              <a:rPr lang="fr-FR" sz="3000" dirty="0" smtClean="0">
+                <a:solidFill>
+                  <a:srgbClr val="A4CA39"/>
+                </a:solidFill>
+              </a:rPr>
+              <a:t>Outils et méthodologies utilisés</a:t>
+            </a:r>
+          </a:p>
+          <a:p>
+            <a:pPr marL="514350" indent="-514350" algn="l">
+              <a:buFont typeface="+mj-lt"/>
+              <a:buAutoNum type="arabicPeriod"/>
+            </a:pPr>
+            <a:r>
+              <a:rPr lang="fr-FR" sz="3000" dirty="0" smtClean="0">
+                <a:solidFill>
+                  <a:srgbClr val="A4CA39"/>
+                </a:solidFill>
+              </a:rPr>
+              <a:t>Démonstration</a:t>
+            </a:r>
+          </a:p>
+          <a:p>
+            <a:pPr marL="514350" indent="-514350" algn="l">
+              <a:buFont typeface="+mj-lt"/>
+              <a:buAutoNum type="arabicPeriod"/>
+            </a:pPr>
+            <a:r>
+              <a:rPr lang="fr-FR" sz="3000" dirty="0" smtClean="0">
+                <a:solidFill>
+                  <a:srgbClr val="A4CA39"/>
+                </a:solidFill>
+              </a:rPr>
+              <a:t>Conclusion</a:t>
+            </a:r>
+          </a:p>
+          <a:p>
+            <a:pPr marL="971550" lvl="1" indent="-514350" algn="l">
+              <a:buFont typeface="Wingdings" pitchFamily="2" charset="2"/>
+              <a:buChar char="Ø"/>
+            </a:pPr>
+            <a:r>
+              <a:rPr lang="fr-FR" sz="2400" dirty="0" smtClean="0">
+                <a:solidFill>
+                  <a:srgbClr val="D8FBC1"/>
+                </a:solidFill>
+              </a:rPr>
+              <a:t>Les connaissances et compétences acquises</a:t>
+            </a:r>
+          </a:p>
+          <a:p>
+            <a:pPr marL="971550" lvl="1" indent="-514350" algn="l">
+              <a:buFont typeface="Wingdings" pitchFamily="2" charset="2"/>
+              <a:buChar char="Ø"/>
+            </a:pPr>
+            <a:r>
+              <a:rPr lang="fr-FR" sz="2400" dirty="0" smtClean="0">
+                <a:solidFill>
+                  <a:srgbClr val="D8FBC1"/>
+                </a:solidFill>
+              </a:rPr>
+              <a:t>Les évolutions possibles</a:t>
+            </a:r>
+          </a:p>
+          <a:p>
+            <a:pPr marL="514350" indent="-514350" algn="l">
+              <a:buFont typeface="+mj-lt"/>
+              <a:buAutoNum type="arabicPeriod"/>
+            </a:pPr>
+            <a:endParaRPr lang="fr-FR" dirty="0" smtClean="0"/>
+          </a:p>
+          <a:p>
+            <a:pPr marL="514350" indent="-514350" algn="l">
+              <a:buFont typeface="+mj-lt"/>
+              <a:buAutoNum type="arabicPeriod"/>
+            </a:pPr>
+            <a:endParaRPr lang="fr-FR" dirty="0" smtClean="0"/>
+          </a:p>
+          <a:p>
+            <a:pPr marL="971550" lvl="1" indent="-514350" algn="l">
+              <a:buFont typeface="Wingdings" pitchFamily="2" charset="2"/>
+              <a:buChar char="Ø"/>
+            </a:pPr>
+            <a:endParaRPr lang="fr-FR" dirty="0" smtClean="0"/>
+          </a:p>
+          <a:p>
+            <a:pPr marL="971550" lvl="1" indent="-514350" algn="l">
+              <a:buFont typeface="Wingdings" pitchFamily="2" charset="2"/>
+              <a:buChar char="Ø"/>
+            </a:pPr>
+            <a:endParaRPr lang="fr-FR" dirty="0" smtClean="0"/>
+          </a:p>
+        </p:txBody>
+      </p:sp>
+      <p:sp>
+        <p:nvSpPr>
+          <p:cNvPr id="4" name="Espace réservé du pied de page 3"/>
+          <p:cNvSpPr>
+            <a:spLocks noGrp="1"/>
+          </p:cNvSpPr>
+          <p:nvPr>
+            <p:ph type="ftr" sz="quarter" idx="11"/>
+          </p:nvPr>
+        </p:nvSpPr>
+        <p:spPr/>
+        <p:txBody>
+          <a:bodyPr/>
+          <a:lstStyle/>
+          <a:p>
+            <a:r>
+              <a:rPr lang="fr-FR" smtClean="0"/>
+              <a:t>M1 MIAGE  - 2010/2011</a:t>
+            </a:r>
+          </a:p>
+          <a:p>
+            <a:r>
+              <a:rPr lang="fr-FR" smtClean="0"/>
+              <a:t>Université de Nice Sophia Antipolis</a:t>
+            </a:r>
+            <a:endParaRPr lang="fr-BE" dirty="0"/>
+          </a:p>
+        </p:txBody>
+      </p:sp>
+      <p:sp>
+        <p:nvSpPr>
+          <p:cNvPr id="5" name="Espace réservé du numéro de diapositive 4"/>
+          <p:cNvSpPr>
+            <a:spLocks noGrp="1"/>
+          </p:cNvSpPr>
+          <p:nvPr>
+            <p:ph type="sldNum" sz="quarter" idx="12"/>
+          </p:nvPr>
+        </p:nvSpPr>
+        <p:spPr/>
+        <p:txBody>
+          <a:bodyPr/>
+          <a:lstStyle/>
+          <a:p>
+            <a:fld id="{CF4668DC-857F-487D-BFFA-8C0CA5037977}" type="slidenum">
+              <a:rPr lang="fr-BE" smtClean="0"/>
+              <a:pPr/>
+              <a:t>2</a:t>
+            </a:fld>
+            <a:r>
+              <a:rPr lang="fr-BE" smtClean="0"/>
+              <a:t> sur ?</a:t>
+            </a:r>
+            <a:endParaRPr lang="fr-BE" dirty="0"/>
+          </a:p>
+        </p:txBody>
+      </p:sp>
+    </p:spTree>
+  </p:cSld>
+  <p:clrMapOvr>
+    <a:masterClrMapping/>
+  </p:clrMapOvr>
+  <p:transition>
+    <p:randomBar/>
+  </p:transition>
+  <p:timing>
+    <p:tnLst>
+      <p:par>
+        <p:cTn id="1" dur="indefinite" restart="never" nodeType="tmRoot"/>
+      </p:par>
+    </p:tnLst>
+  </p:timing>
+</p:sld>
+</file>
+
+<file path=ppt/slides/slide3.xml><?xml version="1.0" encoding="utf-8"?>
+<p:sld xmlns:a="http://schemas.openxmlformats.org/drawingml/2006/main" xmlns:r="http://schemas.openxmlformats.org/officeDocument/2006/relationships" xmlns:p="http://schemas.openxmlformats.org/presentationml/2006/main">
+  <p:cSld>
+    <p:spTree>
+      <p:nvGrpSpPr>
+        <p:cNvPr id="1" name=""/>
+        <p:cNvGrpSpPr/>
+        <p:nvPr/>
+      </p:nvGrpSpPr>
+      <p:grpSpPr>
+        <a:xfrm>
+          <a:off x="0" y="0"/>
+          <a:ext cx="0" cy="0"/>
+          <a:chOff x="0" y="0"/>
+          <a:chExt cx="0" cy="0"/>
+        </a:xfrm>
+      </p:grpSpPr>
+      <p:sp>
+        <p:nvSpPr>
+          <p:cNvPr id="6" name="Titre 5"/>
+          <p:cNvSpPr>
+            <a:spLocks noGrp="1"/>
+          </p:cNvSpPr>
+          <p:nvPr>
+            <p:ph type="title"/>
+          </p:nvPr>
+        </p:nvSpPr>
+        <p:spPr/>
+        <p:txBody>
+          <a:bodyPr/>
+          <a:lstStyle/>
+          <a:p>
+            <a:r>
+              <a:rPr lang="fr-FR" dirty="0" smtClean="0">
+                <a:latin typeface="Cambria" pitchFamily="18" charset="0"/>
+              </a:rPr>
+              <a:t>Introduction</a:t>
+            </a:r>
+            <a:endParaRPr lang="fr-FR" dirty="0">
+              <a:latin typeface="Cambria" pitchFamily="18" charset="0"/>
+            </a:endParaRPr>
+          </a:p>
+        </p:txBody>
+      </p:sp>
+      <p:sp>
+        <p:nvSpPr>
+          <p:cNvPr id="4" name="Espace réservé du pied de page 3"/>
+          <p:cNvSpPr>
+            <a:spLocks noGrp="1"/>
+          </p:cNvSpPr>
+          <p:nvPr>
+            <p:ph type="ftr" sz="quarter" idx="11"/>
+          </p:nvPr>
+        </p:nvSpPr>
+        <p:spPr/>
+        <p:txBody>
+          <a:bodyPr/>
+          <a:lstStyle/>
+          <a:p>
+            <a:r>
+              <a:rPr lang="fr-FR" smtClean="0"/>
+              <a:t>M1 MIAGE  - 2010/2011</a:t>
+            </a:r>
+          </a:p>
+          <a:p>
+            <a:r>
+              <a:rPr lang="fr-FR" smtClean="0"/>
+              <a:t>Université de Nice Sophia Antipolis</a:t>
+            </a:r>
+            <a:endParaRPr lang="fr-BE" dirty="0"/>
+          </a:p>
+        </p:txBody>
+      </p:sp>
+      <p:sp>
+        <p:nvSpPr>
+          <p:cNvPr id="5" name="Espace réservé du numéro de diapositive 4"/>
+          <p:cNvSpPr>
+            <a:spLocks noGrp="1"/>
+          </p:cNvSpPr>
+          <p:nvPr>
+            <p:ph type="sldNum" sz="quarter" idx="12"/>
+          </p:nvPr>
+        </p:nvSpPr>
+        <p:spPr/>
+        <p:txBody>
+          <a:bodyPr/>
+          <a:lstStyle/>
+          <a:p>
+            <a:fld id="{CF4668DC-857F-487D-BFFA-8C0CA5037977}" type="slidenum">
+              <a:rPr lang="fr-BE" smtClean="0"/>
+              <a:pPr/>
+              <a:t>3</a:t>
+            </a:fld>
+            <a:r>
+              <a:rPr lang="fr-BE" smtClean="0"/>
+              <a:t> sur ?</a:t>
+            </a:r>
+            <a:endParaRPr lang="fr-BE" dirty="0"/>
+          </a:p>
+        </p:txBody>
+      </p:sp>
+      <p:sp>
+        <p:nvSpPr>
+          <p:cNvPr id="8" name="Espace réservé du contenu 7"/>
+          <p:cNvSpPr>
+            <a:spLocks noGrp="1"/>
+          </p:cNvSpPr>
+          <p:nvPr>
+            <p:ph sz="quarter" idx="13"/>
+          </p:nvPr>
+        </p:nvSpPr>
+        <p:spPr/>
+        <p:txBody>
+          <a:bodyPr>
+            <a:normAutofit/>
+          </a:bodyPr>
+          <a:lstStyle/>
+          <a:p>
+            <a:pPr marL="457200" indent="-457200">
+              <a:buFont typeface="+mj-lt"/>
+              <a:buAutoNum type="arabicPeriod"/>
+            </a:pPr>
+            <a:r>
+              <a:rPr lang="fr-FR" sz="1400" dirty="0" smtClean="0">
+                <a:solidFill>
+                  <a:srgbClr val="D8FBC1"/>
+                </a:solidFill>
+                <a:latin typeface="Cambria" pitchFamily="18" charset="0"/>
+              </a:rPr>
+              <a:t>Introduction</a:t>
+            </a:r>
+          </a:p>
+          <a:p>
+            <a:pPr marL="457200" indent="-457200">
+              <a:buFont typeface="+mj-lt"/>
+              <a:buAutoNum type="arabicPeriod"/>
+            </a:pPr>
+            <a:endParaRPr lang="fr-FR" sz="1400" dirty="0" smtClean="0">
+              <a:solidFill>
+                <a:srgbClr val="D8FBC1"/>
+              </a:solidFill>
+              <a:latin typeface="Cambria" pitchFamily="18" charset="0"/>
+            </a:endParaRPr>
+          </a:p>
+          <a:p>
+            <a:pPr marL="457200" indent="-457200">
+              <a:buFont typeface="+mj-lt"/>
+              <a:buAutoNum type="arabicPeriod"/>
+            </a:pPr>
+            <a:r>
+              <a:rPr lang="fr-FR" sz="1400" dirty="0" smtClean="0">
+                <a:solidFill>
+                  <a:srgbClr val="A4CA39"/>
+                </a:solidFill>
+                <a:latin typeface="Cambria" pitchFamily="18" charset="0"/>
+              </a:rPr>
+              <a:t>Déroulement du projet</a:t>
+            </a:r>
+          </a:p>
+          <a:p>
+            <a:pPr marL="457200" indent="-457200">
+              <a:buFont typeface="+mj-lt"/>
+              <a:buAutoNum type="arabicPeriod"/>
+            </a:pPr>
+            <a:endParaRPr lang="fr-FR" sz="1400" dirty="0" smtClean="0">
+              <a:solidFill>
+                <a:srgbClr val="A4CA39"/>
+              </a:solidFill>
+              <a:latin typeface="Cambria" pitchFamily="18" charset="0"/>
+            </a:endParaRPr>
+          </a:p>
+          <a:p>
+            <a:pPr marL="457200" indent="-457200">
+              <a:buFont typeface="+mj-lt"/>
+              <a:buAutoNum type="arabicPeriod"/>
+            </a:pPr>
+            <a:r>
+              <a:rPr lang="fr-FR" sz="1400" dirty="0" smtClean="0">
+                <a:solidFill>
+                  <a:srgbClr val="A4CA39"/>
+                </a:solidFill>
+                <a:latin typeface="Cambria" pitchFamily="18" charset="0"/>
+              </a:rPr>
+              <a:t>Outils et méthodologies utilisés</a:t>
+            </a:r>
+          </a:p>
+          <a:p>
+            <a:pPr marL="457200" indent="-457200">
+              <a:buFont typeface="+mj-lt"/>
+              <a:buAutoNum type="arabicPeriod"/>
+            </a:pPr>
+            <a:endParaRPr lang="fr-FR" sz="1400" dirty="0" smtClean="0">
+              <a:solidFill>
+                <a:srgbClr val="A4CA39"/>
+              </a:solidFill>
+              <a:latin typeface="Cambria" pitchFamily="18" charset="0"/>
+            </a:endParaRPr>
+          </a:p>
+          <a:p>
+            <a:pPr marL="457200" indent="-457200">
+              <a:buFont typeface="+mj-lt"/>
+              <a:buAutoNum type="arabicPeriod"/>
+            </a:pPr>
+            <a:r>
+              <a:rPr lang="fr-FR" sz="1400" dirty="0" smtClean="0">
+                <a:solidFill>
+                  <a:srgbClr val="A4CA39"/>
+                </a:solidFill>
+                <a:latin typeface="Cambria" pitchFamily="18" charset="0"/>
+              </a:rPr>
+              <a:t>Démonstration</a:t>
+            </a:r>
+          </a:p>
+          <a:p>
+            <a:pPr marL="457200" indent="-457200">
+              <a:buFont typeface="+mj-lt"/>
+              <a:buAutoNum type="arabicPeriod"/>
+            </a:pPr>
+            <a:endParaRPr lang="fr-FR" sz="1400" dirty="0" smtClean="0">
+              <a:solidFill>
+                <a:srgbClr val="A4CA39"/>
+              </a:solidFill>
+              <a:latin typeface="Cambria" pitchFamily="18" charset="0"/>
+            </a:endParaRPr>
+          </a:p>
+          <a:p>
+            <a:pPr marL="457200" indent="-457200">
+              <a:buFont typeface="+mj-lt"/>
+              <a:buAutoNum type="arabicPeriod"/>
+            </a:pPr>
+            <a:r>
+              <a:rPr lang="fr-FR" sz="1400" dirty="0" smtClean="0">
+                <a:solidFill>
+                  <a:srgbClr val="A4CA39"/>
+                </a:solidFill>
+                <a:latin typeface="Cambria" pitchFamily="18" charset="0"/>
+              </a:rPr>
+              <a:t>Conclusion</a:t>
+            </a:r>
+            <a:endParaRPr lang="fr-FR" sz="1400" dirty="0">
+              <a:solidFill>
+                <a:srgbClr val="A4CA39"/>
+              </a:solidFill>
+              <a:latin typeface="Cambria" pitchFamily="18" charset="0"/>
+            </a:endParaRPr>
+          </a:p>
+        </p:txBody>
+      </p:sp>
+      <p:sp>
+        <p:nvSpPr>
+          <p:cNvPr id="9" name="Espace réservé du contenu 8"/>
+          <p:cNvSpPr>
+            <a:spLocks noGrp="1"/>
+          </p:cNvSpPr>
+          <p:nvPr>
+            <p:ph sz="quarter" idx="14"/>
+          </p:nvPr>
+        </p:nvSpPr>
+        <p:spPr/>
+        <p:txBody>
+          <a:bodyPr/>
+          <a:lstStyle/>
+          <a:p>
+            <a:endParaRPr lang="fr-FR" dirty="0"/>
+          </a:p>
+        </p:txBody>
+      </p:sp>
+    </p:spTree>
+  </p:cSld>
+  <p:clrMapOvr>
+    <a:masterClrMapping/>
+  </p:clrMapOvr>
+  <p:transition>
+    <p:randomBar/>
+  </p:transition>
+  <p:timing>
+    <p:tnLst>
+      <p:par>
+        <p:cTn id="1" dur="indefinite" restart="never" nodeType="tmRoot"/>
+      </p:par>
+    </p:tnLst>
+  </p:timing>
+</p:sld>
+</file>
+
+<file path=ppt/slides/slide4.xml><?xml version="1.0" encoding="utf-8"?>
+<p:sld xmlns:a="http://schemas.openxmlformats.org/drawingml/2006/main" xmlns:r="http://schemas.openxmlformats.org/officeDocument/2006/relationships" xmlns:p="http://schemas.openxmlformats.org/presentationml/2006/main">
+  <p:cSld>
+    <p:spTree>
+      <p:nvGrpSpPr>
+        <p:cNvPr id="1" name=""/>
+        <p:cNvGrpSpPr/>
+        <p:nvPr/>
+      </p:nvGrpSpPr>
+      <p:grpSpPr>
+        <a:xfrm>
+          <a:off x="0" y="0"/>
+          <a:ext cx="0" cy="0"/>
+          <a:chOff x="0" y="0"/>
+          <a:chExt cx="0" cy="0"/>
+        </a:xfrm>
+      </p:grpSpPr>
+      <p:sp>
+        <p:nvSpPr>
+          <p:cNvPr id="6" name="Titre 5"/>
+          <p:cNvSpPr>
+            <a:spLocks noGrp="1"/>
+          </p:cNvSpPr>
+          <p:nvPr>
+            <p:ph type="title"/>
+          </p:nvPr>
+        </p:nvSpPr>
+        <p:spPr/>
+        <p:txBody>
+          <a:bodyPr/>
+          <a:lstStyle/>
+          <a:p>
+            <a:r>
+              <a:rPr lang="fr-FR" dirty="0" smtClean="0">
+                <a:latin typeface="Cambria" pitchFamily="18" charset="0"/>
+              </a:rPr>
+              <a:t>Déroulement du projet</a:t>
+            </a:r>
+            <a:endParaRPr lang="fr-FR" dirty="0">
+              <a:latin typeface="Cambria" pitchFamily="18" charset="0"/>
+            </a:endParaRPr>
+          </a:p>
+        </p:txBody>
+      </p:sp>
+      <p:sp>
+        <p:nvSpPr>
+          <p:cNvPr id="4" name="Espace réservé du pied de page 3"/>
+          <p:cNvSpPr>
+            <a:spLocks noGrp="1"/>
+          </p:cNvSpPr>
+          <p:nvPr>
+            <p:ph type="ftr" sz="quarter" idx="11"/>
+          </p:nvPr>
+        </p:nvSpPr>
+        <p:spPr/>
+        <p:txBody>
+          <a:bodyPr/>
+          <a:lstStyle/>
+          <a:p>
+            <a:r>
+              <a:rPr lang="fr-FR" smtClean="0"/>
+              <a:t>M1 MIAGE  - 2010/2011</a:t>
+            </a:r>
+          </a:p>
+          <a:p>
+            <a:r>
+              <a:rPr lang="fr-FR" smtClean="0"/>
+              <a:t>Université de Nice Sophia Antipolis</a:t>
+            </a:r>
+            <a:endParaRPr lang="fr-BE" dirty="0"/>
+          </a:p>
+        </p:txBody>
+      </p:sp>
+      <p:sp>
+        <p:nvSpPr>
+          <p:cNvPr id="5" name="Espace réservé du numéro de diapositive 4"/>
+          <p:cNvSpPr>
+            <a:spLocks noGrp="1"/>
+          </p:cNvSpPr>
+          <p:nvPr>
+            <p:ph type="sldNum" sz="quarter" idx="12"/>
+          </p:nvPr>
+        </p:nvSpPr>
+        <p:spPr/>
+        <p:txBody>
+          <a:bodyPr/>
+          <a:lstStyle/>
+          <a:p>
+            <a:fld id="{CF4668DC-857F-487D-BFFA-8C0CA5037977}" type="slidenum">
+              <a:rPr lang="fr-BE" smtClean="0"/>
+              <a:pPr/>
+              <a:t>4</a:t>
+            </a:fld>
+            <a:r>
+              <a:rPr lang="fr-BE" smtClean="0"/>
+              <a:t> sur ?</a:t>
+            </a:r>
+            <a:endParaRPr lang="fr-BE" dirty="0"/>
+          </a:p>
+        </p:txBody>
+      </p:sp>
+      <p:sp>
+        <p:nvSpPr>
+          <p:cNvPr id="8" name="Espace réservé du contenu 7"/>
+          <p:cNvSpPr>
+            <a:spLocks noGrp="1"/>
+          </p:cNvSpPr>
+          <p:nvPr>
+            <p:ph sz="quarter" idx="13"/>
+          </p:nvPr>
+        </p:nvSpPr>
+        <p:spPr/>
+        <p:txBody>
+          <a:bodyPr>
+            <a:normAutofit/>
+          </a:bodyPr>
+          <a:lstStyle/>
+          <a:p>
+            <a:pPr marL="457200" indent="-457200">
+              <a:buFont typeface="+mj-lt"/>
+              <a:buAutoNum type="arabicPeriod"/>
+            </a:pPr>
+            <a:r>
+              <a:rPr lang="fr-FR" sz="1400" dirty="0" smtClean="0">
+                <a:solidFill>
+                  <a:srgbClr val="A4CA39"/>
+                </a:solidFill>
+                <a:latin typeface="Cambria" pitchFamily="18" charset="0"/>
+              </a:rPr>
+              <a:t>Introduction</a:t>
+            </a:r>
+          </a:p>
+          <a:p>
+            <a:pPr marL="457200" indent="-457200">
+              <a:buFont typeface="+mj-lt"/>
+              <a:buAutoNum type="arabicPeriod"/>
+            </a:pPr>
+            <a:endParaRPr lang="fr-FR" sz="1400" dirty="0" smtClean="0">
+              <a:solidFill>
+                <a:srgbClr val="D8FBC1"/>
+              </a:solidFill>
+              <a:latin typeface="Cambria" pitchFamily="18" charset="0"/>
+            </a:endParaRPr>
+          </a:p>
+          <a:p>
+            <a:pPr marL="457200" indent="-457200">
+              <a:buFont typeface="+mj-lt"/>
+              <a:buAutoNum type="arabicPeriod"/>
+            </a:pPr>
+            <a:r>
+              <a:rPr lang="fr-FR" sz="1400" dirty="0" smtClean="0">
+                <a:solidFill>
+                  <a:srgbClr val="C0F9A9"/>
+                </a:solidFill>
+                <a:latin typeface="Cambria" pitchFamily="18" charset="0"/>
+              </a:rPr>
+              <a:t>Déroulement du projet</a:t>
+            </a:r>
+          </a:p>
+          <a:p>
+            <a:pPr marL="457200" indent="-457200">
+              <a:buFont typeface="+mj-lt"/>
+              <a:buAutoNum type="arabicPeriod"/>
+            </a:pPr>
+            <a:endParaRPr lang="fr-FR" sz="1400" dirty="0" smtClean="0">
+              <a:solidFill>
+                <a:srgbClr val="A4CA39"/>
+              </a:solidFill>
+              <a:latin typeface="Cambria" pitchFamily="18" charset="0"/>
+            </a:endParaRPr>
+          </a:p>
+          <a:p>
+            <a:pPr marL="457200" indent="-457200">
+              <a:buFont typeface="+mj-lt"/>
+              <a:buAutoNum type="arabicPeriod"/>
+            </a:pPr>
+            <a:r>
+              <a:rPr lang="fr-FR" sz="1400" dirty="0" smtClean="0">
+                <a:solidFill>
+                  <a:srgbClr val="A4CA39"/>
+                </a:solidFill>
+                <a:latin typeface="Cambria" pitchFamily="18" charset="0"/>
+              </a:rPr>
+              <a:t>Outils et méthodologies utilisés</a:t>
+            </a:r>
+          </a:p>
+          <a:p>
+            <a:pPr marL="457200" indent="-457200">
+              <a:buFont typeface="+mj-lt"/>
+              <a:buAutoNum type="arabicPeriod"/>
+            </a:pPr>
+            <a:endParaRPr lang="fr-FR" sz="1400" dirty="0" smtClean="0">
+              <a:solidFill>
+                <a:srgbClr val="A4CA39"/>
+              </a:solidFill>
+              <a:latin typeface="Cambria" pitchFamily="18" charset="0"/>
+            </a:endParaRPr>
+          </a:p>
+          <a:p>
+            <a:pPr marL="457200" indent="-457200">
+              <a:buFont typeface="+mj-lt"/>
+              <a:buAutoNum type="arabicPeriod"/>
+            </a:pPr>
+            <a:r>
+              <a:rPr lang="fr-FR" sz="1400" dirty="0" smtClean="0">
+                <a:solidFill>
+                  <a:srgbClr val="A4CA39"/>
+                </a:solidFill>
+                <a:latin typeface="Cambria" pitchFamily="18" charset="0"/>
+              </a:rPr>
+              <a:t>Démonstration</a:t>
+            </a:r>
+          </a:p>
+          <a:p>
+            <a:pPr marL="457200" indent="-457200">
+              <a:buFont typeface="+mj-lt"/>
+              <a:buAutoNum type="arabicPeriod"/>
+            </a:pPr>
+            <a:endParaRPr lang="fr-FR" sz="1400" dirty="0" smtClean="0">
+              <a:solidFill>
+                <a:srgbClr val="A4CA39"/>
+              </a:solidFill>
+              <a:latin typeface="Cambria" pitchFamily="18" charset="0"/>
+            </a:endParaRPr>
+          </a:p>
+          <a:p>
+            <a:pPr marL="457200" indent="-457200">
+              <a:buFont typeface="+mj-lt"/>
+              <a:buAutoNum type="arabicPeriod"/>
+            </a:pPr>
+            <a:r>
+              <a:rPr lang="fr-FR" sz="1400" dirty="0" smtClean="0">
+                <a:solidFill>
+                  <a:srgbClr val="A4CA39"/>
+                </a:solidFill>
+                <a:latin typeface="Cambria" pitchFamily="18" charset="0"/>
+              </a:rPr>
+              <a:t>Conclusion</a:t>
+            </a:r>
+            <a:endParaRPr lang="fr-FR" sz="1400" dirty="0">
+              <a:solidFill>
+                <a:srgbClr val="A4CA39"/>
+              </a:solidFill>
+              <a:latin typeface="Cambria" pitchFamily="18" charset="0"/>
+            </a:endParaRPr>
+          </a:p>
+        </p:txBody>
+      </p:sp>
+      <p:sp>
+        <p:nvSpPr>
+          <p:cNvPr id="9" name="Espace réservé du contenu 8"/>
+          <p:cNvSpPr>
+            <a:spLocks noGrp="1"/>
+          </p:cNvSpPr>
+          <p:nvPr>
+            <p:ph sz="quarter" idx="14"/>
+          </p:nvPr>
+        </p:nvSpPr>
+        <p:spPr/>
+        <p:txBody>
+          <a:bodyPr/>
+          <a:lstStyle/>
+          <a:p>
+            <a:endParaRPr lang="fr-FR" dirty="0"/>
+          </a:p>
+        </p:txBody>
+      </p:sp>
+    </p:spTree>
+  </p:cSld>
+  <p:clrMapOvr>
+    <a:masterClrMapping/>
+  </p:clrMapOvr>
+  <p:transition>
+    <p:fade/>
+  </p:transition>
+  <p:timing>
+    <p:tnLst>
+      <p:par>
+        <p:cTn id="1" dur="indefinite" restart="never" nodeType="tmRoot"/>
+      </p:par>
+    </p:tnLst>
+  </p:timing>
+</p:sld>
+</file>
+
+<file path=ppt/slides/slide5.xml><?xml version="1.0" encoding="utf-8"?>
+<p:sld xmlns:a="http://schemas.openxmlformats.org/drawingml/2006/main" xmlns:r="http://schemas.openxmlformats.org/officeDocument/2006/relationships" xmlns:p="http://schemas.openxmlformats.org/presentationml/2006/main">
+  <p:cSld>
+    <p:spTree>
+      <p:nvGrpSpPr>
+        <p:cNvPr id="1" name=""/>
+        <p:cNvGrpSpPr/>
+        <p:nvPr/>
+      </p:nvGrpSpPr>
+      <p:grpSpPr>
+        <a:xfrm>
+          <a:off x="0" y="0"/>
+          <a:ext cx="0" cy="0"/>
+          <a:chOff x="0" y="0"/>
+          <a:chExt cx="0" cy="0"/>
+        </a:xfrm>
+      </p:grpSpPr>
+      <p:sp>
+        <p:nvSpPr>
+          <p:cNvPr id="6" name="Titre 5"/>
+          <p:cNvSpPr>
+            <a:spLocks noGrp="1"/>
+          </p:cNvSpPr>
+          <p:nvPr>
+            <p:ph type="title"/>
+          </p:nvPr>
+        </p:nvSpPr>
+        <p:spPr/>
+        <p:txBody>
+          <a:bodyPr/>
+          <a:lstStyle/>
+          <a:p>
+            <a:r>
+              <a:rPr lang="fr-FR" dirty="0" smtClean="0">
+                <a:latin typeface="Cambria" pitchFamily="18" charset="0"/>
+              </a:rPr>
+              <a:t>Outils et méthodologies utilisés</a:t>
+            </a:r>
+            <a:endParaRPr lang="fr-FR" dirty="0">
+              <a:latin typeface="Cambria" pitchFamily="18" charset="0"/>
+            </a:endParaRPr>
+          </a:p>
+        </p:txBody>
+      </p:sp>
+      <p:sp>
+        <p:nvSpPr>
+          <p:cNvPr id="4" name="Espace réservé du pied de page 3"/>
+          <p:cNvSpPr>
+            <a:spLocks noGrp="1"/>
+          </p:cNvSpPr>
+          <p:nvPr>
+            <p:ph type="ftr" sz="quarter" idx="11"/>
+          </p:nvPr>
+        </p:nvSpPr>
+        <p:spPr/>
+        <p:txBody>
+          <a:bodyPr/>
+          <a:lstStyle/>
+          <a:p>
+            <a:r>
+              <a:rPr lang="fr-FR" smtClean="0"/>
+              <a:t>M1 MIAGE  - 2010/2011</a:t>
+            </a:r>
+          </a:p>
+          <a:p>
+            <a:r>
+              <a:rPr lang="fr-FR" smtClean="0"/>
+              <a:t>Université de Nice Sophia Antipolis</a:t>
+            </a:r>
+            <a:endParaRPr lang="fr-BE" dirty="0"/>
+          </a:p>
+        </p:txBody>
+      </p:sp>
+      <p:sp>
+        <p:nvSpPr>
+          <p:cNvPr id="5" name="Espace réservé du numéro de diapositive 4"/>
+          <p:cNvSpPr>
+            <a:spLocks noGrp="1"/>
+          </p:cNvSpPr>
+          <p:nvPr>
+            <p:ph type="sldNum" sz="quarter" idx="12"/>
+          </p:nvPr>
+        </p:nvSpPr>
+        <p:spPr/>
+        <p:txBody>
+          <a:bodyPr/>
+          <a:lstStyle/>
+          <a:p>
+            <a:fld id="{CF4668DC-857F-487D-BFFA-8C0CA5037977}" type="slidenum">
+              <a:rPr lang="fr-BE" smtClean="0"/>
+              <a:pPr/>
+              <a:t>5</a:t>
+            </a:fld>
+            <a:r>
+              <a:rPr lang="fr-BE" smtClean="0"/>
+              <a:t> sur ?</a:t>
+            </a:r>
+            <a:endParaRPr lang="fr-BE" dirty="0"/>
+          </a:p>
+        </p:txBody>
+      </p:sp>
+      <p:sp>
+        <p:nvSpPr>
+          <p:cNvPr id="8" name="Espace réservé du contenu 7"/>
+          <p:cNvSpPr>
+            <a:spLocks noGrp="1"/>
+          </p:cNvSpPr>
+          <p:nvPr>
+            <p:ph sz="quarter" idx="13"/>
+          </p:nvPr>
+        </p:nvSpPr>
+        <p:spPr/>
+        <p:txBody>
+          <a:bodyPr>
+            <a:normAutofit/>
+          </a:bodyPr>
+          <a:lstStyle/>
+          <a:p>
+            <a:pPr marL="457200" indent="-457200">
+              <a:buFont typeface="+mj-lt"/>
+              <a:buAutoNum type="arabicPeriod"/>
+            </a:pPr>
+            <a:r>
+              <a:rPr lang="fr-FR" sz="1400" dirty="0" smtClean="0">
+                <a:solidFill>
+                  <a:srgbClr val="A4CA39"/>
+                </a:solidFill>
+                <a:latin typeface="Cambria" pitchFamily="18" charset="0"/>
+              </a:rPr>
+              <a:t>Introduction</a:t>
+            </a:r>
+          </a:p>
+          <a:p>
+            <a:pPr marL="457200" indent="-457200">
+              <a:buFont typeface="+mj-lt"/>
+              <a:buAutoNum type="arabicPeriod"/>
+            </a:pPr>
+            <a:endParaRPr lang="fr-FR" sz="1400" dirty="0" smtClean="0">
+              <a:solidFill>
+                <a:srgbClr val="D8FBC1"/>
+              </a:solidFill>
+              <a:latin typeface="Cambria" pitchFamily="18" charset="0"/>
+            </a:endParaRPr>
+          </a:p>
+          <a:p>
+            <a:pPr marL="457200" indent="-457200">
+              <a:buFont typeface="+mj-lt"/>
+              <a:buAutoNum type="arabicPeriod"/>
+            </a:pPr>
+            <a:r>
+              <a:rPr lang="fr-FR" sz="1400" dirty="0" smtClean="0">
+                <a:solidFill>
+                  <a:srgbClr val="A4CA39"/>
+                </a:solidFill>
+                <a:latin typeface="Cambria" pitchFamily="18" charset="0"/>
+              </a:rPr>
+              <a:t>Déroulement du projet</a:t>
+            </a:r>
+          </a:p>
+          <a:p>
+            <a:pPr marL="457200" indent="-457200">
+              <a:buFont typeface="+mj-lt"/>
+              <a:buAutoNum type="arabicPeriod"/>
+            </a:pPr>
+            <a:endParaRPr lang="fr-FR" sz="1400" dirty="0" smtClean="0">
+              <a:solidFill>
+                <a:srgbClr val="A4CA39"/>
+              </a:solidFill>
+              <a:latin typeface="Cambria" pitchFamily="18" charset="0"/>
+            </a:endParaRPr>
+          </a:p>
+          <a:p>
+            <a:pPr marL="457200" indent="-457200">
+              <a:buFont typeface="+mj-lt"/>
+              <a:buAutoNum type="arabicPeriod"/>
+            </a:pPr>
+            <a:r>
+              <a:rPr lang="fr-FR" sz="1400" dirty="0" smtClean="0">
+                <a:solidFill>
+                  <a:srgbClr val="C0F9A9"/>
+                </a:solidFill>
+                <a:latin typeface="Cambria" pitchFamily="18" charset="0"/>
+              </a:rPr>
+              <a:t>Outils et méthodologies utilisés</a:t>
+            </a:r>
+          </a:p>
+          <a:p>
+            <a:pPr marL="457200" indent="-457200">
+              <a:buFont typeface="+mj-lt"/>
+              <a:buAutoNum type="arabicPeriod"/>
+            </a:pPr>
+            <a:endParaRPr lang="fr-FR" sz="1400" dirty="0" smtClean="0">
+              <a:solidFill>
+                <a:srgbClr val="A4CA39"/>
+              </a:solidFill>
+              <a:latin typeface="Cambria" pitchFamily="18" charset="0"/>
+            </a:endParaRPr>
+          </a:p>
+          <a:p>
+            <a:pPr marL="457200" indent="-457200">
+              <a:buFont typeface="+mj-lt"/>
+              <a:buAutoNum type="arabicPeriod"/>
+            </a:pPr>
+            <a:r>
+              <a:rPr lang="fr-FR" sz="1400" dirty="0" smtClean="0">
+                <a:solidFill>
+                  <a:srgbClr val="A4CA39"/>
+                </a:solidFill>
+                <a:latin typeface="Cambria" pitchFamily="18" charset="0"/>
+              </a:rPr>
+              <a:t>Démonstration</a:t>
+            </a:r>
+          </a:p>
+          <a:p>
+            <a:pPr marL="457200" indent="-457200">
+              <a:buFont typeface="+mj-lt"/>
+              <a:buAutoNum type="arabicPeriod"/>
+            </a:pPr>
+            <a:endParaRPr lang="fr-FR" sz="1400" dirty="0" smtClean="0">
+              <a:solidFill>
+                <a:srgbClr val="A4CA39"/>
+              </a:solidFill>
+              <a:latin typeface="Cambria" pitchFamily="18" charset="0"/>
+            </a:endParaRPr>
+          </a:p>
+          <a:p>
+            <a:pPr marL="457200" indent="-457200">
+              <a:buFont typeface="+mj-lt"/>
+              <a:buAutoNum type="arabicPeriod"/>
+            </a:pPr>
+            <a:r>
+              <a:rPr lang="fr-FR" sz="1400" dirty="0" smtClean="0">
+                <a:solidFill>
+                  <a:srgbClr val="A4CA39"/>
+                </a:solidFill>
+                <a:latin typeface="Cambria" pitchFamily="18" charset="0"/>
+              </a:rPr>
+              <a:t>Conclusion</a:t>
+            </a:r>
+            <a:endParaRPr lang="fr-FR" sz="1400" dirty="0">
+              <a:solidFill>
+                <a:srgbClr val="A4CA39"/>
+              </a:solidFill>
+              <a:latin typeface="Cambria" pitchFamily="18" charset="0"/>
+            </a:endParaRPr>
+          </a:p>
+        </p:txBody>
+      </p:sp>
+      <p:sp>
+        <p:nvSpPr>
+          <p:cNvPr id="9" name="Espace réservé du contenu 8"/>
+          <p:cNvSpPr>
+            <a:spLocks noGrp="1"/>
+          </p:cNvSpPr>
+          <p:nvPr>
+            <p:ph sz="quarter" idx="14"/>
+          </p:nvPr>
+        </p:nvSpPr>
+        <p:spPr/>
+        <p:txBody>
+          <a:bodyPr/>
+          <a:lstStyle/>
+          <a:p>
+            <a:endParaRPr lang="fr-FR" dirty="0"/>
+          </a:p>
+        </p:txBody>
+      </p:sp>
+    </p:spTree>
+  </p:cSld>
+  <p:clrMapOvr>
+    <a:masterClrMapping/>
+  </p:clrMapOvr>
+  <p:transition>
+    <p:fade/>
+  </p:transition>
+  <p:timing>
+    <p:tnLst>
+      <p:par>
+        <p:cTn id="1" dur="indefinite" restart="never" nodeType="tmRoot"/>
+      </p:par>
+    </p:tnLst>
+  </p:timing>
+</p:sld>
+</file>
+
+<file path=ppt/slides/slide6.xml><?xml version="1.0" encoding="utf-8"?>
+<p:sld xmlns:a="http://schemas.openxmlformats.org/drawingml/2006/main" xmlns:r="http://schemas.openxmlformats.org/officeDocument/2006/relationships" xmlns:p="http://schemas.openxmlformats.org/presentationml/2006/main">
+  <p:cSld>
+    <p:spTree>
+      <p:nvGrpSpPr>
+        <p:cNvPr id="1" name=""/>
+        <p:cNvGrpSpPr/>
+        <p:nvPr/>
+      </p:nvGrpSpPr>
+      <p:grpSpPr>
+        <a:xfrm>
+          <a:off x="0" y="0"/>
+          <a:ext cx="0" cy="0"/>
+          <a:chOff x="0" y="0"/>
+          <a:chExt cx="0" cy="0"/>
+        </a:xfrm>
+      </p:grpSpPr>
+      <p:sp>
+        <p:nvSpPr>
+          <p:cNvPr id="6" name="Titre 5"/>
+          <p:cNvSpPr>
+            <a:spLocks noGrp="1"/>
+          </p:cNvSpPr>
+          <p:nvPr>
+            <p:ph type="title"/>
+          </p:nvPr>
+        </p:nvSpPr>
+        <p:spPr/>
+        <p:txBody>
+          <a:bodyPr/>
+          <a:lstStyle/>
+          <a:p>
+            <a:r>
+              <a:rPr lang="fr-FR" dirty="0" smtClean="0">
+                <a:latin typeface="Cambria" pitchFamily="18" charset="0"/>
+              </a:rPr>
+              <a:t>Démonstration</a:t>
+            </a:r>
+            <a:endParaRPr lang="fr-FR" dirty="0">
+              <a:latin typeface="Cambria" pitchFamily="18" charset="0"/>
+            </a:endParaRPr>
+          </a:p>
+        </p:txBody>
+      </p:sp>
+      <p:sp>
+        <p:nvSpPr>
+          <p:cNvPr id="4" name="Espace réservé du pied de page 3"/>
+          <p:cNvSpPr>
+            <a:spLocks noGrp="1"/>
+          </p:cNvSpPr>
+          <p:nvPr>
+            <p:ph type="ftr" sz="quarter" idx="11"/>
+          </p:nvPr>
+        </p:nvSpPr>
+        <p:spPr/>
+        <p:txBody>
+          <a:bodyPr/>
+          <a:lstStyle/>
+          <a:p>
+            <a:r>
+              <a:rPr lang="fr-FR" smtClean="0"/>
+              <a:t>M1 MIAGE  - 2010/2011</a:t>
+            </a:r>
+          </a:p>
+          <a:p>
+            <a:r>
+              <a:rPr lang="fr-FR" smtClean="0"/>
+              <a:t>Université de Nice Sophia Antipolis</a:t>
+            </a:r>
+            <a:endParaRPr lang="fr-BE" dirty="0"/>
+          </a:p>
+        </p:txBody>
+      </p:sp>
+      <p:sp>
+        <p:nvSpPr>
+          <p:cNvPr id="5" name="Espace réservé du numéro de diapositive 4"/>
+          <p:cNvSpPr>
+            <a:spLocks noGrp="1"/>
+          </p:cNvSpPr>
+          <p:nvPr>
+            <p:ph type="sldNum" sz="quarter" idx="12"/>
+          </p:nvPr>
+        </p:nvSpPr>
+        <p:spPr/>
+        <p:txBody>
+          <a:bodyPr/>
+          <a:lstStyle/>
+          <a:p>
+            <a:fld id="{CF4668DC-857F-487D-BFFA-8C0CA5037977}" type="slidenum">
+              <a:rPr lang="fr-BE" smtClean="0"/>
+              <a:pPr/>
+              <a:t>6</a:t>
+            </a:fld>
+            <a:r>
+              <a:rPr lang="fr-BE" smtClean="0"/>
+              <a:t> sur ?</a:t>
+            </a:r>
+            <a:endParaRPr lang="fr-BE" dirty="0"/>
+          </a:p>
+        </p:txBody>
+      </p:sp>
+      <p:sp>
+        <p:nvSpPr>
+          <p:cNvPr id="8" name="Espace réservé du contenu 7"/>
+          <p:cNvSpPr>
+            <a:spLocks noGrp="1"/>
+          </p:cNvSpPr>
+          <p:nvPr>
+            <p:ph sz="quarter" idx="13"/>
+          </p:nvPr>
+        </p:nvSpPr>
+        <p:spPr/>
+        <p:txBody>
+          <a:bodyPr>
+            <a:normAutofit/>
+          </a:bodyPr>
+          <a:lstStyle/>
+          <a:p>
+            <a:pPr marL="457200" indent="-457200">
+              <a:buFont typeface="+mj-lt"/>
+              <a:buAutoNum type="arabicPeriod"/>
+            </a:pPr>
+            <a:r>
+              <a:rPr lang="fr-FR" sz="1400" dirty="0" smtClean="0">
+                <a:solidFill>
+                  <a:srgbClr val="A4CA39"/>
+                </a:solidFill>
+                <a:latin typeface="Cambria" pitchFamily="18" charset="0"/>
+              </a:rPr>
+              <a:t>Introduction</a:t>
+            </a:r>
+          </a:p>
+          <a:p>
+            <a:pPr marL="457200" indent="-457200">
+              <a:buFont typeface="+mj-lt"/>
+              <a:buAutoNum type="arabicPeriod"/>
+            </a:pPr>
+            <a:endParaRPr lang="fr-FR" sz="1400" dirty="0" smtClean="0">
+              <a:solidFill>
+                <a:srgbClr val="D8FBC1"/>
+              </a:solidFill>
+              <a:latin typeface="Cambria" pitchFamily="18" charset="0"/>
+            </a:endParaRPr>
+          </a:p>
+          <a:p>
+            <a:pPr marL="457200" indent="-457200">
+              <a:buFont typeface="+mj-lt"/>
+              <a:buAutoNum type="arabicPeriod"/>
+            </a:pPr>
+            <a:r>
+              <a:rPr lang="fr-FR" sz="1400" dirty="0" smtClean="0">
+                <a:solidFill>
+                  <a:srgbClr val="A4CA39"/>
+                </a:solidFill>
+                <a:latin typeface="Cambria" pitchFamily="18" charset="0"/>
+              </a:rPr>
+              <a:t>Déroulement du projet</a:t>
+            </a:r>
+          </a:p>
+          <a:p>
+            <a:pPr marL="457200" indent="-457200">
+              <a:buFont typeface="+mj-lt"/>
+              <a:buAutoNum type="arabicPeriod"/>
+            </a:pPr>
+            <a:endParaRPr lang="fr-FR" sz="1400" dirty="0" smtClean="0">
+              <a:solidFill>
+                <a:srgbClr val="A4CA39"/>
+              </a:solidFill>
+              <a:latin typeface="Cambria" pitchFamily="18" charset="0"/>
+            </a:endParaRPr>
+          </a:p>
+          <a:p>
+            <a:pPr marL="457200" indent="-457200">
+              <a:buFont typeface="+mj-lt"/>
+              <a:buAutoNum type="arabicPeriod"/>
+            </a:pPr>
+            <a:r>
+              <a:rPr lang="fr-FR" sz="1400" dirty="0" smtClean="0">
+                <a:solidFill>
+                  <a:srgbClr val="A4CA39"/>
+                </a:solidFill>
+                <a:latin typeface="Cambria" pitchFamily="18" charset="0"/>
+              </a:rPr>
+              <a:t>Outils et méthodologies utilisés</a:t>
+            </a:r>
+          </a:p>
+          <a:p>
+            <a:pPr marL="457200" indent="-457200">
+              <a:buFont typeface="+mj-lt"/>
+              <a:buAutoNum type="arabicPeriod"/>
+            </a:pPr>
+            <a:endParaRPr lang="fr-FR" sz="1400" dirty="0" smtClean="0">
+              <a:solidFill>
+                <a:srgbClr val="A4CA39"/>
+              </a:solidFill>
+              <a:latin typeface="Cambria" pitchFamily="18" charset="0"/>
+            </a:endParaRPr>
+          </a:p>
+          <a:p>
+            <a:pPr marL="457200" indent="-457200">
+              <a:buFont typeface="+mj-lt"/>
+              <a:buAutoNum type="arabicPeriod"/>
+            </a:pPr>
+            <a:r>
+              <a:rPr lang="fr-FR" sz="1400" dirty="0" smtClean="0">
+                <a:solidFill>
+                  <a:srgbClr val="C0F9A9"/>
+                </a:solidFill>
+                <a:latin typeface="Cambria" pitchFamily="18" charset="0"/>
+              </a:rPr>
+              <a:t>Démonstration</a:t>
+            </a:r>
+          </a:p>
+          <a:p>
+            <a:pPr marL="457200" indent="-457200">
+              <a:buFont typeface="+mj-lt"/>
+              <a:buAutoNum type="arabicPeriod"/>
+            </a:pPr>
+            <a:endParaRPr lang="fr-FR" sz="1400" dirty="0" smtClean="0">
+              <a:solidFill>
+                <a:srgbClr val="A4CA39"/>
+              </a:solidFill>
+              <a:latin typeface="Cambria" pitchFamily="18" charset="0"/>
+            </a:endParaRPr>
+          </a:p>
+          <a:p>
+            <a:pPr marL="457200" indent="-457200">
+              <a:buFont typeface="+mj-lt"/>
+              <a:buAutoNum type="arabicPeriod"/>
+            </a:pPr>
+            <a:r>
+              <a:rPr lang="fr-FR" sz="1400" dirty="0" smtClean="0">
+                <a:solidFill>
+                  <a:srgbClr val="A4CA39"/>
+                </a:solidFill>
+                <a:latin typeface="Cambria" pitchFamily="18" charset="0"/>
+              </a:rPr>
+              <a:t>Conclusion</a:t>
+            </a:r>
+            <a:endParaRPr lang="fr-FR" sz="1400" dirty="0">
+              <a:solidFill>
+                <a:srgbClr val="A4CA39"/>
+              </a:solidFill>
+              <a:latin typeface="Cambria" pitchFamily="18" charset="0"/>
+            </a:endParaRPr>
+          </a:p>
+        </p:txBody>
+      </p:sp>
+      <p:sp>
+        <p:nvSpPr>
+          <p:cNvPr id="9" name="Espace réservé du contenu 8"/>
+          <p:cNvSpPr>
+            <a:spLocks noGrp="1"/>
+          </p:cNvSpPr>
+          <p:nvPr>
+            <p:ph sz="quarter" idx="14"/>
+          </p:nvPr>
+        </p:nvSpPr>
+        <p:spPr/>
+        <p:txBody>
+          <a:bodyPr/>
+          <a:lstStyle/>
+          <a:p>
+            <a:endParaRPr lang="fr-FR" dirty="0"/>
+          </a:p>
+        </p:txBody>
+      </p:sp>
+    </p:spTree>
+  </p:cSld>
+  <p:clrMapOvr>
+    <a:masterClrMapping/>
+  </p:clrMapOvr>
+  <p:transition>
+    <p:fade/>
+  </p:transition>
+  <p:timing>
+    <p:tnLst>
+      <p:par>
+        <p:cTn id="1" dur="indefinite" restart="never" nodeType="tmRoot"/>
+      </p:par>
+    </p:tnLst>
+  </p:timing>
+</p:sld>
+</file>
+
+<file path=ppt/slides/slide7.xml><?xml version="1.0" encoding="utf-8"?>
+<p:sld xmlns:a="http://schemas.openxmlformats.org/drawingml/2006/main" xmlns:r="http://schemas.openxmlformats.org/officeDocument/2006/relationships" xmlns:p="http://schemas.openxmlformats.org/presentationml/2006/main">
+  <p:cSld>
+    <p:spTree>
+      <p:nvGrpSpPr>
+        <p:cNvPr id="1" name=""/>
+        <p:cNvGrpSpPr/>
+        <p:nvPr/>
+      </p:nvGrpSpPr>
+      <p:grpSpPr>
+        <a:xfrm>
+          <a:off x="0" y="0"/>
+          <a:ext cx="0" cy="0"/>
+          <a:chOff x="0" y="0"/>
+          <a:chExt cx="0" cy="0"/>
+        </a:xfrm>
+      </p:grpSpPr>
+      <p:sp>
+        <p:nvSpPr>
+          <p:cNvPr id="6" name="Titre 5"/>
+          <p:cNvSpPr>
+            <a:spLocks noGrp="1"/>
+          </p:cNvSpPr>
+          <p:nvPr>
+            <p:ph type="title"/>
+          </p:nvPr>
+        </p:nvSpPr>
+        <p:spPr/>
+        <p:txBody>
+          <a:bodyPr/>
+          <a:lstStyle/>
+          <a:p>
+            <a:r>
+              <a:rPr lang="fr-FR" dirty="0" smtClean="0">
+                <a:latin typeface="Cambria" pitchFamily="18" charset="0"/>
+              </a:rPr>
+              <a:t>Conclusion</a:t>
+            </a:r>
+            <a:endParaRPr lang="fr-FR" dirty="0">
+              <a:latin typeface="Cambria" pitchFamily="18" charset="0"/>
+            </a:endParaRPr>
+          </a:p>
+        </p:txBody>
+      </p:sp>
+      <p:sp>
+        <p:nvSpPr>
+          <p:cNvPr id="4" name="Espace réservé du pied de page 3"/>
+          <p:cNvSpPr>
+            <a:spLocks noGrp="1"/>
+          </p:cNvSpPr>
+          <p:nvPr>
+            <p:ph type="ftr" sz="quarter" idx="11"/>
+          </p:nvPr>
+        </p:nvSpPr>
+        <p:spPr/>
+        <p:txBody>
+          <a:bodyPr/>
+          <a:lstStyle/>
+          <a:p>
+            <a:r>
+              <a:rPr lang="fr-FR" smtClean="0"/>
+              <a:t>M1 MIAGE  - 2010/2011</a:t>
+            </a:r>
+          </a:p>
+          <a:p>
+            <a:r>
+              <a:rPr lang="fr-FR" smtClean="0"/>
+              <a:t>Université de Nice Sophia Antipolis</a:t>
+            </a:r>
+            <a:endParaRPr lang="fr-BE" dirty="0"/>
+          </a:p>
+        </p:txBody>
+      </p:sp>
+      <p:sp>
+        <p:nvSpPr>
+          <p:cNvPr id="5" name="Espace réservé du numéro de diapositive 4"/>
+          <p:cNvSpPr>
+            <a:spLocks noGrp="1"/>
+          </p:cNvSpPr>
+          <p:nvPr>
+            <p:ph type="sldNum" sz="quarter" idx="12"/>
+          </p:nvPr>
+        </p:nvSpPr>
+        <p:spPr/>
+        <p:txBody>
+          <a:bodyPr/>
+          <a:lstStyle/>
+          <a:p>
+            <a:fld id="{CF4668DC-857F-487D-BFFA-8C0CA5037977}" type="slidenum">
+              <a:rPr lang="fr-BE" smtClean="0"/>
+              <a:pPr/>
+              <a:t>7</a:t>
+            </a:fld>
+            <a:r>
+              <a:rPr lang="fr-BE" smtClean="0"/>
+              <a:t> sur ?</a:t>
+            </a:r>
+            <a:endParaRPr lang="fr-BE" dirty="0"/>
+          </a:p>
+        </p:txBody>
+      </p:sp>
+      <p:sp>
+        <p:nvSpPr>
+          <p:cNvPr id="8" name="Espace réservé du contenu 7"/>
+          <p:cNvSpPr>
+            <a:spLocks noGrp="1"/>
+          </p:cNvSpPr>
+          <p:nvPr>
+            <p:ph sz="quarter" idx="13"/>
+          </p:nvPr>
+        </p:nvSpPr>
+        <p:spPr/>
+        <p:txBody>
+          <a:bodyPr>
+            <a:normAutofit/>
+          </a:bodyPr>
+          <a:lstStyle/>
+          <a:p>
+            <a:pPr marL="457200" indent="-457200">
+              <a:buFont typeface="+mj-lt"/>
+              <a:buAutoNum type="arabicPeriod"/>
+            </a:pPr>
+            <a:r>
+              <a:rPr lang="fr-FR" sz="1400" dirty="0" smtClean="0">
+                <a:solidFill>
+                  <a:srgbClr val="A4CA39"/>
+                </a:solidFill>
+                <a:latin typeface="Cambria" pitchFamily="18" charset="0"/>
+              </a:rPr>
+              <a:t>Introduction</a:t>
+            </a:r>
+          </a:p>
+          <a:p>
+            <a:pPr marL="457200" indent="-457200">
+              <a:buFont typeface="+mj-lt"/>
+              <a:buAutoNum type="arabicPeriod"/>
+            </a:pPr>
+            <a:endParaRPr lang="fr-FR" sz="1400" dirty="0" smtClean="0">
+              <a:solidFill>
+                <a:srgbClr val="D8FBC1"/>
+              </a:solidFill>
+              <a:latin typeface="Cambria" pitchFamily="18" charset="0"/>
+            </a:endParaRPr>
+          </a:p>
+          <a:p>
+            <a:pPr marL="457200" indent="-457200">
+              <a:buFont typeface="+mj-lt"/>
+              <a:buAutoNum type="arabicPeriod"/>
+            </a:pPr>
+            <a:r>
+              <a:rPr lang="fr-FR" sz="1400" dirty="0" smtClean="0">
+                <a:solidFill>
+                  <a:srgbClr val="A4CA39"/>
+                </a:solidFill>
+                <a:latin typeface="Cambria" pitchFamily="18" charset="0"/>
+              </a:rPr>
+              <a:t>Déroulement du projet</a:t>
+            </a:r>
+          </a:p>
+          <a:p>
+            <a:pPr marL="457200" indent="-457200">
+              <a:buFont typeface="+mj-lt"/>
+              <a:buAutoNum type="arabicPeriod"/>
+            </a:pPr>
+            <a:endParaRPr lang="fr-FR" sz="1400" dirty="0" smtClean="0">
+              <a:solidFill>
+                <a:srgbClr val="A4CA39"/>
+              </a:solidFill>
+              <a:latin typeface="Cambria" pitchFamily="18" charset="0"/>
+            </a:endParaRPr>
+          </a:p>
+          <a:p>
+            <a:pPr marL="457200" indent="-457200">
+              <a:buFont typeface="+mj-lt"/>
+              <a:buAutoNum type="arabicPeriod"/>
+            </a:pPr>
+            <a:r>
+              <a:rPr lang="fr-FR" sz="1400" dirty="0" smtClean="0">
+                <a:solidFill>
+                  <a:srgbClr val="A4CA39"/>
+                </a:solidFill>
+                <a:latin typeface="Cambria" pitchFamily="18" charset="0"/>
+              </a:rPr>
+              <a:t>Outils et méthodologies utilisés</a:t>
+            </a:r>
+          </a:p>
+          <a:p>
+            <a:pPr marL="457200" indent="-457200">
+              <a:buFont typeface="+mj-lt"/>
+              <a:buAutoNum type="arabicPeriod"/>
+            </a:pPr>
+            <a:endParaRPr lang="fr-FR" sz="1400" dirty="0" smtClean="0">
+              <a:solidFill>
+                <a:srgbClr val="A4CA39"/>
+              </a:solidFill>
+              <a:latin typeface="Cambria" pitchFamily="18" charset="0"/>
+            </a:endParaRPr>
+          </a:p>
+          <a:p>
+            <a:pPr marL="457200" indent="-457200">
+              <a:buFont typeface="+mj-lt"/>
+              <a:buAutoNum type="arabicPeriod"/>
+            </a:pPr>
+            <a:r>
+              <a:rPr lang="fr-FR" sz="1400" dirty="0" smtClean="0">
+                <a:solidFill>
+                  <a:srgbClr val="A4CA39"/>
+                </a:solidFill>
+                <a:latin typeface="Cambria" pitchFamily="18" charset="0"/>
+              </a:rPr>
+              <a:t>Démonstration</a:t>
+            </a:r>
+          </a:p>
+          <a:p>
+            <a:pPr marL="457200" indent="-457200">
+              <a:buFont typeface="+mj-lt"/>
+              <a:buAutoNum type="arabicPeriod"/>
+            </a:pPr>
+            <a:endParaRPr lang="fr-FR" sz="1400" dirty="0" smtClean="0">
+              <a:solidFill>
+                <a:srgbClr val="A4CA39"/>
+              </a:solidFill>
+              <a:latin typeface="Cambria" pitchFamily="18" charset="0"/>
+            </a:endParaRPr>
+          </a:p>
+          <a:p>
+            <a:pPr marL="457200" indent="-457200">
+              <a:buFont typeface="+mj-lt"/>
+              <a:buAutoNum type="arabicPeriod"/>
+            </a:pPr>
+            <a:r>
+              <a:rPr lang="fr-FR" sz="1400" dirty="0" smtClean="0">
+                <a:solidFill>
+                  <a:srgbClr val="C0F9A9"/>
+                </a:solidFill>
+                <a:latin typeface="Cambria" pitchFamily="18" charset="0"/>
+              </a:rPr>
+              <a:t>Conclusion</a:t>
+            </a:r>
+            <a:endParaRPr lang="fr-FR" sz="1400" dirty="0">
+              <a:solidFill>
+                <a:srgbClr val="C0F9A9"/>
+              </a:solidFill>
+              <a:latin typeface="Cambria" pitchFamily="18" charset="0"/>
+            </a:endParaRPr>
+          </a:p>
+        </p:txBody>
+      </p:sp>
+      <p:sp>
+        <p:nvSpPr>
+          <p:cNvPr id="9" name="Espace réservé du contenu 8"/>
+          <p:cNvSpPr>
+            <a:spLocks noGrp="1"/>
+          </p:cNvSpPr>
+          <p:nvPr>
+            <p:ph sz="quarter" idx="14"/>
+          </p:nvPr>
+        </p:nvSpPr>
+        <p:spPr/>
+        <p:txBody>
+          <a:bodyPr/>
+          <a:lstStyle/>
+          <a:p>
+            <a:endParaRPr lang="fr-FR" dirty="0"/>
+          </a:p>
+        </p:txBody>
+      </p:sp>
+    </p:spTree>
+  </p:cSld>
+  <p:clrMapOvr>
+    <a:masterClrMapping/>
+  </p:clrMapOvr>
+  <p:transition>
+    <p:fade/>
+  </p:transition>
+  <p:timing>
+    <p:tnLst>
+      <p:par>
+        <p:cTn id="1" dur="indefinite" restart="never" nodeType="tmRoot"/>
+      </p:par>
+    </p:tnLst>
+  </p:timing>
+</p:sld>
+</file>
+
+<file path=ppt/slides/slide8.xml><?xml version="1.0" encoding="utf-8"?>
+<p:sld xmlns:a="http://schemas.openxmlformats.org/drawingml/2006/main" xmlns:r="http://schemas.openxmlformats.org/officeDocument/2006/relationships" xmlns:p="http://schemas.openxmlformats.org/presentationml/2006/main">
+  <p:cSld>
+    <p:spTree>
+      <p:nvGrpSpPr>
+        <p:cNvPr id="1" name=""/>
+        <p:cNvGrpSpPr/>
+        <p:nvPr/>
+      </p:nvGrpSpPr>
+      <p:grpSpPr>
+        <a:xfrm>
+          <a:off x="0" y="0"/>
+          <a:ext cx="0" cy="0"/>
+          <a:chOff x="0" y="0"/>
+          <a:chExt cx="0" cy="0"/>
+        </a:xfrm>
+      </p:grpSpPr>
+      <p:sp>
+        <p:nvSpPr>
+          <p:cNvPr id="6" name="Titre 5"/>
+          <p:cNvSpPr>
+            <a:spLocks noGrp="1"/>
+          </p:cNvSpPr>
+          <p:nvPr>
+            <p:ph type="ctrTitle"/>
+          </p:nvPr>
+        </p:nvSpPr>
+        <p:spPr/>
+        <p:txBody>
+          <a:bodyPr/>
+          <a:lstStyle/>
+          <a:p>
+            <a:r>
+              <a:rPr lang="fr-FR" dirty="0" smtClean="0">
+                <a:solidFill>
+                  <a:srgbClr val="A4CA39"/>
+                </a:solidFill>
+              </a:rPr>
+              <a:t>Merci de votre attention…</a:t>
+            </a:r>
+            <a:endParaRPr lang="fr-FR" dirty="0">
+              <a:solidFill>
+                <a:srgbClr val="A4CA39"/>
+              </a:solidFill>
+            </a:endParaRPr>
+          </a:p>
+        </p:txBody>
+      </p:sp>
+      <p:sp>
+        <p:nvSpPr>
+          <p:cNvPr id="4" name="Espace réservé du pied de page 3"/>
+          <p:cNvSpPr>
+            <a:spLocks noGrp="1"/>
+          </p:cNvSpPr>
+          <p:nvPr>
+            <p:ph type="ftr" sz="quarter" idx="11"/>
+          </p:nvPr>
+        </p:nvSpPr>
+        <p:spPr/>
+        <p:txBody>
+          <a:bodyPr/>
+          <a:lstStyle/>
+          <a:p>
+            <a:r>
+              <a:rPr lang="fr-FR" smtClean="0"/>
+              <a:t>M1 MIAGE  - 2010/2011</a:t>
+            </a:r>
+          </a:p>
+          <a:p>
+            <a:r>
+              <a:rPr lang="fr-FR" smtClean="0"/>
+              <a:t>Université de Nice Sophia Antipolis</a:t>
+            </a:r>
+            <a:endParaRPr lang="fr-BE" dirty="0"/>
+          </a:p>
+        </p:txBody>
+      </p:sp>
+      <p:sp>
+        <p:nvSpPr>
+          <p:cNvPr id="5" name="Espace réservé du numéro de diapositive 4"/>
+          <p:cNvSpPr>
+            <a:spLocks noGrp="1"/>
+          </p:cNvSpPr>
+          <p:nvPr>
+            <p:ph type="sldNum" sz="quarter" idx="12"/>
+          </p:nvPr>
+        </p:nvSpPr>
+        <p:spPr/>
+        <p:txBody>
+          <a:bodyPr/>
+          <a:lstStyle/>
+          <a:p>
+            <a:fld id="{CF4668DC-857F-487D-BFFA-8C0CA5037977}" type="slidenum">
+              <a:rPr lang="fr-BE" smtClean="0"/>
+              <a:pPr/>
+              <a:t>8</a:t>
+            </a:fld>
+            <a:r>
+              <a:rPr lang="fr-BE" smtClean="0"/>
+              <a:t> sur ?</a:t>
+            </a:r>
+            <a:endParaRPr lang="fr-BE" dirty="0"/>
+          </a:p>
+        </p:txBody>
+      </p:sp>
+      <p:pic>
+        <p:nvPicPr>
+          <p:cNvPr id="11" name="Image 10" descr="bugdroid_question.PNG"/>
+          <p:cNvPicPr>
+            <a:picLocks noChangeAspect="1"/>
+          </p:cNvPicPr>
+          <p:nvPr/>
+        </p:nvPicPr>
+        <p:blipFill>
+          <a:blip r:embed="rId2" cstate="print"/>
+          <a:stretch>
+            <a:fillRect/>
+          </a:stretch>
+        </p:blipFill>
+        <p:spPr>
+          <a:xfrm>
+            <a:off x="2721564" y="1557272"/>
+            <a:ext cx="3662609" cy="4320000"/>
+          </a:xfrm>
+          <a:prstGeom prst="rect">
+            <a:avLst/>
+          </a:prstGeom>
+        </p:spPr>
+      </p:pic>
+    </p:spTree>
+  </p:cSld>
+  <p:clrMapOvr>
+    <a:masterClrMapping/>
+  </p:clrMapOvr>
+  <p:transition>
+    <p:randomBar/>
+  </p:transition>
   <p:timing>
     <p:tnLst>
       <p:par>
@@ -3407,4 +6395,287 @@
   <a:objectDefaults/>
   <a:extraClrSchemeLst/>
 </a:theme>
+</file>
+
+<file path=ppt/theme/theme2.xml><?xml version="1.0" encoding="utf-8"?>
+<a:theme xmlns:a="http://schemas.openxmlformats.org/drawingml/2006/main" name="Thème Office">
+  <a:themeElements>
+    <a:clrScheme name="Office">
+      <a:dk1>
+        <a:sysClr val="windowText" lastClr="000000"/>
+      </a:dk1>
+      <a:lt1>
+        <a:sysClr val="window" lastClr="FFFFFF"/>
+      </a:lt1>
+      <a:dk2>
+        <a:srgbClr val="1F497D"/>
+      </a:dk2>
+      <a:lt2>
+        <a:srgbClr val="EEECE1"/>
+      </a:lt2>
+      <a:accent1>
+        <a:srgbClr val="4F81BD"/>
+      </a:accent1>
+      <a:accent2>
+        <a:srgbClr val="C0504D"/>
+      </a:accent2>
+      <a:accent3>
+        <a:srgbClr val="9BBB59"/>
+      </a:accent3>
+      <a:accent4>
+        <a:srgbClr val="8064A2"/>
+      </a:accent4>
+      <a:accent5>
+        <a:srgbClr val="4BACC6"/>
+      </a:accent5>
+      <a:accent6>
+        <a:srgbClr val="F79646"/>
+      </a:accent6>
+      <a:hlink>
+        <a:srgbClr val="0000FF"/>
+      </a:hlink>
+      <a:folHlink>
+        <a:srgbClr val="800080"/>
+      </a:folHlink>
+    </a:clrScheme>
+    <a:fontScheme name="Office">
+      <a:majorFont>
+        <a:latin typeface="Calibri"/>
+        <a:ea typeface=""/>
+        <a:cs typeface=""/>
+        <a:font script="Jpan" typeface="ＭＳ Ｐゴシック"/>
+        <a:font script="Hang" typeface="맑은 고딕"/>
+        <a:font script="Hans" typeface="宋体"/>
+        <a:font script="Hant" typeface="新細明體"/>
+        <a:font script="Arab" typeface="Times New Roman"/>
+        <a:font script="Hebr" typeface="Times New Roman"/>
+        <a:font script="Thai" typeface="Angsana New"/>
+        <a:font script="Ethi" typeface="Nyala"/>
+        <a:font script="Beng" typeface="Vrinda"/>
+        <a:font script="Gujr" typeface="Shruti"/>
+        <a:font script="Khmr" typeface="MoolBoran"/>
+        <a:font script="Knda" typeface="Tunga"/>
+        <a:font script="Guru" typeface="Raavi"/>
+        <a:font script="Cans" typeface="Euphemia"/>
+        <a:font script="Cher" typeface="Plantagenet Cherokee"/>
+        <a:font script="Yiii" typeface="Microsoft Yi Baiti"/>
+        <a:font script="Tibt" typeface="Microsoft Himalaya"/>
+        <a:font script="Thaa" typeface="MV Boli"/>
+        <a:font script="Deva" typeface="Mangal"/>
+        <a:font script="Telu" typeface="Gautami"/>
+        <a:font script="Taml" typeface="Latha"/>
+        <a:font script="Syrc" typeface="Estrangelo Edessa"/>
+        <a:font script="Orya" typeface="Kalinga"/>
+        <a:font script="Mlym" typeface="Kartika"/>
+        <a:font script="Laoo" typeface="DokChampa"/>
+        <a:font script="Sinh" typeface="Iskoola Pota"/>
+        <a:font script="Mong" typeface="Mongolian Baiti"/>
+        <a:font script="Viet" typeface="Times New Roman"/>
+        <a:font script="Uigh" typeface="Microsoft Uighur"/>
+      </a:majorFont>
+      <a:minorFont>
+        <a:latin typeface="Calibri"/>
+        <a:ea typeface=""/>
+        <a:cs typeface=""/>
+        <a:font script="Jpan" typeface="ＭＳ Ｐゴシック"/>
+        <a:font script="Hang" typeface="맑은 고딕"/>
+        <a:font script="Hans" typeface="宋体"/>
+        <a:font script="Hant" typeface="新細明體"/>
+        <a:font script="Arab" typeface="Arial"/>
+        <a:font script="Hebr" typeface="Arial"/>
+        <a:font script="Thai" typeface="Cordia New"/>
+        <a:font script="Ethi" typeface="Nyala"/>
+        <a:font script="Beng" typeface="Vrinda"/>
+        <a:font script="Gujr" typeface="Shruti"/>
+        <a:font script="Khmr" typeface="DaunPenh"/>
+        <a:font script="Knda" typeface="Tunga"/>
+        <a:font script="Guru" typeface="Raavi"/>
+        <a:font script="Cans" typeface="Euphemia"/>
+        <a:font script="Cher" typeface="Plantagenet Cherokee"/>
+        <a:font script="Yiii" typeface="Microsoft Yi Baiti"/>
+        <a:font script="Tibt" typeface="Microsoft Himalaya"/>
+        <a:font script="Thaa" typeface="MV Boli"/>
+        <a:font script="Deva" typeface="Mangal"/>
+        <a:font script="Telu" typeface="Gautami"/>
+        <a:font script="Taml" typeface="Latha"/>
+        <a:font script="Syrc" typeface="Estrangelo Edessa"/>
+        <a:font script="Orya" typeface="Kalinga"/>
+        <a:font script="Mlym" typeface="Kartika"/>
+        <a:font script="Laoo" typeface="DokChampa"/>
+        <a:font script="Sinh" typeface="Iskoola Pota"/>
+        <a:font script="Mong" typeface="Mongolian Baiti"/>
+        <a:font script="Viet" typeface="Arial"/>
+        <a:font script="Uigh" typeface="Microsoft Uighur"/>
+      </a:minorFont>
+    </a:fontScheme>
+    <a:fmtScheme name="Office">
+      <a:fillStyleLst>
+        <a:solidFill>
+          <a:schemeClr val="phClr"/>
+        </a:solidFill>
+        <a:gradFill rotWithShape="1">
+          <a:gsLst>
+            <a:gs pos="0">
+              <a:schemeClr val="phClr">
+                <a:tint val="50000"/>
+                <a:satMod val="300000"/>
+              </a:schemeClr>
+            </a:gs>
+            <a:gs pos="35000">
+              <a:schemeClr val="phClr">
+                <a:tint val="37000"/>
+                <a:satMod val="300000"/>
+              </a:schemeClr>
+            </a:gs>
+            <a:gs pos="100000">
+              <a:schemeClr val="phClr">
+                <a:tint val="15000"/>
+                <a:satMod val="350000"/>
+              </a:schemeClr>
+            </a:gs>
+          </a:gsLst>
+          <a:lin ang="16200000" scaled="1"/>
+        </a:gradFill>
+        <a:gradFill rotWithShape="1">
+          <a:gsLst>
+            <a:gs pos="0">
+              <a:schemeClr val="phClr">
+                <a:shade val="51000"/>
+                <a:satMod val="130000"/>
+              </a:schemeClr>
+            </a:gs>
+            <a:gs pos="80000">
+              <a:schemeClr val="phClr">
+                <a:shade val="93000"/>
+                <a:satMod val="130000"/>
+              </a:schemeClr>
+            </a:gs>
+            <a:gs pos="100000">
+              <a:schemeClr val="phClr">
+                <a:shade val="94000"/>
+                <a:satMod val="135000"/>
+              </a:schemeClr>
+            </a:gs>
+          </a:gsLst>
+          <a:lin ang="16200000" scaled="0"/>
+        </a:gradFill>
+      </a:fillStyleLst>
+      <a:lnStyleLst>
+        <a:ln w="9525" cap="flat" cmpd="sng" algn="ctr">
+          <a:solidFill>
+            <a:schemeClr val="phClr">
+              <a:shade val="95000"/>
+              <a:satMod val="105000"/>
+            </a:schemeClr>
+          </a:solidFill>
+          <a:prstDash val="solid"/>
+        </a:ln>
+        <a:ln w="25400" cap="flat" cmpd="sng" algn="ctr">
+          <a:solidFill>
+            <a:schemeClr val="phClr"/>
+          </a:solidFill>
+          <a:prstDash val="solid"/>
+        </a:ln>
+        <a:ln w="38100" cap="flat" cmpd="sng" algn="ctr">
+          <a:solidFill>
+            <a:schemeClr val="phClr"/>
+          </a:solidFill>
+          <a:prstDash val="solid"/>
+        </a:ln>
+      </a:lnStyleLst>
+      <a:effectStyleLst>
+        <a:effectStyle>
+          <a:effectLst>
+            <a:outerShdw blurRad="40000" dist="20000" dir="5400000" rotWithShape="0">
+              <a:srgbClr val="000000">
+                <a:alpha val="38000"/>
+              </a:srgbClr>
+            </a:outerShdw>
+          </a:effectLst>
+        </a:effectStyle>
+        <a:effectStyle>
+          <a:effectLst>
+            <a:outerShdw blurRad="40000" dist="23000" dir="5400000" rotWithShape="0">
+              <a:srgbClr val="000000">
+                <a:alpha val="35000"/>
+              </a:srgbClr>
+            </a:outerShdw>
+          </a:effectLst>
+        </a:effectStyle>
+        <a:effectStyle>
+          <a:effectLst>
+            <a:outerShdw blurRad="40000" dist="23000" dir="5400000" rotWithShape="0">
+              <a:srgbClr val="000000">
+                <a:alpha val="35000"/>
+              </a:srgbClr>
+            </a:outerShdw>
+          </a:effectLst>
+          <a:scene3d>
+            <a:camera prst="orthographicFront">
+              <a:rot lat="0" lon="0" rev="0"/>
+            </a:camera>
+            <a:lightRig rig="threePt" dir="t">
+              <a:rot lat="0" lon="0" rev="1200000"/>
+            </a:lightRig>
+          </a:scene3d>
+          <a:sp3d>
+            <a:bevelT w="63500" h="25400"/>
+          </a:sp3d>
+        </a:effectStyle>
+      </a:effectStyleLst>
+      <a:bgFillStyleLst>
+        <a:solidFill>
+          <a:schemeClr val="phClr"/>
+        </a:solidFill>
+        <a:gradFill rotWithShape="1">
+          <a:gsLst>
+            <a:gs pos="0">
+              <a:schemeClr val="phClr">
+                <a:tint val="40000"/>
+                <a:satMod val="350000"/>
+              </a:schemeClr>
+            </a:gs>
+            <a:gs pos="40000">
+              <a:schemeClr val="phClr">
+                <a:tint val="45000"/>
+                <a:shade val="99000"/>
+                <a:satMod val="350000"/>
+              </a:schemeClr>
+            </a:gs>
+            <a:gs pos="100000">
+              <a:schemeClr val="phClr">
+                <a:shade val="20000"/>
+                <a:satMod val="255000"/>
+              </a:schemeClr>
+            </a:gs>
+          </a:gsLst>
+          <a:path path="circle">
+            <a:fillToRect l="50000" t="-80000" r="50000" b="180000"/>
+          </a:path>
+        </a:gradFill>
+        <a:gradFill rotWithShape="1">
+          <a:gsLst>
+            <a:gs pos="0">
+              <a:schemeClr val="phClr">
+                <a:tint val="80000"/>
+                <a:satMod val="300000"/>
+              </a:schemeClr>
+            </a:gs>
+            <a:gs pos="100000">
+              <a:schemeClr val="phClr">
+                <a:shade val="30000"/>
+                <a:satMod val="200000"/>
+              </a:schemeClr>
+            </a:gs>
+          </a:gsLst>
+          <a:path path="circle">
+            <a:fillToRect l="50000" t="50000" r="50000" b="50000"/>
+          </a:path>
+        </a:gradFill>
+      </a:bgFillStyleLst>
+    </a:fmtScheme>
+  </a:themeElements>
+  <a:objectDefaults/>
+  <a:extraClrSchemeLst/>
+</a:theme>
 </file>
</xml_diff>

<commit_message>
Ajout de ma partie de présentation
</commit_message>
<xml_diff>
--- a/AAP/docs/Presentation.pptx
+++ b/AAP/docs/Presentation.pptx
@@ -382,6 +382,11 @@
         </p:txBody>
       </p:sp>
     </p:spTree>
+    <p:extLst>
+      <p:ext uri="{BB962C8B-B14F-4D97-AF65-F5344CB8AC3E}">
+        <p14:creationId xmlns:p14="http://schemas.microsoft.com/office/powerpoint/2010/main" val="2884352748"/>
+      </p:ext>
+    </p:extLst>
   </p:cSld>
   <p:clrMap bg1="lt1" tx1="dk1" bg2="lt2" tx2="dk2" accent1="accent1" accent2="accent2" accent3="accent3" accent4="accent4" accent5="accent5" accent6="accent6" hlink="hlink" folHlink="folHlink"/>
   <p:notesStyle>
@@ -4311,11 +4316,7 @@
           <a:p>
             <a:r>
               <a:rPr lang="fr-FR" dirty="0" smtClean="0"/>
-              <a:t>I</a:t>
-            </a:r>
-            <a:r>
-              <a:rPr lang="fr-FR" dirty="0" smtClean="0"/>
-              <a:t>nterface graphique</a:t>
+              <a:t>Interface graphique</a:t>
             </a:r>
             <a:endParaRPr lang="fr-FR" dirty="0"/>
           </a:p>
@@ -4570,50 +4571,35 @@
                 </a:solidFill>
                 <a:latin typeface="Cambria" pitchFamily="18" charset="0"/>
               </a:rPr>
-              <a:t>Outils et méthodologies </a:t>
-            </a:r>
+              <a:t>Outils et méthodologies utilisés</a:t>
+            </a:r>
+          </a:p>
+          <a:p>
+            <a:pPr marL="457200" indent="-457200">
+              <a:buFont typeface="+mj-lt"/>
+              <a:buAutoNum type="arabicPeriod"/>
+            </a:pPr>
+            <a:endParaRPr lang="fr-FR" sz="1400" dirty="0" smtClean="0">
+              <a:solidFill>
+                <a:srgbClr val="D8FBC1"/>
+              </a:solidFill>
+              <a:latin typeface="Cambria" pitchFamily="18" charset="0"/>
+            </a:endParaRPr>
+          </a:p>
+          <a:p>
+            <a:pPr marL="457200" indent="-457200">
+              <a:buFont typeface="+mj-lt"/>
+              <a:buAutoNum type="arabicPeriod"/>
+            </a:pPr>
             <a:r>
               <a:rPr lang="fr-FR" sz="1400" dirty="0" smtClean="0">
                 <a:solidFill>
-                  <a:srgbClr val="A4CA39"/>
-                </a:solidFill>
-                <a:latin typeface="Cambria" pitchFamily="18" charset="0"/>
-              </a:rPr>
-              <a:t>utilisés</a:t>
-            </a:r>
-          </a:p>
-          <a:p>
-            <a:pPr marL="457200" indent="-457200">
-              <a:buFont typeface="+mj-lt"/>
-              <a:buAutoNum type="arabicPeriod"/>
-            </a:pPr>
-            <a:endParaRPr lang="fr-FR" sz="1400" dirty="0" smtClean="0">
-              <a:solidFill>
-                <a:srgbClr val="D8FBC1"/>
-              </a:solidFill>
-              <a:latin typeface="Cambria" pitchFamily="18" charset="0"/>
-            </a:endParaRPr>
-          </a:p>
-          <a:p>
-            <a:pPr marL="457200" indent="-457200">
-              <a:buFont typeface="+mj-lt"/>
-              <a:buAutoNum type="arabicPeriod"/>
-            </a:pPr>
-            <a:r>
-              <a:rPr lang="fr-FR" sz="1400" dirty="0" smtClean="0">
-                <a:solidFill>
                   <a:srgbClr val="D8FBC1"/>
                 </a:solidFill>
                 <a:latin typeface="Cambria" pitchFamily="18" charset="0"/>
               </a:rPr>
               <a:t>Interface graphique</a:t>
             </a:r>
-            <a:endParaRPr lang="fr-FR" sz="1400" dirty="0" smtClean="0">
-              <a:solidFill>
-                <a:srgbClr val="D8FBC1"/>
-              </a:solidFill>
-              <a:latin typeface="Cambria" pitchFamily="18" charset="0"/>
-            </a:endParaRPr>
           </a:p>
           <a:p>
             <a:pPr marL="457200" indent="-457200">
@@ -4777,11 +4763,7 @@
           <a:p>
             <a:r>
               <a:rPr lang="fr-FR" dirty="0" smtClean="0"/>
-              <a:t>I</a:t>
-            </a:r>
-            <a:r>
-              <a:rPr lang="fr-FR" dirty="0" smtClean="0"/>
-              <a:t>nterface graphique</a:t>
+              <a:t>Interface graphique</a:t>
             </a:r>
             <a:endParaRPr lang="fr-FR" dirty="0"/>
           </a:p>
@@ -5155,50 +5137,35 @@
                 </a:solidFill>
                 <a:latin typeface="Cambria" pitchFamily="18" charset="0"/>
               </a:rPr>
-              <a:t>Outils et méthodologies </a:t>
-            </a:r>
+              <a:t>Outils et méthodologies utilisés</a:t>
+            </a:r>
+          </a:p>
+          <a:p>
+            <a:pPr marL="457200" indent="-457200">
+              <a:buFont typeface="+mj-lt"/>
+              <a:buAutoNum type="arabicPeriod"/>
+            </a:pPr>
+            <a:endParaRPr lang="fr-FR" sz="1400" dirty="0" smtClean="0">
+              <a:solidFill>
+                <a:srgbClr val="D8FBC1"/>
+              </a:solidFill>
+              <a:latin typeface="Cambria" pitchFamily="18" charset="0"/>
+            </a:endParaRPr>
+          </a:p>
+          <a:p>
+            <a:pPr marL="457200" indent="-457200">
+              <a:buFont typeface="+mj-lt"/>
+              <a:buAutoNum type="arabicPeriod"/>
+            </a:pPr>
             <a:r>
               <a:rPr lang="fr-FR" sz="1400" dirty="0" smtClean="0">
                 <a:solidFill>
-                  <a:srgbClr val="A4CA39"/>
-                </a:solidFill>
-                <a:latin typeface="Cambria" pitchFamily="18" charset="0"/>
-              </a:rPr>
-              <a:t>utilisés</a:t>
-            </a:r>
-          </a:p>
-          <a:p>
-            <a:pPr marL="457200" indent="-457200">
-              <a:buFont typeface="+mj-lt"/>
-              <a:buAutoNum type="arabicPeriod"/>
-            </a:pPr>
-            <a:endParaRPr lang="fr-FR" sz="1400" dirty="0" smtClean="0">
-              <a:solidFill>
-                <a:srgbClr val="D8FBC1"/>
-              </a:solidFill>
-              <a:latin typeface="Cambria" pitchFamily="18" charset="0"/>
-            </a:endParaRPr>
-          </a:p>
-          <a:p>
-            <a:pPr marL="457200" indent="-457200">
-              <a:buFont typeface="+mj-lt"/>
-              <a:buAutoNum type="arabicPeriod"/>
-            </a:pPr>
-            <a:r>
-              <a:rPr lang="fr-FR" sz="1400" dirty="0" smtClean="0">
-                <a:solidFill>
                   <a:srgbClr val="D8FBC1"/>
                 </a:solidFill>
                 <a:latin typeface="Cambria" pitchFamily="18" charset="0"/>
               </a:rPr>
               <a:t>Interface graphique</a:t>
             </a:r>
-            <a:endParaRPr lang="fr-FR" sz="1400" dirty="0" smtClean="0">
-              <a:solidFill>
-                <a:srgbClr val="D8FBC1"/>
-              </a:solidFill>
-              <a:latin typeface="Cambria" pitchFamily="18" charset="0"/>
-            </a:endParaRPr>
           </a:p>
           <a:p>
             <a:pPr marL="457200" indent="-457200">
@@ -5338,11 +5305,7 @@
           <a:p>
             <a:r>
               <a:rPr lang="fr-FR" dirty="0" smtClean="0"/>
-              <a:t>I</a:t>
-            </a:r>
-            <a:r>
-              <a:rPr lang="fr-FR" dirty="0" smtClean="0"/>
-              <a:t>nterface graphique</a:t>
+              <a:t>Interface graphique</a:t>
             </a:r>
             <a:endParaRPr lang="fr-FR" dirty="0"/>
           </a:p>
@@ -5519,50 +5482,35 @@
                 </a:solidFill>
                 <a:latin typeface="Cambria" pitchFamily="18" charset="0"/>
               </a:rPr>
-              <a:t>Outils et méthodologies </a:t>
-            </a:r>
+              <a:t>Outils et méthodologies utilisés</a:t>
+            </a:r>
+          </a:p>
+          <a:p>
+            <a:pPr marL="457200" indent="-457200">
+              <a:buFont typeface="+mj-lt"/>
+              <a:buAutoNum type="arabicPeriod"/>
+            </a:pPr>
+            <a:endParaRPr lang="fr-FR" sz="1400" dirty="0" smtClean="0">
+              <a:solidFill>
+                <a:srgbClr val="D8FBC1"/>
+              </a:solidFill>
+              <a:latin typeface="Cambria" pitchFamily="18" charset="0"/>
+            </a:endParaRPr>
+          </a:p>
+          <a:p>
+            <a:pPr marL="457200" indent="-457200">
+              <a:buFont typeface="+mj-lt"/>
+              <a:buAutoNum type="arabicPeriod"/>
+            </a:pPr>
             <a:r>
               <a:rPr lang="fr-FR" sz="1400" dirty="0" smtClean="0">
                 <a:solidFill>
-                  <a:srgbClr val="A4CA39"/>
-                </a:solidFill>
-                <a:latin typeface="Cambria" pitchFamily="18" charset="0"/>
-              </a:rPr>
-              <a:t>utilisés</a:t>
-            </a:r>
-          </a:p>
-          <a:p>
-            <a:pPr marL="457200" indent="-457200">
-              <a:buFont typeface="+mj-lt"/>
-              <a:buAutoNum type="arabicPeriod"/>
-            </a:pPr>
-            <a:endParaRPr lang="fr-FR" sz="1400" dirty="0" smtClean="0">
-              <a:solidFill>
-                <a:srgbClr val="D8FBC1"/>
-              </a:solidFill>
-              <a:latin typeface="Cambria" pitchFamily="18" charset="0"/>
-            </a:endParaRPr>
-          </a:p>
-          <a:p>
-            <a:pPr marL="457200" indent="-457200">
-              <a:buFont typeface="+mj-lt"/>
-              <a:buAutoNum type="arabicPeriod"/>
-            </a:pPr>
-            <a:r>
-              <a:rPr lang="fr-FR" sz="1400" dirty="0" smtClean="0">
-                <a:solidFill>
                   <a:srgbClr val="D8FBC1"/>
                 </a:solidFill>
                 <a:latin typeface="Cambria" pitchFamily="18" charset="0"/>
               </a:rPr>
               <a:t>Interface graphique</a:t>
             </a:r>
-            <a:endParaRPr lang="fr-FR" sz="1400" dirty="0" smtClean="0">
-              <a:solidFill>
-                <a:srgbClr val="D8FBC1"/>
-              </a:solidFill>
-              <a:latin typeface="Cambria" pitchFamily="18" charset="0"/>
-            </a:endParaRPr>
           </a:p>
           <a:p>
             <a:pPr marL="457200" indent="-457200">
@@ -6140,8 +6088,26 @@
                 </a:solidFill>
                 <a:latin typeface="Cambria" pitchFamily="18" charset="0"/>
               </a:rPr>
-              <a:t>Outils et méthodologies </a:t>
-            </a:r>
+              <a:t>Outils et méthodologies utilisés</a:t>
+            </a:r>
+          </a:p>
+          <a:p>
+            <a:pPr marL="457200" indent="-457200">
+              <a:buFont typeface="+mj-lt"/>
+              <a:buAutoNum type="arabicPeriod"/>
+            </a:pPr>
+            <a:endParaRPr lang="fr-FR" sz="1400" dirty="0" smtClean="0">
+              <a:solidFill>
+                <a:srgbClr val="D8FBC1"/>
+              </a:solidFill>
+              <a:latin typeface="Cambria" pitchFamily="18" charset="0"/>
+            </a:endParaRPr>
+          </a:p>
+          <a:p>
+            <a:pPr marL="457200" indent="-457200">
+              <a:buFont typeface="+mj-lt"/>
+              <a:buAutoNum type="arabicPeriod"/>
+            </a:pPr>
             <a:r>
               <a:rPr lang="fr-FR" sz="1400" dirty="0" smtClean="0">
                 <a:solidFill>
@@ -6149,50 +6115,8 @@
                 </a:solidFill>
                 <a:latin typeface="Cambria" pitchFamily="18" charset="0"/>
               </a:rPr>
-              <a:t>utilisés</a:t>
-            </a:r>
-          </a:p>
-          <a:p>
-            <a:pPr marL="457200" indent="-457200">
-              <a:buFont typeface="+mj-lt"/>
-              <a:buAutoNum type="arabicPeriod"/>
-            </a:pPr>
-            <a:endParaRPr lang="fr-FR" sz="1400" dirty="0" smtClean="0">
-              <a:solidFill>
-                <a:srgbClr val="D8FBC1"/>
-              </a:solidFill>
-              <a:latin typeface="Cambria" pitchFamily="18" charset="0"/>
-            </a:endParaRPr>
-          </a:p>
-          <a:p>
-            <a:pPr marL="457200" indent="-457200">
-              <a:buFont typeface="+mj-lt"/>
-              <a:buAutoNum type="arabicPeriod"/>
-            </a:pPr>
-            <a:r>
-              <a:rPr lang="fr-FR" sz="1400" dirty="0" smtClean="0">
-                <a:solidFill>
-                  <a:srgbClr val="A4CA39"/>
-                </a:solidFill>
-                <a:latin typeface="Cambria" pitchFamily="18" charset="0"/>
-              </a:rPr>
-              <a:t>Interface </a:t>
-            </a:r>
-            <a:r>
-              <a:rPr lang="fr-FR" sz="1400" dirty="0" smtClean="0">
-                <a:solidFill>
-                  <a:srgbClr val="A4CA39"/>
-                </a:solidFill>
-                <a:latin typeface="Cambria" pitchFamily="18" charset="0"/>
-              </a:rPr>
-              <a:t>graphique</a:t>
-            </a:r>
-            <a:endParaRPr lang="fr-FR" sz="1400" dirty="0" smtClean="0">
-              <a:solidFill>
-                <a:srgbClr val="A4CA39"/>
-              </a:solidFill>
-              <a:latin typeface="Cambria" pitchFamily="18" charset="0"/>
-            </a:endParaRPr>
+              <a:t>Interface graphique</a:t>
+            </a:r>
           </a:p>
           <a:p>
             <a:pPr marL="457200" indent="-457200">
@@ -6454,17 +6378,7 @@
                   </a:schemeClr>
                 </a:solidFill>
               </a:rPr>
-              <a:t> </a:t>
-            </a:r>
-            <a:r>
-              <a:rPr lang="fr-FR" dirty="0" smtClean="0">
-                <a:solidFill>
-                  <a:schemeClr val="tx2">
-                    <a:lumMod val="75000"/>
-                  </a:schemeClr>
-                </a:solidFill>
-              </a:rPr>
-              <a:t>»</a:t>
+              <a:t> »</a:t>
             </a:r>
           </a:p>
           <a:p>
@@ -6728,8 +6642,26 @@
                 </a:solidFill>
                 <a:latin typeface="Cambria" pitchFamily="18" charset="0"/>
               </a:rPr>
-              <a:t>Outils et méthodologies </a:t>
-            </a:r>
+              <a:t>Outils et méthodologies utilisés</a:t>
+            </a:r>
+          </a:p>
+          <a:p>
+            <a:pPr marL="457200" indent="-457200">
+              <a:buFont typeface="+mj-lt"/>
+              <a:buAutoNum type="arabicPeriod"/>
+            </a:pPr>
+            <a:endParaRPr lang="fr-FR" sz="1400" dirty="0" smtClean="0">
+              <a:solidFill>
+                <a:srgbClr val="D8FBC1"/>
+              </a:solidFill>
+              <a:latin typeface="Cambria" pitchFamily="18" charset="0"/>
+            </a:endParaRPr>
+          </a:p>
+          <a:p>
+            <a:pPr marL="457200" indent="-457200">
+              <a:buFont typeface="+mj-lt"/>
+              <a:buAutoNum type="arabicPeriod"/>
+            </a:pPr>
             <a:r>
               <a:rPr lang="fr-FR" sz="1400" dirty="0" smtClean="0">
                 <a:solidFill>
@@ -6737,50 +6669,8 @@
                 </a:solidFill>
                 <a:latin typeface="Cambria" pitchFamily="18" charset="0"/>
               </a:rPr>
-              <a:t>utilisés</a:t>
-            </a:r>
-          </a:p>
-          <a:p>
-            <a:pPr marL="457200" indent="-457200">
-              <a:buFont typeface="+mj-lt"/>
-              <a:buAutoNum type="arabicPeriod"/>
-            </a:pPr>
-            <a:endParaRPr lang="fr-FR" sz="1400" dirty="0" smtClean="0">
-              <a:solidFill>
-                <a:srgbClr val="D8FBC1"/>
-              </a:solidFill>
-              <a:latin typeface="Cambria" pitchFamily="18" charset="0"/>
-            </a:endParaRPr>
-          </a:p>
-          <a:p>
-            <a:pPr marL="457200" indent="-457200">
-              <a:buFont typeface="+mj-lt"/>
-              <a:buAutoNum type="arabicPeriod"/>
-            </a:pPr>
-            <a:r>
-              <a:rPr lang="fr-FR" sz="1400" dirty="0" smtClean="0">
-                <a:solidFill>
-                  <a:srgbClr val="A4CA39"/>
-                </a:solidFill>
-                <a:latin typeface="Cambria" pitchFamily="18" charset="0"/>
-              </a:rPr>
-              <a:t>Interface </a:t>
-            </a:r>
-            <a:r>
-              <a:rPr lang="fr-FR" sz="1400" dirty="0" smtClean="0">
-                <a:solidFill>
-                  <a:srgbClr val="A4CA39"/>
-                </a:solidFill>
-                <a:latin typeface="Cambria" pitchFamily="18" charset="0"/>
-              </a:rPr>
-              <a:t>graphique</a:t>
-            </a:r>
-            <a:endParaRPr lang="fr-FR" sz="1400" dirty="0" smtClean="0">
-              <a:solidFill>
-                <a:srgbClr val="A4CA39"/>
-              </a:solidFill>
-              <a:latin typeface="Cambria" pitchFamily="18" charset="0"/>
-            </a:endParaRPr>
+              <a:t>Interface graphique</a:t>
+            </a:r>
           </a:p>
           <a:p>
             <a:pPr marL="457200" indent="-457200">
@@ -7042,17 +6932,7 @@
                   </a:schemeClr>
                 </a:solidFill>
               </a:rPr>
-              <a:t> </a:t>
-            </a:r>
-            <a:r>
-              <a:rPr lang="fr-FR" dirty="0" smtClean="0">
-                <a:solidFill>
-                  <a:schemeClr val="tx2">
-                    <a:lumMod val="75000"/>
-                  </a:schemeClr>
-                </a:solidFill>
-              </a:rPr>
-              <a:t>» (suite)</a:t>
+              <a:t> » (suite)</a:t>
             </a:r>
             <a:endParaRPr lang="fr-FR" dirty="0">
               <a:solidFill>
@@ -7146,8 +7026,26 @@
                 </a:solidFill>
                 <a:latin typeface="Cambria" pitchFamily="18" charset="0"/>
               </a:rPr>
-              <a:t>Outils et méthodologies </a:t>
-            </a:r>
+              <a:t>Outils et méthodologies utilisés</a:t>
+            </a:r>
+          </a:p>
+          <a:p>
+            <a:pPr marL="457200" indent="-457200">
+              <a:buFont typeface="+mj-lt"/>
+              <a:buAutoNum type="arabicPeriod"/>
+            </a:pPr>
+            <a:endParaRPr lang="fr-FR" sz="1400" dirty="0" smtClean="0">
+              <a:solidFill>
+                <a:srgbClr val="D8FBC1"/>
+              </a:solidFill>
+              <a:latin typeface="Cambria" pitchFamily="18" charset="0"/>
+            </a:endParaRPr>
+          </a:p>
+          <a:p>
+            <a:pPr marL="457200" indent="-457200">
+              <a:buFont typeface="+mj-lt"/>
+              <a:buAutoNum type="arabicPeriod"/>
+            </a:pPr>
             <a:r>
               <a:rPr lang="fr-FR" sz="1400" dirty="0" smtClean="0">
                 <a:solidFill>
@@ -7155,50 +7053,8 @@
                 </a:solidFill>
                 <a:latin typeface="Cambria" pitchFamily="18" charset="0"/>
               </a:rPr>
-              <a:t>utilisés</a:t>
-            </a:r>
-          </a:p>
-          <a:p>
-            <a:pPr marL="457200" indent="-457200">
-              <a:buFont typeface="+mj-lt"/>
-              <a:buAutoNum type="arabicPeriod"/>
-            </a:pPr>
-            <a:endParaRPr lang="fr-FR" sz="1400" dirty="0" smtClean="0">
-              <a:solidFill>
-                <a:srgbClr val="D8FBC1"/>
-              </a:solidFill>
-              <a:latin typeface="Cambria" pitchFamily="18" charset="0"/>
-            </a:endParaRPr>
-          </a:p>
-          <a:p>
-            <a:pPr marL="457200" indent="-457200">
-              <a:buFont typeface="+mj-lt"/>
-              <a:buAutoNum type="arabicPeriod"/>
-            </a:pPr>
-            <a:r>
-              <a:rPr lang="fr-FR" sz="1400" dirty="0" smtClean="0">
-                <a:solidFill>
-                  <a:srgbClr val="A4CA39"/>
-                </a:solidFill>
-                <a:latin typeface="Cambria" pitchFamily="18" charset="0"/>
-              </a:rPr>
-              <a:t>Interface </a:t>
-            </a:r>
-            <a:r>
-              <a:rPr lang="fr-FR" sz="1400" dirty="0" smtClean="0">
-                <a:solidFill>
-                  <a:srgbClr val="A4CA39"/>
-                </a:solidFill>
-                <a:latin typeface="Cambria" pitchFamily="18" charset="0"/>
-              </a:rPr>
-              <a:t>graphique</a:t>
-            </a:r>
-            <a:endParaRPr lang="fr-FR" sz="1400" dirty="0" smtClean="0">
-              <a:solidFill>
-                <a:srgbClr val="A4CA39"/>
-              </a:solidFill>
-              <a:latin typeface="Cambria" pitchFamily="18" charset="0"/>
-            </a:endParaRPr>
+              <a:t>Interface graphique</a:t>
+            </a:r>
           </a:p>
           <a:p>
             <a:pPr marL="457200" indent="-457200">
@@ -7573,8 +7429,72 @@
                   </a:schemeClr>
                 </a:solidFill>
               </a:rPr>
-              <a:t> »</a:t>
-            </a:r>
+              <a:t> </a:t>
+            </a:r>
+            <a:r>
+              <a:rPr lang="fr-FR" dirty="0" smtClean="0">
+                <a:solidFill>
+                  <a:schemeClr val="tx2">
+                    <a:lumMod val="75000"/>
+                  </a:schemeClr>
+                </a:solidFill>
+              </a:rPr>
+              <a:t>»</a:t>
+            </a:r>
+          </a:p>
+          <a:p>
+            <a:pPr lvl="1">
+              <a:buFont typeface="Arial" pitchFamily="34" charset="0"/>
+              <a:buChar char="•"/>
+            </a:pPr>
+            <a:r>
+              <a:rPr lang="fr-FR" sz="2400" dirty="0" smtClean="0">
+                <a:solidFill>
+                  <a:schemeClr val="tx2">
+                    <a:lumMod val="75000"/>
+                  </a:schemeClr>
+                </a:solidFill>
+              </a:rPr>
+              <a:t>Changement de la fréquence d’un son</a:t>
+            </a:r>
+          </a:p>
+          <a:p>
+            <a:pPr lvl="1">
+              <a:buFont typeface="Arial" pitchFamily="34" charset="0"/>
+              <a:buChar char="•"/>
+            </a:pPr>
+            <a:r>
+              <a:rPr lang="fr-FR" sz="2400" dirty="0" smtClean="0">
+                <a:solidFill>
+                  <a:schemeClr val="tx2">
+                    <a:lumMod val="75000"/>
+                  </a:schemeClr>
+                </a:solidFill>
+              </a:rPr>
+              <a:t>Utilisation de la classe </a:t>
+            </a:r>
+            <a:r>
+              <a:rPr lang="fr-FR" sz="2400" dirty="0" err="1" smtClean="0">
+                <a:solidFill>
+                  <a:schemeClr val="tx2">
+                    <a:lumMod val="75000"/>
+                  </a:schemeClr>
+                </a:solidFill>
+              </a:rPr>
+              <a:t>Equalizer</a:t>
+            </a:r>
+            <a:endParaRPr lang="fr-FR" sz="2400" dirty="0">
+              <a:solidFill>
+                <a:schemeClr val="tx2">
+                  <a:lumMod val="75000"/>
+                </a:schemeClr>
+              </a:solidFill>
+            </a:endParaRPr>
+          </a:p>
+          <a:p>
+            <a:pPr marL="457200" lvl="1" indent="0">
+              <a:buNone/>
+            </a:pPr>
             <a:endParaRPr lang="fr-FR" dirty="0">
               <a:solidFill>
                 <a:schemeClr val="tx2">
@@ -7667,8 +7587,26 @@
                 </a:solidFill>
                 <a:latin typeface="Cambria" pitchFamily="18" charset="0"/>
               </a:rPr>
-              <a:t>Outils et méthodologies </a:t>
-            </a:r>
+              <a:t>Outils et méthodologies utilisés</a:t>
+            </a:r>
+          </a:p>
+          <a:p>
+            <a:pPr marL="457200" indent="-457200">
+              <a:buFont typeface="+mj-lt"/>
+              <a:buAutoNum type="arabicPeriod"/>
+            </a:pPr>
+            <a:endParaRPr lang="fr-FR" sz="1400" dirty="0" smtClean="0">
+              <a:solidFill>
+                <a:srgbClr val="D8FBC1"/>
+              </a:solidFill>
+              <a:latin typeface="Cambria" pitchFamily="18" charset="0"/>
+            </a:endParaRPr>
+          </a:p>
+          <a:p>
+            <a:pPr marL="457200" indent="-457200">
+              <a:buFont typeface="+mj-lt"/>
+              <a:buAutoNum type="arabicPeriod"/>
+            </a:pPr>
             <a:r>
               <a:rPr lang="fr-FR" sz="1400" dirty="0" smtClean="0">
                 <a:solidFill>
@@ -7676,7 +7614,7 @@
                 </a:solidFill>
                 <a:latin typeface="Cambria" pitchFamily="18" charset="0"/>
               </a:rPr>
-              <a:t>utilisés</a:t>
+              <a:t>Interface graphique</a:t>
             </a:r>
           </a:p>
           <a:p>
@@ -7686,6 +7624,60 @@
             </a:pPr>
             <a:endParaRPr lang="fr-FR" sz="1400" dirty="0" smtClean="0">
               <a:solidFill>
+                <a:srgbClr val="A4CA39"/>
+              </a:solidFill>
+              <a:latin typeface="Cambria" pitchFamily="18" charset="0"/>
+            </a:endParaRPr>
+          </a:p>
+          <a:p>
+            <a:pPr marL="457200" indent="-457200">
+              <a:buFont typeface="+mj-lt"/>
+              <a:buAutoNum type="arabicPeriod"/>
+            </a:pPr>
+            <a:r>
+              <a:rPr lang="fr-FR" sz="1400" dirty="0" smtClean="0">
+                <a:solidFill>
+                  <a:srgbClr val="D8FBC1"/>
+                </a:solidFill>
+                <a:latin typeface="Cambria" pitchFamily="18" charset="0"/>
+              </a:rPr>
+              <a:t>Fonctionnalités</a:t>
+            </a:r>
+            <a:endParaRPr lang="fr-FR" sz="1400" dirty="0" smtClean="0">
+              <a:solidFill>
+                <a:srgbClr val="A4CA39"/>
+              </a:solidFill>
+              <a:latin typeface="Cambria" pitchFamily="18" charset="0"/>
+            </a:endParaRPr>
+          </a:p>
+          <a:p>
+            <a:pPr marL="457200" indent="-457200">
+              <a:buFont typeface="+mj-lt"/>
+              <a:buAutoNum type="arabicPeriod"/>
+            </a:pPr>
+            <a:endParaRPr lang="fr-FR" sz="1400" dirty="0" smtClean="0">
+              <a:solidFill>
+                <a:srgbClr val="A4CA39"/>
+              </a:solidFill>
+              <a:latin typeface="Cambria" pitchFamily="18" charset="0"/>
+            </a:endParaRPr>
+          </a:p>
+          <a:p>
+            <a:pPr marL="457200" indent="-457200">
+              <a:buFont typeface="+mj-lt"/>
+              <a:buAutoNum type="arabicPeriod"/>
+            </a:pPr>
+            <a:r>
+              <a:rPr lang="fr-FR" sz="1400" dirty="0" smtClean="0">
+                <a:solidFill>
+                  <a:srgbClr val="A4CA39"/>
+                </a:solidFill>
+                <a:latin typeface="Cambria" pitchFamily="18" charset="0"/>
+              </a:rPr>
+              <a:t>Démonstration</a:t>
+            </a:r>
+            <a:endParaRPr lang="fr-FR" sz="1400" dirty="0" smtClean="0">
+              <a:solidFill>
                 <a:srgbClr val="D8FBC1"/>
               </a:solidFill>
               <a:latin typeface="Cambria" pitchFamily="18" charset="0"/>
@@ -7696,6 +7688,18 @@
               <a:buFont typeface="+mj-lt"/>
               <a:buAutoNum type="arabicPeriod"/>
             </a:pPr>
+            <a:endParaRPr lang="fr-FR" sz="1400" dirty="0" smtClean="0">
+              <a:solidFill>
+                <a:srgbClr val="A4CA39"/>
+              </a:solidFill>
+              <a:latin typeface="Cambria" pitchFamily="18" charset="0"/>
+            </a:endParaRPr>
+          </a:p>
+          <a:p>
+            <a:pPr marL="457200" indent="-457200">
+              <a:buFont typeface="+mj-lt"/>
+              <a:buAutoNum type="arabicPeriod"/>
+            </a:pPr>
             <a:r>
               <a:rPr lang="fr-FR" sz="1400" dirty="0" smtClean="0">
                 <a:solidFill>
@@ -7703,114 +7707,6 @@
                 </a:solidFill>
                 <a:latin typeface="Cambria" pitchFamily="18" charset="0"/>
               </a:rPr>
-              <a:t>Interface </a:t>
-            </a:r>
-            <a:r>
-              <a:rPr lang="fr-FR" sz="1400" dirty="0" smtClean="0">
-                <a:solidFill>
-                  <a:srgbClr val="A4CA39"/>
-                </a:solidFill>
-                <a:latin typeface="Cambria" pitchFamily="18" charset="0"/>
-              </a:rPr>
-              <a:t>graphique</a:t>
-            </a:r>
-            <a:endParaRPr lang="fr-FR" sz="1400" dirty="0" smtClean="0">
-              <a:solidFill>
-                <a:srgbClr val="A4CA39"/>
-              </a:solidFill>
-              <a:latin typeface="Cambria" pitchFamily="18" charset="0"/>
-            </a:endParaRPr>
-          </a:p>
-          <a:p>
-            <a:pPr marL="457200" indent="-457200">
-              <a:buFont typeface="+mj-lt"/>
-              <a:buAutoNum type="arabicPeriod"/>
-            </a:pPr>
-            <a:endParaRPr lang="fr-FR" sz="1400" dirty="0" smtClean="0">
-              <a:solidFill>
-                <a:srgbClr val="A4CA39"/>
-              </a:solidFill>
-              <a:latin typeface="Cambria" pitchFamily="18" charset="0"/>
-            </a:endParaRPr>
-          </a:p>
-          <a:p>
-            <a:pPr marL="457200" indent="-457200">
-              <a:buFont typeface="+mj-lt"/>
-              <a:buAutoNum type="arabicPeriod"/>
-            </a:pPr>
-            <a:r>
-              <a:rPr lang="fr-FR" sz="1400" dirty="0" smtClean="0">
-                <a:solidFill>
-                  <a:srgbClr val="D8FBC1"/>
-                </a:solidFill>
-                <a:latin typeface="Cambria" pitchFamily="18" charset="0"/>
-              </a:rPr>
-              <a:t>Fonctionnalités</a:t>
-            </a:r>
-            <a:endParaRPr lang="fr-FR" sz="1400" dirty="0" smtClean="0">
-              <a:solidFill>
-                <a:srgbClr val="A4CA39"/>
-              </a:solidFill>
-              <a:latin typeface="Cambria" pitchFamily="18" charset="0"/>
-            </a:endParaRPr>
-          </a:p>
-          <a:p>
-            <a:pPr marL="457200" indent="-457200">
-              <a:buFont typeface="+mj-lt"/>
-              <a:buAutoNum type="arabicPeriod"/>
-            </a:pPr>
-            <a:endParaRPr lang="fr-FR" sz="1400" dirty="0" smtClean="0">
-              <a:solidFill>
-                <a:srgbClr val="A4CA39"/>
-              </a:solidFill>
-              <a:latin typeface="Cambria" pitchFamily="18" charset="0"/>
-            </a:endParaRPr>
-          </a:p>
-          <a:p>
-            <a:pPr marL="457200" indent="-457200">
-              <a:buFont typeface="+mj-lt"/>
-              <a:buAutoNum type="arabicPeriod"/>
-            </a:pPr>
-            <a:r>
-              <a:rPr lang="fr-FR" sz="1400" dirty="0" smtClean="0">
-                <a:solidFill>
-                  <a:srgbClr val="A4CA39"/>
-                </a:solidFill>
-                <a:latin typeface="Cambria" pitchFamily="18" charset="0"/>
-              </a:rPr>
-              <a:t>Démonstration</a:t>
-            </a:r>
-            <a:endParaRPr lang="fr-FR" sz="1400" dirty="0" smtClean="0">
-              <a:solidFill>
-                <a:srgbClr val="D8FBC1"/>
-              </a:solidFill>
-              <a:latin typeface="Cambria" pitchFamily="18" charset="0"/>
-            </a:endParaRPr>
-          </a:p>
-          <a:p>
-            <a:pPr marL="457200" indent="-457200">
-              <a:buFont typeface="+mj-lt"/>
-              <a:buAutoNum type="arabicPeriod"/>
-            </a:pPr>
-            <a:endParaRPr lang="fr-FR" sz="1400" dirty="0" smtClean="0">
-              <a:solidFill>
-                <a:srgbClr val="A4CA39"/>
-              </a:solidFill>
-              <a:latin typeface="Cambria" pitchFamily="18" charset="0"/>
-            </a:endParaRPr>
-          </a:p>
-          <a:p>
-            <a:pPr marL="457200" indent="-457200">
-              <a:buFont typeface="+mj-lt"/>
-              <a:buAutoNum type="arabicPeriod"/>
-            </a:pPr>
-            <a:r>
-              <a:rPr lang="fr-FR" sz="1400" dirty="0" smtClean="0">
-                <a:solidFill>
-                  <a:srgbClr val="A4CA39"/>
-                </a:solidFill>
-                <a:latin typeface="Cambria" pitchFamily="18" charset="0"/>
-              </a:rPr>
               <a:t>Conclusion</a:t>
             </a:r>
           </a:p>
@@ -7819,6 +7715,47 @@
           </a:p>
         </p:txBody>
       </p:sp>
+      <p:pic>
+        <p:nvPicPr>
+          <p:cNvPr id="1026" name="Picture 2" descr="C:\Users\Mousztomania\Documents\Workspace\AAP\android-advanced-player\AAP\docs\images\gui\5.PNG"/>
+          <p:cNvPicPr>
+            <a:picLocks noChangeAspect="1" noChangeArrowheads="1"/>
+          </p:cNvPicPr>
+          <p:nvPr/>
+        </p:nvPicPr>
+        <p:blipFill>
+          <a:blip r:embed="rId2">
+            <a:extLst>
+              <a:ext uri="{28A0092B-C50C-407E-A947-70E740481C1C}">
+                <a14:useLocalDpi xmlns:a14="http://schemas.microsoft.com/office/drawing/2010/main" val="0"/>
+              </a:ext>
+            </a:extLst>
+          </a:blip>
+          <a:srcRect/>
+          <a:stretch>
+            <a:fillRect/>
+          </a:stretch>
+        </p:blipFill>
+        <p:spPr bwMode="auto">
+          <a:xfrm>
+            <a:off x="4160745" y="2385068"/>
+            <a:ext cx="2283463" cy="3348187"/>
+          </a:xfrm>
+          <a:prstGeom prst="rect">
+            <a:avLst/>
+          </a:prstGeom>
+          <a:noFill/>
+          <a:extLst>
+            <a:ext uri="{909E8E84-426E-40DD-AFC4-6F175D3DCCD1}">
+              <a14:hiddenFill xmlns:a14="http://schemas.microsoft.com/office/drawing/2010/main">
+                <a:solidFill>
+                  <a:srgbClr val="FFFFFF"/>
+                </a:solidFill>
+              </a14:hiddenFill>
+            </a:ext>
+          </a:extLst>
+        </p:spPr>
+      </p:pic>
     </p:spTree>
   </p:cSld>
   <p:clrMapOvr>
@@ -7961,7 +7898,141 @@
                   </a:schemeClr>
                 </a:solidFill>
               </a:rPr>
-              <a:t>Les « lyrics »</a:t>
+              <a:t>Les « lyrics </a:t>
+            </a:r>
+            <a:r>
+              <a:rPr lang="fr-FR" dirty="0" smtClean="0">
+                <a:solidFill>
+                  <a:schemeClr val="tx2">
+                    <a:lumMod val="75000"/>
+                  </a:schemeClr>
+                </a:solidFill>
+              </a:rPr>
+              <a:t>»</a:t>
+            </a:r>
+          </a:p>
+          <a:p>
+            <a:pPr lvl="1">
+              <a:buFont typeface="Arial" pitchFamily="34" charset="0"/>
+              <a:buChar char="•"/>
+            </a:pPr>
+            <a:r>
+              <a:rPr lang="fr-FR" sz="2400" dirty="0" smtClean="0">
+                <a:solidFill>
+                  <a:schemeClr val="tx2">
+                    <a:lumMod val="75000"/>
+                  </a:schemeClr>
+                </a:solidFill>
+              </a:rPr>
+              <a:t>Recherche de paroles</a:t>
+            </a:r>
+            <a:endParaRPr lang="fr-FR" sz="2400" dirty="0">
+              <a:solidFill>
+                <a:schemeClr val="tx2">
+                  <a:lumMod val="75000"/>
+                </a:schemeClr>
+              </a:solidFill>
+            </a:endParaRPr>
+          </a:p>
+          <a:p>
+            <a:pPr lvl="1">
+              <a:buFont typeface="Arial" pitchFamily="34" charset="0"/>
+              <a:buChar char="•"/>
+            </a:pPr>
+            <a:r>
+              <a:rPr lang="fr-FR" sz="2400" dirty="0" smtClean="0">
+                <a:solidFill>
+                  <a:schemeClr val="tx2">
+                    <a:lumMod val="75000"/>
+                  </a:schemeClr>
+                </a:solidFill>
+              </a:rPr>
+              <a:t>Utilisation du site </a:t>
+            </a:r>
+            <a:r>
+              <a:rPr lang="fr-FR" sz="2400" dirty="0" err="1" smtClean="0">
+                <a:solidFill>
+                  <a:schemeClr val="tx2">
+                    <a:lumMod val="75000"/>
+                  </a:schemeClr>
+                </a:solidFill>
+              </a:rPr>
+              <a:t>LyricsWiki</a:t>
+            </a:r>
+            <a:r>
+              <a:rPr lang="fr-FR" sz="2400" dirty="0" smtClean="0">
+                <a:solidFill>
+                  <a:schemeClr val="tx2">
+                    <a:lumMod val="75000"/>
+                  </a:schemeClr>
+                </a:solidFill>
+              </a:rPr>
+              <a:t> et de </a:t>
+            </a:r>
+            <a:r>
+              <a:rPr lang="fr-FR" sz="2400" smtClean="0">
+                <a:solidFill>
+                  <a:schemeClr val="tx2">
+                    <a:lumMod val="75000"/>
+                  </a:schemeClr>
+                </a:solidFill>
+              </a:rPr>
+              <a:t>son API</a:t>
+            </a:r>
+            <a:endParaRPr lang="fr-FR" sz="2400" dirty="0" smtClean="0">
+              <a:solidFill>
+                <a:schemeClr val="tx2">
+                  <a:lumMod val="75000"/>
+                </a:schemeClr>
+              </a:solidFill>
+            </a:endParaRPr>
+          </a:p>
+          <a:p>
+            <a:pPr lvl="1">
+              <a:buFont typeface="Arial" pitchFamily="34" charset="0"/>
+              <a:buChar char="•"/>
+            </a:pPr>
+            <a:r>
+              <a:rPr lang="fr-FR" sz="2400" dirty="0" smtClean="0">
+                <a:solidFill>
+                  <a:schemeClr val="tx2">
+                    <a:lumMod val="75000"/>
+                  </a:schemeClr>
+                </a:solidFill>
+              </a:rPr>
+              <a:t>Traitement de données sous les formats XML et HTML</a:t>
+            </a:r>
+          </a:p>
+          <a:p>
+            <a:pPr lvl="1">
+              <a:buFont typeface="Arial" pitchFamily="34" charset="0"/>
+              <a:buChar char="•"/>
+            </a:pPr>
+            <a:r>
+              <a:rPr lang="fr-FR" sz="2400" dirty="0" smtClean="0">
+                <a:solidFill>
+                  <a:schemeClr val="tx2">
+                    <a:lumMod val="75000"/>
+                  </a:schemeClr>
+                </a:solidFill>
+              </a:rPr>
+              <a:t>Intégration dans l’interface</a:t>
+            </a:r>
+          </a:p>
+          <a:p>
+            <a:pPr lvl="1">
+              <a:buFont typeface="Arial" pitchFamily="34" charset="0"/>
+              <a:buChar char="•"/>
+            </a:pPr>
+            <a:r>
+              <a:rPr lang="fr-FR" sz="2400" dirty="0" smtClean="0">
+                <a:solidFill>
+                  <a:schemeClr val="tx2">
+                    <a:lumMod val="75000"/>
+                  </a:schemeClr>
+                </a:solidFill>
+              </a:rPr>
+              <a:t>Facilité d’utilisation</a:t>
             </a:r>
             <a:endParaRPr lang="fr-FR" dirty="0">
               <a:solidFill>
@@ -8055,8 +8126,26 @@
                 </a:solidFill>
                 <a:latin typeface="Cambria" pitchFamily="18" charset="0"/>
               </a:rPr>
-              <a:t>Outils et méthodologies </a:t>
-            </a:r>
+              <a:t>Outils et méthodologies utilisés</a:t>
+            </a:r>
+          </a:p>
+          <a:p>
+            <a:pPr marL="457200" indent="-457200">
+              <a:buFont typeface="+mj-lt"/>
+              <a:buAutoNum type="arabicPeriod"/>
+            </a:pPr>
+            <a:endParaRPr lang="fr-FR" sz="1400" dirty="0" smtClean="0">
+              <a:solidFill>
+                <a:srgbClr val="D8FBC1"/>
+              </a:solidFill>
+              <a:latin typeface="Cambria" pitchFamily="18" charset="0"/>
+            </a:endParaRPr>
+          </a:p>
+          <a:p>
+            <a:pPr marL="457200" indent="-457200">
+              <a:buFont typeface="+mj-lt"/>
+              <a:buAutoNum type="arabicPeriod"/>
+            </a:pPr>
             <a:r>
               <a:rPr lang="fr-FR" sz="1400" dirty="0" smtClean="0">
                 <a:solidFill>
@@ -8064,50 +8153,8 @@
                 </a:solidFill>
                 <a:latin typeface="Cambria" pitchFamily="18" charset="0"/>
               </a:rPr>
-              <a:t>utilisés</a:t>
-            </a:r>
-          </a:p>
-          <a:p>
-            <a:pPr marL="457200" indent="-457200">
-              <a:buFont typeface="+mj-lt"/>
-              <a:buAutoNum type="arabicPeriod"/>
-            </a:pPr>
-            <a:endParaRPr lang="fr-FR" sz="1400" dirty="0" smtClean="0">
-              <a:solidFill>
-                <a:srgbClr val="D8FBC1"/>
-              </a:solidFill>
-              <a:latin typeface="Cambria" pitchFamily="18" charset="0"/>
-            </a:endParaRPr>
-          </a:p>
-          <a:p>
-            <a:pPr marL="457200" indent="-457200">
-              <a:buFont typeface="+mj-lt"/>
-              <a:buAutoNum type="arabicPeriod"/>
-            </a:pPr>
-            <a:r>
-              <a:rPr lang="fr-FR" sz="1400" dirty="0" smtClean="0">
-                <a:solidFill>
-                  <a:srgbClr val="A4CA39"/>
-                </a:solidFill>
-                <a:latin typeface="Cambria" pitchFamily="18" charset="0"/>
-              </a:rPr>
-              <a:t>Interface </a:t>
-            </a:r>
-            <a:r>
-              <a:rPr lang="fr-FR" sz="1400" dirty="0" smtClean="0">
-                <a:solidFill>
-                  <a:srgbClr val="A4CA39"/>
-                </a:solidFill>
-                <a:latin typeface="Cambria" pitchFamily="18" charset="0"/>
-              </a:rPr>
-              <a:t>graphique</a:t>
-            </a:r>
-            <a:endParaRPr lang="fr-FR" sz="1400" dirty="0" smtClean="0">
-              <a:solidFill>
-                <a:srgbClr val="A4CA39"/>
-              </a:solidFill>
-              <a:latin typeface="Cambria" pitchFamily="18" charset="0"/>
-            </a:endParaRPr>
+              <a:t>Interface graphique</a:t>
+            </a:r>
           </a:p>
           <a:p>
             <a:pPr marL="457200" indent="-457200">
@@ -8404,8 +8451,26 @@
                 </a:solidFill>
                 <a:latin typeface="Cambria" pitchFamily="18" charset="0"/>
               </a:rPr>
-              <a:t>Outils et méthodologies </a:t>
-            </a:r>
+              <a:t>Outils et méthodologies utilisés</a:t>
+            </a:r>
+          </a:p>
+          <a:p>
+            <a:pPr marL="457200" indent="-457200">
+              <a:buFont typeface="+mj-lt"/>
+              <a:buAutoNum type="arabicPeriod"/>
+            </a:pPr>
+            <a:endParaRPr lang="fr-FR" sz="1400" dirty="0" smtClean="0">
+              <a:solidFill>
+                <a:srgbClr val="D8FBC1"/>
+              </a:solidFill>
+              <a:latin typeface="Cambria" pitchFamily="18" charset="0"/>
+            </a:endParaRPr>
+          </a:p>
+          <a:p>
+            <a:pPr marL="457200" indent="-457200">
+              <a:buFont typeface="+mj-lt"/>
+              <a:buAutoNum type="arabicPeriod"/>
+            </a:pPr>
             <a:r>
               <a:rPr lang="fr-FR" sz="1400" dirty="0" smtClean="0">
                 <a:solidFill>
@@ -8413,50 +8478,8 @@
                 </a:solidFill>
                 <a:latin typeface="Cambria" pitchFamily="18" charset="0"/>
               </a:rPr>
-              <a:t>utilisés</a:t>
-            </a:r>
-          </a:p>
-          <a:p>
-            <a:pPr marL="457200" indent="-457200">
-              <a:buFont typeface="+mj-lt"/>
-              <a:buAutoNum type="arabicPeriod"/>
-            </a:pPr>
-            <a:endParaRPr lang="fr-FR" sz="1400" dirty="0" smtClean="0">
-              <a:solidFill>
-                <a:srgbClr val="D8FBC1"/>
-              </a:solidFill>
-              <a:latin typeface="Cambria" pitchFamily="18" charset="0"/>
-            </a:endParaRPr>
-          </a:p>
-          <a:p>
-            <a:pPr marL="457200" indent="-457200">
-              <a:buFont typeface="+mj-lt"/>
-              <a:buAutoNum type="arabicPeriod"/>
-            </a:pPr>
-            <a:r>
-              <a:rPr lang="fr-FR" sz="1400" dirty="0" smtClean="0">
-                <a:solidFill>
-                  <a:srgbClr val="A4CA39"/>
-                </a:solidFill>
-                <a:latin typeface="Cambria" pitchFamily="18" charset="0"/>
-              </a:rPr>
-              <a:t>Interface </a:t>
-            </a:r>
-            <a:r>
-              <a:rPr lang="fr-FR" sz="1400" dirty="0" smtClean="0">
-                <a:solidFill>
-                  <a:srgbClr val="A4CA39"/>
-                </a:solidFill>
-                <a:latin typeface="Cambria" pitchFamily="18" charset="0"/>
-              </a:rPr>
-              <a:t>graphique</a:t>
-            </a:r>
-            <a:endParaRPr lang="fr-FR" sz="1400" dirty="0" smtClean="0">
-              <a:solidFill>
-                <a:srgbClr val="A4CA39"/>
-              </a:solidFill>
-              <a:latin typeface="Cambria" pitchFamily="18" charset="0"/>
-            </a:endParaRPr>
+              <a:t>Interface graphique</a:t>
+            </a:r>
           </a:p>
           <a:p>
             <a:pPr marL="457200" indent="-457200">
@@ -8939,17 +8962,7 @@
                   </a:schemeClr>
                 </a:solidFill>
               </a:rPr>
-              <a:t>Les métadonnées dans </a:t>
-            </a:r>
-            <a:r>
-              <a:rPr lang="fr-FR" sz="2400" smtClean="0">
-                <a:solidFill>
-                  <a:schemeClr val="tx2">
-                    <a:lumMod val="75000"/>
-                  </a:schemeClr>
-                </a:solidFill>
-              </a:rPr>
-              <a:t>un fichier audio</a:t>
+              <a:t>Les métadonnées dans un fichier audio</a:t>
             </a:r>
             <a:endParaRPr lang="fr-FR" sz="2400" dirty="0">
               <a:solidFill>
@@ -9043,8 +9056,26 @@
                 </a:solidFill>
                 <a:latin typeface="Cambria" pitchFamily="18" charset="0"/>
               </a:rPr>
-              <a:t>Outils et méthodologies </a:t>
-            </a:r>
+              <a:t>Outils et méthodologies utilisés</a:t>
+            </a:r>
+          </a:p>
+          <a:p>
+            <a:pPr marL="457200" indent="-457200">
+              <a:buFont typeface="+mj-lt"/>
+              <a:buAutoNum type="arabicPeriod"/>
+            </a:pPr>
+            <a:endParaRPr lang="fr-FR" sz="1400" dirty="0" smtClean="0">
+              <a:solidFill>
+                <a:srgbClr val="D8FBC1"/>
+              </a:solidFill>
+              <a:latin typeface="Cambria" pitchFamily="18" charset="0"/>
+            </a:endParaRPr>
+          </a:p>
+          <a:p>
+            <a:pPr marL="457200" indent="-457200">
+              <a:buFont typeface="+mj-lt"/>
+              <a:buAutoNum type="arabicPeriod"/>
+            </a:pPr>
             <a:r>
               <a:rPr lang="fr-FR" sz="1400" dirty="0" smtClean="0">
                 <a:solidFill>
@@ -9052,50 +9083,8 @@
                 </a:solidFill>
                 <a:latin typeface="Cambria" pitchFamily="18" charset="0"/>
               </a:rPr>
-              <a:t>utilisés</a:t>
-            </a:r>
-          </a:p>
-          <a:p>
-            <a:pPr marL="457200" indent="-457200">
-              <a:buFont typeface="+mj-lt"/>
-              <a:buAutoNum type="arabicPeriod"/>
-            </a:pPr>
-            <a:endParaRPr lang="fr-FR" sz="1400" dirty="0" smtClean="0">
-              <a:solidFill>
-                <a:srgbClr val="D8FBC1"/>
-              </a:solidFill>
-              <a:latin typeface="Cambria" pitchFamily="18" charset="0"/>
-            </a:endParaRPr>
-          </a:p>
-          <a:p>
-            <a:pPr marL="457200" indent="-457200">
-              <a:buFont typeface="+mj-lt"/>
-              <a:buAutoNum type="arabicPeriod"/>
-            </a:pPr>
-            <a:r>
-              <a:rPr lang="fr-FR" sz="1400" dirty="0" smtClean="0">
-                <a:solidFill>
-                  <a:srgbClr val="A4CA39"/>
-                </a:solidFill>
-                <a:latin typeface="Cambria" pitchFamily="18" charset="0"/>
-              </a:rPr>
-              <a:t>Interface </a:t>
-            </a:r>
-            <a:r>
-              <a:rPr lang="fr-FR" sz="1400" dirty="0" smtClean="0">
-                <a:solidFill>
-                  <a:srgbClr val="A4CA39"/>
-                </a:solidFill>
-                <a:latin typeface="Cambria" pitchFamily="18" charset="0"/>
-              </a:rPr>
-              <a:t>graphique</a:t>
-            </a:r>
-            <a:endParaRPr lang="fr-FR" sz="1400" dirty="0" smtClean="0">
-              <a:solidFill>
-                <a:srgbClr val="A4CA39"/>
-              </a:solidFill>
-              <a:latin typeface="Cambria" pitchFamily="18" charset="0"/>
-            </a:endParaRPr>
+              <a:t>Interface graphique</a:t>
+            </a:r>
           </a:p>
           <a:p>
             <a:pPr marL="457200" indent="-457200">
@@ -9399,15 +9388,7 @@
                   <a:srgbClr val="A4CA39"/>
                 </a:solidFill>
               </a:rPr>
-              <a:t>Outils et méthodologies </a:t>
-            </a:r>
-            <a:r>
-              <a:rPr lang="fr-FR" sz="3400" dirty="0" smtClean="0">
-                <a:solidFill>
-                  <a:srgbClr val="A4CA39"/>
-                </a:solidFill>
-              </a:rPr>
-              <a:t>utilisés</a:t>
+              <a:t>Outils et méthodologies utilisés</a:t>
             </a:r>
           </a:p>
           <a:p>
@@ -9483,12 +9464,6 @@
               </a:rPr>
               <a:t>Les écrans</a:t>
             </a:r>
-            <a:endParaRPr lang="fr-FR" sz="2900" dirty="0" smtClean="0">
-              <a:solidFill>
-                <a:srgbClr val="D8FBC1"/>
-              </a:solidFill>
-              <a:latin typeface="Cambria" pitchFamily="18" charset="0"/>
-            </a:endParaRPr>
           </a:p>
           <a:p>
             <a:pPr marL="514350" indent="-514350" algn="l">
@@ -10063,8 +10038,26 @@
                 </a:solidFill>
                 <a:latin typeface="Cambria" pitchFamily="18" charset="0"/>
               </a:rPr>
-              <a:t>Outils et méthodologies </a:t>
-            </a:r>
+              <a:t>Outils et méthodologies utilisés</a:t>
+            </a:r>
+          </a:p>
+          <a:p>
+            <a:pPr marL="457200" indent="-457200">
+              <a:buFont typeface="+mj-lt"/>
+              <a:buAutoNum type="arabicPeriod"/>
+            </a:pPr>
+            <a:endParaRPr lang="fr-FR" sz="1400" dirty="0" smtClean="0">
+              <a:solidFill>
+                <a:srgbClr val="D8FBC1"/>
+              </a:solidFill>
+              <a:latin typeface="Cambria" pitchFamily="18" charset="0"/>
+            </a:endParaRPr>
+          </a:p>
+          <a:p>
+            <a:pPr marL="457200" indent="-457200">
+              <a:buFont typeface="+mj-lt"/>
+              <a:buAutoNum type="arabicPeriod"/>
+            </a:pPr>
             <a:r>
               <a:rPr lang="fr-FR" sz="1400" dirty="0" smtClean="0">
                 <a:solidFill>
@@ -10072,50 +10065,8 @@
                 </a:solidFill>
                 <a:latin typeface="Cambria" pitchFamily="18" charset="0"/>
               </a:rPr>
-              <a:t>utilisés</a:t>
-            </a:r>
-          </a:p>
-          <a:p>
-            <a:pPr marL="457200" indent="-457200">
-              <a:buFont typeface="+mj-lt"/>
-              <a:buAutoNum type="arabicPeriod"/>
-            </a:pPr>
-            <a:endParaRPr lang="fr-FR" sz="1400" dirty="0" smtClean="0">
-              <a:solidFill>
-                <a:srgbClr val="D8FBC1"/>
-              </a:solidFill>
-              <a:latin typeface="Cambria" pitchFamily="18" charset="0"/>
-            </a:endParaRPr>
-          </a:p>
-          <a:p>
-            <a:pPr marL="457200" indent="-457200">
-              <a:buFont typeface="+mj-lt"/>
-              <a:buAutoNum type="arabicPeriod"/>
-            </a:pPr>
-            <a:r>
-              <a:rPr lang="fr-FR" sz="1400" dirty="0" smtClean="0">
-                <a:solidFill>
-                  <a:srgbClr val="A4CA39"/>
-                </a:solidFill>
-                <a:latin typeface="Cambria" pitchFamily="18" charset="0"/>
-              </a:rPr>
-              <a:t>Interface </a:t>
-            </a:r>
-            <a:r>
-              <a:rPr lang="fr-FR" sz="1400" dirty="0" smtClean="0">
-                <a:solidFill>
-                  <a:srgbClr val="A4CA39"/>
-                </a:solidFill>
-                <a:latin typeface="Cambria" pitchFamily="18" charset="0"/>
-              </a:rPr>
-              <a:t>graphique</a:t>
-            </a:r>
-            <a:endParaRPr lang="fr-FR" sz="1400" dirty="0" smtClean="0">
-              <a:solidFill>
-                <a:srgbClr val="A4CA39"/>
-              </a:solidFill>
-              <a:latin typeface="Cambria" pitchFamily="18" charset="0"/>
-            </a:endParaRPr>
+              <a:t>Interface graphique</a:t>
+            </a:r>
           </a:p>
           <a:p>
             <a:pPr marL="457200" indent="-457200">
@@ -10709,8 +10660,26 @@
                 </a:solidFill>
                 <a:latin typeface="Cambria" pitchFamily="18" charset="0"/>
               </a:rPr>
-              <a:t>Outils et méthodologies </a:t>
-            </a:r>
+              <a:t>Outils et méthodologies utilisés</a:t>
+            </a:r>
+          </a:p>
+          <a:p>
+            <a:pPr marL="457200" indent="-457200">
+              <a:buFont typeface="+mj-lt"/>
+              <a:buAutoNum type="arabicPeriod"/>
+            </a:pPr>
+            <a:endParaRPr lang="fr-FR" sz="1400" dirty="0" smtClean="0">
+              <a:solidFill>
+                <a:srgbClr val="D8FBC1"/>
+              </a:solidFill>
+              <a:latin typeface="Cambria" pitchFamily="18" charset="0"/>
+            </a:endParaRPr>
+          </a:p>
+          <a:p>
+            <a:pPr marL="457200" indent="-457200">
+              <a:buFont typeface="+mj-lt"/>
+              <a:buAutoNum type="arabicPeriod"/>
+            </a:pPr>
             <a:r>
               <a:rPr lang="fr-FR" sz="1400" dirty="0" smtClean="0">
                 <a:solidFill>
@@ -10718,50 +10687,8 @@
                 </a:solidFill>
                 <a:latin typeface="Cambria" pitchFamily="18" charset="0"/>
               </a:rPr>
-              <a:t>utilisés</a:t>
-            </a:r>
-          </a:p>
-          <a:p>
-            <a:pPr marL="457200" indent="-457200">
-              <a:buFont typeface="+mj-lt"/>
-              <a:buAutoNum type="arabicPeriod"/>
-            </a:pPr>
-            <a:endParaRPr lang="fr-FR" sz="1400" dirty="0" smtClean="0">
-              <a:solidFill>
-                <a:srgbClr val="D8FBC1"/>
-              </a:solidFill>
-              <a:latin typeface="Cambria" pitchFamily="18" charset="0"/>
-            </a:endParaRPr>
-          </a:p>
-          <a:p>
-            <a:pPr marL="457200" indent="-457200">
-              <a:buFont typeface="+mj-lt"/>
-              <a:buAutoNum type="arabicPeriod"/>
-            </a:pPr>
-            <a:r>
-              <a:rPr lang="fr-FR" sz="1400" dirty="0" smtClean="0">
-                <a:solidFill>
-                  <a:srgbClr val="A4CA39"/>
-                </a:solidFill>
-                <a:latin typeface="Cambria" pitchFamily="18" charset="0"/>
-              </a:rPr>
-              <a:t>Interface </a:t>
-            </a:r>
-            <a:r>
-              <a:rPr lang="fr-FR" sz="1400" dirty="0" smtClean="0">
-                <a:solidFill>
-                  <a:srgbClr val="A4CA39"/>
-                </a:solidFill>
-                <a:latin typeface="Cambria" pitchFamily="18" charset="0"/>
-              </a:rPr>
-              <a:t>graphique</a:t>
-            </a:r>
-            <a:endParaRPr lang="fr-FR" sz="1400" dirty="0" smtClean="0">
-              <a:solidFill>
-                <a:srgbClr val="A4CA39"/>
-              </a:solidFill>
-              <a:latin typeface="Cambria" pitchFamily="18" charset="0"/>
-            </a:endParaRPr>
+              <a:t>Interface graphique</a:t>
+            </a:r>
           </a:p>
           <a:p>
             <a:pPr marL="457200" indent="-457200">
@@ -11205,8 +11132,26 @@
                 </a:solidFill>
                 <a:latin typeface="Cambria" pitchFamily="18" charset="0"/>
               </a:rPr>
-              <a:t>Outils et méthodologies </a:t>
-            </a:r>
+              <a:t>Outils et méthodologies utilisés</a:t>
+            </a:r>
+          </a:p>
+          <a:p>
+            <a:pPr marL="457200" indent="-457200">
+              <a:buFont typeface="+mj-lt"/>
+              <a:buAutoNum type="arabicPeriod"/>
+            </a:pPr>
+            <a:endParaRPr lang="fr-FR" sz="1400" dirty="0" smtClean="0">
+              <a:solidFill>
+                <a:srgbClr val="D8FBC1"/>
+              </a:solidFill>
+              <a:latin typeface="Cambria" pitchFamily="18" charset="0"/>
+            </a:endParaRPr>
+          </a:p>
+          <a:p>
+            <a:pPr marL="457200" indent="-457200">
+              <a:buFont typeface="+mj-lt"/>
+              <a:buAutoNum type="arabicPeriod"/>
+            </a:pPr>
             <a:r>
               <a:rPr lang="fr-FR" sz="1400" dirty="0" smtClean="0">
                 <a:solidFill>
@@ -11214,50 +11159,8 @@
                 </a:solidFill>
                 <a:latin typeface="Cambria" pitchFamily="18" charset="0"/>
               </a:rPr>
-              <a:t>utilisés</a:t>
-            </a:r>
-          </a:p>
-          <a:p>
-            <a:pPr marL="457200" indent="-457200">
-              <a:buFont typeface="+mj-lt"/>
-              <a:buAutoNum type="arabicPeriod"/>
-            </a:pPr>
-            <a:endParaRPr lang="fr-FR" sz="1400" dirty="0" smtClean="0">
-              <a:solidFill>
-                <a:srgbClr val="D8FBC1"/>
-              </a:solidFill>
-              <a:latin typeface="Cambria" pitchFamily="18" charset="0"/>
-            </a:endParaRPr>
-          </a:p>
-          <a:p>
-            <a:pPr marL="457200" indent="-457200">
-              <a:buFont typeface="+mj-lt"/>
-              <a:buAutoNum type="arabicPeriod"/>
-            </a:pPr>
-            <a:r>
-              <a:rPr lang="fr-FR" sz="1400" dirty="0" smtClean="0">
-                <a:solidFill>
-                  <a:srgbClr val="A4CA39"/>
-                </a:solidFill>
-                <a:latin typeface="Cambria" pitchFamily="18" charset="0"/>
-              </a:rPr>
-              <a:t>Interface </a:t>
-            </a:r>
-            <a:r>
-              <a:rPr lang="fr-FR" sz="1400" dirty="0" smtClean="0">
-                <a:solidFill>
-                  <a:srgbClr val="A4CA39"/>
-                </a:solidFill>
-                <a:latin typeface="Cambria" pitchFamily="18" charset="0"/>
-              </a:rPr>
-              <a:t>graphique</a:t>
-            </a:r>
-            <a:endParaRPr lang="fr-FR" sz="1400" dirty="0" smtClean="0">
-              <a:solidFill>
-                <a:srgbClr val="A4CA39"/>
-              </a:solidFill>
-              <a:latin typeface="Cambria" pitchFamily="18" charset="0"/>
-            </a:endParaRPr>
+              <a:t>Interface graphique</a:t>
+            </a:r>
           </a:p>
           <a:p>
             <a:pPr marL="457200" indent="-457200">
@@ -11605,8 +11508,26 @@
                 </a:solidFill>
                 <a:latin typeface="Cambria" pitchFamily="18" charset="0"/>
               </a:rPr>
-              <a:t>Outils et méthodologies </a:t>
-            </a:r>
+              <a:t>Outils et méthodologies utilisés</a:t>
+            </a:r>
+          </a:p>
+          <a:p>
+            <a:pPr marL="457200" indent="-457200">
+              <a:buFont typeface="+mj-lt"/>
+              <a:buAutoNum type="arabicPeriod"/>
+            </a:pPr>
+            <a:endParaRPr lang="fr-FR" sz="1400" dirty="0" smtClean="0">
+              <a:solidFill>
+                <a:srgbClr val="D8FBC1"/>
+              </a:solidFill>
+              <a:latin typeface="Cambria" pitchFamily="18" charset="0"/>
+            </a:endParaRPr>
+          </a:p>
+          <a:p>
+            <a:pPr marL="457200" indent="-457200">
+              <a:buFont typeface="+mj-lt"/>
+              <a:buAutoNum type="arabicPeriod"/>
+            </a:pPr>
             <a:r>
               <a:rPr lang="fr-FR" sz="1400" dirty="0" smtClean="0">
                 <a:solidFill>
@@ -11614,50 +11535,8 @@
                 </a:solidFill>
                 <a:latin typeface="Cambria" pitchFamily="18" charset="0"/>
               </a:rPr>
-              <a:t>utilisés</a:t>
-            </a:r>
-          </a:p>
-          <a:p>
-            <a:pPr marL="457200" indent="-457200">
-              <a:buFont typeface="+mj-lt"/>
-              <a:buAutoNum type="arabicPeriod"/>
-            </a:pPr>
-            <a:endParaRPr lang="fr-FR" sz="1400" dirty="0" smtClean="0">
-              <a:solidFill>
-                <a:srgbClr val="D8FBC1"/>
-              </a:solidFill>
-              <a:latin typeface="Cambria" pitchFamily="18" charset="0"/>
-            </a:endParaRPr>
-          </a:p>
-          <a:p>
-            <a:pPr marL="457200" indent="-457200">
-              <a:buFont typeface="+mj-lt"/>
-              <a:buAutoNum type="arabicPeriod"/>
-            </a:pPr>
-            <a:r>
-              <a:rPr lang="fr-FR" sz="1400" dirty="0" smtClean="0">
-                <a:solidFill>
-                  <a:srgbClr val="A4CA39"/>
-                </a:solidFill>
-                <a:latin typeface="Cambria" pitchFamily="18" charset="0"/>
-              </a:rPr>
-              <a:t>Interface </a:t>
-            </a:r>
-            <a:r>
-              <a:rPr lang="fr-FR" sz="1400" dirty="0" smtClean="0">
-                <a:solidFill>
-                  <a:srgbClr val="A4CA39"/>
-                </a:solidFill>
-                <a:latin typeface="Cambria" pitchFamily="18" charset="0"/>
-              </a:rPr>
-              <a:t>graphique</a:t>
-            </a:r>
-            <a:endParaRPr lang="fr-FR" sz="1400" dirty="0" smtClean="0">
-              <a:solidFill>
-                <a:srgbClr val="A4CA39"/>
-              </a:solidFill>
-              <a:latin typeface="Cambria" pitchFamily="18" charset="0"/>
-            </a:endParaRPr>
+              <a:t>Interface graphique</a:t>
+            </a:r>
           </a:p>
           <a:p>
             <a:pPr marL="457200" indent="-457200">
@@ -12095,8 +11974,26 @@
                 </a:solidFill>
                 <a:latin typeface="Cambria" pitchFamily="18" charset="0"/>
               </a:rPr>
-              <a:t>Outils et méthodologies </a:t>
-            </a:r>
+              <a:t>Outils et méthodologies utilisés</a:t>
+            </a:r>
+          </a:p>
+          <a:p>
+            <a:pPr marL="457200" indent="-457200">
+              <a:buFont typeface="+mj-lt"/>
+              <a:buAutoNum type="arabicPeriod"/>
+            </a:pPr>
+            <a:endParaRPr lang="fr-FR" sz="1400" dirty="0" smtClean="0">
+              <a:solidFill>
+                <a:srgbClr val="D8FBC1"/>
+              </a:solidFill>
+              <a:latin typeface="Cambria" pitchFamily="18" charset="0"/>
+            </a:endParaRPr>
+          </a:p>
+          <a:p>
+            <a:pPr marL="457200" indent="-457200">
+              <a:buFont typeface="+mj-lt"/>
+              <a:buAutoNum type="arabicPeriod"/>
+            </a:pPr>
             <a:r>
               <a:rPr lang="fr-FR" sz="1400" dirty="0" smtClean="0">
                 <a:solidFill>
@@ -12104,50 +12001,8 @@
                 </a:solidFill>
                 <a:latin typeface="Cambria" pitchFamily="18" charset="0"/>
               </a:rPr>
-              <a:t>utilisés</a:t>
-            </a:r>
-          </a:p>
-          <a:p>
-            <a:pPr marL="457200" indent="-457200">
-              <a:buFont typeface="+mj-lt"/>
-              <a:buAutoNum type="arabicPeriod"/>
-            </a:pPr>
-            <a:endParaRPr lang="fr-FR" sz="1400" dirty="0" smtClean="0">
-              <a:solidFill>
-                <a:srgbClr val="D8FBC1"/>
-              </a:solidFill>
-              <a:latin typeface="Cambria" pitchFamily="18" charset="0"/>
-            </a:endParaRPr>
-          </a:p>
-          <a:p>
-            <a:pPr marL="457200" indent="-457200">
-              <a:buFont typeface="+mj-lt"/>
-              <a:buAutoNum type="arabicPeriod"/>
-            </a:pPr>
-            <a:r>
-              <a:rPr lang="fr-FR" sz="1400" dirty="0" smtClean="0">
-                <a:solidFill>
-                  <a:srgbClr val="A4CA39"/>
-                </a:solidFill>
-                <a:latin typeface="Cambria" pitchFamily="18" charset="0"/>
-              </a:rPr>
-              <a:t>Interface </a:t>
-            </a:r>
-            <a:r>
-              <a:rPr lang="fr-FR" sz="1400" dirty="0" smtClean="0">
-                <a:solidFill>
-                  <a:srgbClr val="A4CA39"/>
-                </a:solidFill>
-                <a:latin typeface="Cambria" pitchFamily="18" charset="0"/>
-              </a:rPr>
-              <a:t>graphique</a:t>
-            </a:r>
-            <a:endParaRPr lang="fr-FR" sz="1400" dirty="0" smtClean="0">
-              <a:solidFill>
-                <a:srgbClr val="A4CA39"/>
-              </a:solidFill>
-              <a:latin typeface="Cambria" pitchFamily="18" charset="0"/>
-            </a:endParaRPr>
+              <a:t>Interface graphique</a:t>
+            </a:r>
           </a:p>
           <a:p>
             <a:pPr marL="457200" indent="-457200">
@@ -12471,8 +12326,26 @@
                 </a:solidFill>
                 <a:latin typeface="Cambria" pitchFamily="18" charset="0"/>
               </a:rPr>
-              <a:t>Outils et méthodologies </a:t>
-            </a:r>
+              <a:t>Outils et méthodologies utilisés</a:t>
+            </a:r>
+          </a:p>
+          <a:p>
+            <a:pPr marL="457200" indent="-457200">
+              <a:buFont typeface="+mj-lt"/>
+              <a:buAutoNum type="arabicPeriod"/>
+            </a:pPr>
+            <a:endParaRPr lang="fr-FR" sz="1400" dirty="0" smtClean="0">
+              <a:solidFill>
+                <a:srgbClr val="D8FBC1"/>
+              </a:solidFill>
+              <a:latin typeface="Cambria" pitchFamily="18" charset="0"/>
+            </a:endParaRPr>
+          </a:p>
+          <a:p>
+            <a:pPr marL="457200" indent="-457200">
+              <a:buFont typeface="+mj-lt"/>
+              <a:buAutoNum type="arabicPeriod"/>
+            </a:pPr>
             <a:r>
               <a:rPr lang="fr-FR" sz="1400" dirty="0" smtClean="0">
                 <a:solidFill>
@@ -12480,50 +12353,8 @@
                 </a:solidFill>
                 <a:latin typeface="Cambria" pitchFamily="18" charset="0"/>
               </a:rPr>
-              <a:t>utilisés</a:t>
-            </a:r>
-          </a:p>
-          <a:p>
-            <a:pPr marL="457200" indent="-457200">
-              <a:buFont typeface="+mj-lt"/>
-              <a:buAutoNum type="arabicPeriod"/>
-            </a:pPr>
-            <a:endParaRPr lang="fr-FR" sz="1400" dirty="0" smtClean="0">
-              <a:solidFill>
-                <a:srgbClr val="D8FBC1"/>
-              </a:solidFill>
-              <a:latin typeface="Cambria" pitchFamily="18" charset="0"/>
-            </a:endParaRPr>
-          </a:p>
-          <a:p>
-            <a:pPr marL="457200" indent="-457200">
-              <a:buFont typeface="+mj-lt"/>
-              <a:buAutoNum type="arabicPeriod"/>
-            </a:pPr>
-            <a:r>
-              <a:rPr lang="fr-FR" sz="1400" dirty="0" smtClean="0">
-                <a:solidFill>
-                  <a:srgbClr val="A4CA39"/>
-                </a:solidFill>
-                <a:latin typeface="Cambria" pitchFamily="18" charset="0"/>
-              </a:rPr>
-              <a:t>Interface </a:t>
-            </a:r>
-            <a:r>
-              <a:rPr lang="fr-FR" sz="1400" dirty="0" smtClean="0">
-                <a:solidFill>
-                  <a:srgbClr val="A4CA39"/>
-                </a:solidFill>
-                <a:latin typeface="Cambria" pitchFamily="18" charset="0"/>
-              </a:rPr>
-              <a:t>graphique</a:t>
-            </a:r>
-            <a:endParaRPr lang="fr-FR" sz="1400" dirty="0" smtClean="0">
-              <a:solidFill>
-                <a:srgbClr val="A4CA39"/>
-              </a:solidFill>
-              <a:latin typeface="Cambria" pitchFamily="18" charset="0"/>
-            </a:endParaRPr>
+              <a:t>Interface graphique</a:t>
+            </a:r>
           </a:p>
           <a:p>
             <a:pPr marL="457200" indent="-457200">
@@ -13017,58 +12848,40 @@
                 </a:solidFill>
                 <a:latin typeface="Cambria" pitchFamily="18" charset="0"/>
               </a:rPr>
-              <a:t>Outils et méthodologies </a:t>
-            </a:r>
+              <a:t>Outils et méthodologies utilisés</a:t>
+            </a:r>
+            <a:endParaRPr lang="fr-FR" sz="1400" dirty="0" smtClean="0">
+              <a:solidFill>
+                <a:srgbClr val="A4CA39"/>
+              </a:solidFill>
+              <a:latin typeface="Cambria" pitchFamily="18" charset="0"/>
+            </a:endParaRPr>
+          </a:p>
+          <a:p>
+            <a:pPr marL="457200" indent="-457200">
+              <a:buFont typeface="+mj-lt"/>
+              <a:buAutoNum type="arabicPeriod"/>
+            </a:pPr>
+            <a:endParaRPr lang="fr-FR" sz="1400" dirty="0" smtClean="0">
+              <a:solidFill>
+                <a:srgbClr val="D8FBC1"/>
+              </a:solidFill>
+              <a:latin typeface="Cambria" pitchFamily="18" charset="0"/>
+            </a:endParaRPr>
+          </a:p>
+          <a:p>
+            <a:pPr marL="457200" indent="-457200">
+              <a:buFont typeface="+mj-lt"/>
+              <a:buAutoNum type="arabicPeriod"/>
+            </a:pPr>
             <a:r>
               <a:rPr lang="fr-FR" sz="1400" dirty="0" smtClean="0">
                 <a:solidFill>
-                  <a:srgbClr val="D8FBC1"/>
-                </a:solidFill>
-                <a:latin typeface="Cambria" pitchFamily="18" charset="0"/>
-              </a:rPr>
-              <a:t>utilisés</a:t>
-            </a:r>
-            <a:endParaRPr lang="fr-FR" sz="1400" dirty="0" smtClean="0">
-              <a:solidFill>
-                <a:srgbClr val="A4CA39"/>
-              </a:solidFill>
-              <a:latin typeface="Cambria" pitchFamily="18" charset="0"/>
-            </a:endParaRPr>
-          </a:p>
-          <a:p>
-            <a:pPr marL="457200" indent="-457200">
-              <a:buFont typeface="+mj-lt"/>
-              <a:buAutoNum type="arabicPeriod"/>
-            </a:pPr>
-            <a:endParaRPr lang="fr-FR" sz="1400" dirty="0" smtClean="0">
-              <a:solidFill>
-                <a:srgbClr val="D8FBC1"/>
-              </a:solidFill>
-              <a:latin typeface="Cambria" pitchFamily="18" charset="0"/>
-            </a:endParaRPr>
-          </a:p>
-          <a:p>
-            <a:pPr marL="457200" indent="-457200">
-              <a:buFont typeface="+mj-lt"/>
-              <a:buAutoNum type="arabicPeriod"/>
-            </a:pPr>
-            <a:r>
-              <a:rPr lang="fr-FR" sz="1400" dirty="0" smtClean="0">
-                <a:solidFill>
                   <a:srgbClr val="A4CA39"/>
                 </a:solidFill>
                 <a:latin typeface="Cambria" pitchFamily="18" charset="0"/>
               </a:rPr>
-              <a:t>Interface </a:t>
-            </a:r>
-            <a:r>
-              <a:rPr lang="fr-FR" sz="1400" dirty="0" smtClean="0">
-                <a:solidFill>
-                  <a:srgbClr val="A4CA39"/>
-                </a:solidFill>
-                <a:latin typeface="Cambria" pitchFamily="18" charset="0"/>
-              </a:rPr>
-              <a:t>graphique</a:t>
+              <a:t>Interface graphique</a:t>
             </a:r>
             <a:endParaRPr lang="fr-FR" sz="1400" dirty="0" smtClean="0">
               <a:solidFill>
@@ -13215,11 +13028,7 @@
           <a:p>
             <a:r>
               <a:rPr lang="fr-FR" dirty="0" smtClean="0"/>
-              <a:t>I</a:t>
-            </a:r>
-            <a:r>
-              <a:rPr lang="fr-FR" dirty="0" smtClean="0"/>
-              <a:t>nterface graphique</a:t>
+              <a:t>Interface graphique</a:t>
             </a:r>
             <a:endParaRPr lang="fr-FR" dirty="0"/>
           </a:p>
@@ -13399,17 +13208,7 @@
                   </a:schemeClr>
                 </a:solidFill>
               </a:rPr>
-              <a:t>p</a:t>
-            </a:r>
-            <a:r>
-              <a:rPr lang="fr-FR" dirty="0" smtClean="0">
-                <a:solidFill>
-                  <a:schemeClr val="tx2">
-                    <a:lumMod val="75000"/>
-                  </a:schemeClr>
-                </a:solidFill>
-              </a:rPr>
-              <a:t>rofessionnelles pour les musiciens.</a:t>
+              <a:t>professionnelles pour les musiciens.</a:t>
             </a:r>
             <a:endParaRPr lang="fr-FR" dirty="0">
               <a:solidFill>
@@ -13503,50 +13302,35 @@
                 </a:solidFill>
                 <a:latin typeface="Cambria" pitchFamily="18" charset="0"/>
               </a:rPr>
-              <a:t>Outils et méthodologies </a:t>
-            </a:r>
+              <a:t>Outils et méthodologies utilisés</a:t>
+            </a:r>
+          </a:p>
+          <a:p>
+            <a:pPr marL="457200" indent="-457200">
+              <a:buFont typeface="+mj-lt"/>
+              <a:buAutoNum type="arabicPeriod"/>
+            </a:pPr>
+            <a:endParaRPr lang="fr-FR" sz="1400" dirty="0" smtClean="0">
+              <a:solidFill>
+                <a:srgbClr val="D8FBC1"/>
+              </a:solidFill>
+              <a:latin typeface="Cambria" pitchFamily="18" charset="0"/>
+            </a:endParaRPr>
+          </a:p>
+          <a:p>
+            <a:pPr marL="457200" indent="-457200">
+              <a:buFont typeface="+mj-lt"/>
+              <a:buAutoNum type="arabicPeriod"/>
+            </a:pPr>
             <a:r>
               <a:rPr lang="fr-FR" sz="1400" dirty="0" smtClean="0">
                 <a:solidFill>
-                  <a:srgbClr val="A4CA39"/>
-                </a:solidFill>
-                <a:latin typeface="Cambria" pitchFamily="18" charset="0"/>
-              </a:rPr>
-              <a:t>utilisés</a:t>
-            </a:r>
-          </a:p>
-          <a:p>
-            <a:pPr marL="457200" indent="-457200">
-              <a:buFont typeface="+mj-lt"/>
-              <a:buAutoNum type="arabicPeriod"/>
-            </a:pPr>
-            <a:endParaRPr lang="fr-FR" sz="1400" dirty="0" smtClean="0">
-              <a:solidFill>
-                <a:srgbClr val="D8FBC1"/>
-              </a:solidFill>
-              <a:latin typeface="Cambria" pitchFamily="18" charset="0"/>
-            </a:endParaRPr>
-          </a:p>
-          <a:p>
-            <a:pPr marL="457200" indent="-457200">
-              <a:buFont typeface="+mj-lt"/>
-              <a:buAutoNum type="arabicPeriod"/>
-            </a:pPr>
-            <a:r>
-              <a:rPr lang="fr-FR" sz="1400" dirty="0" smtClean="0">
-                <a:solidFill>
                   <a:srgbClr val="D8FBC1"/>
                 </a:solidFill>
                 <a:latin typeface="Cambria" pitchFamily="18" charset="0"/>
               </a:rPr>
               <a:t>Interface graphique</a:t>
             </a:r>
-            <a:endParaRPr lang="fr-FR" sz="1400" dirty="0" smtClean="0">
-              <a:solidFill>
-                <a:srgbClr val="D8FBC1"/>
-              </a:solidFill>
-              <a:latin typeface="Cambria" pitchFamily="18" charset="0"/>
-            </a:endParaRPr>
           </a:p>
           <a:p>
             <a:pPr marL="457200" indent="-457200">

</xml_diff>

<commit_message>
Rapport et Présentation version béta presque finale !
</commit_message>
<xml_diff>
--- a/AAP/docs/Presentation.pptx
+++ b/AAP/docs/Presentation.pptx
@@ -7,6 +7,9 @@
   <p:notesMasterIdLst>
     <p:notesMasterId r:id="rId23"/>
   </p:notesMasterIdLst>
+  <p:handoutMasterIdLst>
+    <p:handoutMasterId r:id="rId24"/>
+  </p:handoutMasterIdLst>
   <p:sldIdLst>
     <p:sldId id="256" r:id="rId2"/>
     <p:sldId id="257" r:id="rId3"/>
@@ -130,6 +133,166 @@
 </p:presentation>
 </file>
 
+<file path=ppt/handoutMasters/handoutMaster1.xml><?xml version="1.0" encoding="utf-8"?>
+<p:handoutMaster xmlns:a="http://schemas.openxmlformats.org/drawingml/2006/main" xmlns:r="http://schemas.openxmlformats.org/officeDocument/2006/relationships" xmlns:p="http://schemas.openxmlformats.org/presentationml/2006/main">
+  <p:cSld>
+    <p:bg>
+      <p:bgRef idx="1001">
+        <a:schemeClr val="bg1"/>
+      </p:bgRef>
+    </p:bg>
+    <p:spTree>
+      <p:nvGrpSpPr>
+        <p:cNvPr id="1" name=""/>
+        <p:cNvGrpSpPr/>
+        <p:nvPr/>
+      </p:nvGrpSpPr>
+      <p:grpSpPr>
+        <a:xfrm>
+          <a:off x="0" y="0"/>
+          <a:ext cx="0" cy="0"/>
+          <a:chOff x="0" y="0"/>
+          <a:chExt cx="0" cy="0"/>
+        </a:xfrm>
+      </p:grpSpPr>
+      <p:sp>
+        <p:nvSpPr>
+          <p:cNvPr id="2" name="Espace réservé de l'en-tête 1"/>
+          <p:cNvSpPr>
+            <a:spLocks noGrp="1"/>
+          </p:cNvSpPr>
+          <p:nvPr>
+            <p:ph type="hdr" sz="quarter"/>
+          </p:nvPr>
+        </p:nvSpPr>
+        <p:spPr>
+          <a:xfrm>
+            <a:off x="0" y="0"/>
+            <a:ext cx="2971800" cy="457200"/>
+          </a:xfrm>
+          <a:prstGeom prst="rect">
+            <a:avLst/>
+          </a:prstGeom>
+        </p:spPr>
+        <p:txBody>
+          <a:bodyPr vert="horz" lIns="91440" tIns="45720" rIns="91440" bIns="45720" rtlCol="0"/>
+          <a:lstStyle>
+            <a:lvl1pPr algn="l">
+              <a:defRPr sz="1200"/>
+            </a:lvl1pPr>
+          </a:lstStyle>
+          <a:p>
+            <a:endParaRPr lang="fr-FR"/>
+          </a:p>
+        </p:txBody>
+      </p:sp>
+      <p:sp>
+        <p:nvSpPr>
+          <p:cNvPr id="3" name="Espace réservé de la date 2"/>
+          <p:cNvSpPr>
+            <a:spLocks noGrp="1"/>
+          </p:cNvSpPr>
+          <p:nvPr>
+            <p:ph type="dt" sz="quarter" idx="1"/>
+          </p:nvPr>
+        </p:nvSpPr>
+        <p:spPr>
+          <a:xfrm>
+            <a:off x="3884613" y="0"/>
+            <a:ext cx="2971800" cy="457200"/>
+          </a:xfrm>
+          <a:prstGeom prst="rect">
+            <a:avLst/>
+          </a:prstGeom>
+        </p:spPr>
+        <p:txBody>
+          <a:bodyPr vert="horz" lIns="91440" tIns="45720" rIns="91440" bIns="45720" rtlCol="0"/>
+          <a:lstStyle>
+            <a:lvl1pPr algn="r">
+              <a:defRPr sz="1200"/>
+            </a:lvl1pPr>
+          </a:lstStyle>
+          <a:p>
+            <a:fld id="{678F24D5-C480-446D-B22C-7F566331EF41}" type="datetimeFigureOut">
+              <a:rPr lang="fr-FR" smtClean="0"/>
+              <a:t>01/06/2011</a:t>
+            </a:fld>
+            <a:endParaRPr lang="fr-FR"/>
+          </a:p>
+        </p:txBody>
+      </p:sp>
+      <p:sp>
+        <p:nvSpPr>
+          <p:cNvPr id="4" name="Espace réservé du pied de page 3"/>
+          <p:cNvSpPr>
+            <a:spLocks noGrp="1"/>
+          </p:cNvSpPr>
+          <p:nvPr>
+            <p:ph type="ftr" sz="quarter" idx="2"/>
+          </p:nvPr>
+        </p:nvSpPr>
+        <p:spPr>
+          <a:xfrm>
+            <a:off x="0" y="8685213"/>
+            <a:ext cx="2971800" cy="457200"/>
+          </a:xfrm>
+          <a:prstGeom prst="rect">
+            <a:avLst/>
+          </a:prstGeom>
+        </p:spPr>
+        <p:txBody>
+          <a:bodyPr vert="horz" lIns="91440" tIns="45720" rIns="91440" bIns="45720" rtlCol="0" anchor="b"/>
+          <a:lstStyle>
+            <a:lvl1pPr algn="l">
+              <a:defRPr sz="1200"/>
+            </a:lvl1pPr>
+          </a:lstStyle>
+          <a:p>
+            <a:endParaRPr lang="fr-FR"/>
+          </a:p>
+        </p:txBody>
+      </p:sp>
+      <p:sp>
+        <p:nvSpPr>
+          <p:cNvPr id="5" name="Espace réservé du numéro de diapositive 4"/>
+          <p:cNvSpPr>
+            <a:spLocks noGrp="1"/>
+          </p:cNvSpPr>
+          <p:nvPr>
+            <p:ph type="sldNum" sz="quarter" idx="3"/>
+          </p:nvPr>
+        </p:nvSpPr>
+        <p:spPr>
+          <a:xfrm>
+            <a:off x="3884613" y="8685213"/>
+            <a:ext cx="2971800" cy="457200"/>
+          </a:xfrm>
+          <a:prstGeom prst="rect">
+            <a:avLst/>
+          </a:prstGeom>
+        </p:spPr>
+        <p:txBody>
+          <a:bodyPr vert="horz" lIns="91440" tIns="45720" rIns="91440" bIns="45720" rtlCol="0" anchor="b"/>
+          <a:lstStyle>
+            <a:lvl1pPr algn="r">
+              <a:defRPr sz="1200"/>
+            </a:lvl1pPr>
+          </a:lstStyle>
+          <a:p>
+            <a:fld id="{89D2BD42-B79F-43F3-A49D-57ED4F980C67}" type="slidenum">
+              <a:rPr lang="fr-FR" smtClean="0"/>
+              <a:t>‹N°›</a:t>
+            </a:fld>
+            <a:endParaRPr lang="fr-FR"/>
+          </a:p>
+        </p:txBody>
+      </p:sp>
+    </p:spTree>
+  </p:cSld>
+  <p:clrMap bg1="lt1" tx1="dk1" bg2="lt2" tx2="dk2" accent1="accent1" accent2="accent2" accent3="accent3" accent4="accent4" accent5="accent5" accent6="accent6" hlink="hlink" folHlink="folHlink"/>
+</p:handoutMaster>
+</file>
+
 <file path=ppt/notesMasters/notesMaster1.xml><?xml version="1.0" encoding="utf-8"?>
 <p:notesMaster xmlns:a="http://schemas.openxmlformats.org/drawingml/2006/main" xmlns:r="http://schemas.openxmlformats.org/officeDocument/2006/relationships" xmlns:p="http://schemas.openxmlformats.org/presentationml/2006/main">
   <p:cSld>
@@ -384,7 +547,7 @@
     </p:spTree>
     <p:extLst>
       <p:ext uri="{BB962C8B-B14F-4D97-AF65-F5344CB8AC3E}">
-        <p14:creationId xmlns:p14="http://schemas.microsoft.com/office/powerpoint/2010/main" val="2884352748"/>
+        <p14:creationId xmlns:p14="http://schemas.microsoft.com/office/powerpoint/2010/main" xmlns="" val="2884352748"/>
       </p:ext>
     </p:extLst>
   </p:cSld>
@@ -737,7 +900,11 @@
               <a:pPr/>
               <a:t>‹N°›</a:t>
             </a:fld>
-            <a:endParaRPr lang="fr-BE"/>
+            <a:r>
+              <a:rPr lang="fr-BE" dirty="0" smtClean="0"/>
+              <a:t> sur 21</a:t>
+            </a:r>
+            <a:endParaRPr lang="fr-BE" dirty="0"/>
           </a:p>
         </p:txBody>
       </p:sp>
@@ -1626,7 +1793,7 @@
             </a:fld>
             <a:r>
               <a:rPr lang="fr-BE" dirty="0" smtClean="0"/>
-              <a:t> sur ?</a:t>
+              <a:t> sur 21</a:t>
             </a:r>
             <a:endParaRPr lang="fr-BE" dirty="0"/>
           </a:p>
@@ -1790,7 +1957,7 @@
             </a:fld>
             <a:r>
               <a:rPr lang="fr-BE" dirty="0" smtClean="0"/>
-              <a:t> sur ?</a:t>
+              <a:t> sur 21</a:t>
             </a:r>
             <a:endParaRPr lang="fr-BE" dirty="0"/>
           </a:p>
@@ -3783,7 +3950,11 @@
               <a:pPr/>
               <a:t>‹N°›</a:t>
             </a:fld>
-            <a:endParaRPr lang="fr-BE"/>
+            <a:r>
+              <a:rPr lang="fr-BE" dirty="0" smtClean="0"/>
+              <a:t> sur 21</a:t>
+            </a:r>
+            <a:endParaRPr lang="fr-BE" dirty="0"/>
           </a:p>
         </p:txBody>
       </p:sp>
@@ -4372,8 +4543,12 @@
               <a:t>10</a:t>
             </a:fld>
             <a:r>
-              <a:rPr lang="fr-BE" smtClean="0"/>
-              <a:t> sur ?</a:t>
+              <a:rPr lang="fr-BE" dirty="0" smtClean="0"/>
+              <a:t> sur </a:t>
+            </a:r>
+            <a:r>
+              <a:rPr lang="fr-BE" dirty="0" smtClean="0"/>
+              <a:t>21</a:t>
             </a:r>
             <a:endParaRPr lang="fr-BE" dirty="0"/>
           </a:p>
@@ -4819,8 +4994,12 @@
               <a:t>11</a:t>
             </a:fld>
             <a:r>
-              <a:rPr lang="fr-BE" smtClean="0"/>
-              <a:t> sur ?</a:t>
+              <a:rPr lang="fr-BE" dirty="0" smtClean="0"/>
+              <a:t> sur </a:t>
+            </a:r>
+            <a:r>
+              <a:rPr lang="fr-BE" dirty="0" smtClean="0"/>
+              <a:t>21</a:t>
             </a:r>
             <a:endParaRPr lang="fr-BE" dirty="0"/>
           </a:p>
@@ -5361,8 +5540,12 @@
               <a:t>12</a:t>
             </a:fld>
             <a:r>
-              <a:rPr lang="fr-BE" smtClean="0"/>
-              <a:t> sur ?</a:t>
+              <a:rPr lang="fr-BE" dirty="0" smtClean="0"/>
+              <a:t> sur </a:t>
+            </a:r>
+            <a:r>
+              <a:rPr lang="fr-BE" dirty="0" smtClean="0"/>
+              <a:t>21</a:t>
             </a:r>
             <a:endParaRPr lang="fr-BE" dirty="0"/>
           </a:p>
@@ -5840,8 +6023,12 @@
               <a:t>13</a:t>
             </a:fld>
             <a:r>
-              <a:rPr lang="fr-BE" smtClean="0"/>
-              <a:t> sur ?</a:t>
+              <a:rPr lang="fr-BE" dirty="0" smtClean="0"/>
+              <a:t> sur </a:t>
+            </a:r>
+            <a:r>
+              <a:rPr lang="fr-BE" dirty="0" smtClean="0"/>
+              <a:t>21</a:t>
             </a:r>
             <a:endParaRPr lang="fr-BE" dirty="0"/>
           </a:p>
@@ -6324,8 +6511,12 @@
               <a:t>14</a:t>
             </a:fld>
             <a:r>
-              <a:rPr lang="fr-BE" smtClean="0"/>
-              <a:t> sur ?</a:t>
+              <a:rPr lang="fr-BE" dirty="0" smtClean="0"/>
+              <a:t> sur </a:t>
+            </a:r>
+            <a:r>
+              <a:rPr lang="fr-BE" dirty="0" smtClean="0"/>
+              <a:t>21</a:t>
             </a:r>
             <a:endParaRPr lang="fr-BE" dirty="0"/>
           </a:p>
@@ -6878,8 +7069,12 @@
               <a:t>15</a:t>
             </a:fld>
             <a:r>
-              <a:rPr lang="fr-BE" smtClean="0"/>
-              <a:t> sur ?</a:t>
+              <a:rPr lang="fr-BE" dirty="0" smtClean="0"/>
+              <a:t> sur </a:t>
+            </a:r>
+            <a:r>
+              <a:rPr lang="fr-BE" dirty="0" smtClean="0"/>
+              <a:t>21</a:t>
             </a:r>
             <a:endParaRPr lang="fr-BE" dirty="0"/>
           </a:p>
@@ -7375,8 +7570,12 @@
               <a:t>16</a:t>
             </a:fld>
             <a:r>
-              <a:rPr lang="fr-BE" smtClean="0"/>
-              <a:t> sur ?</a:t>
+              <a:rPr lang="fr-BE" dirty="0" smtClean="0"/>
+              <a:t> sur </a:t>
+            </a:r>
+            <a:r>
+              <a:rPr lang="fr-BE" dirty="0" smtClean="0"/>
+              <a:t>21</a:t>
             </a:r>
             <a:endParaRPr lang="fr-BE" dirty="0"/>
           </a:p>
@@ -7429,17 +7628,7 @@
                   </a:schemeClr>
                 </a:solidFill>
               </a:rPr>
-              <a:t> </a:t>
-            </a:r>
-            <a:r>
-              <a:rPr lang="fr-FR" dirty="0" smtClean="0">
-                <a:solidFill>
-                  <a:schemeClr val="tx2">
-                    <a:lumMod val="75000"/>
-                  </a:schemeClr>
-                </a:solidFill>
-              </a:rPr>
-              <a:t>»</a:t>
+              <a:t> »</a:t>
             </a:r>
           </a:p>
           <a:p>
@@ -7724,10 +7913,10 @@
           <p:nvPr/>
         </p:nvPicPr>
         <p:blipFill>
-          <a:blip r:embed="rId2">
+          <a:blip r:embed="rId2" cstate="print">
             <a:extLst>
               <a:ext uri="{28A0092B-C50C-407E-A947-70E740481C1C}">
-                <a14:useLocalDpi xmlns:a14="http://schemas.microsoft.com/office/drawing/2010/main" val="0"/>
+                <a14:useLocalDpi xmlns:a14="http://schemas.microsoft.com/office/drawing/2010/main" xmlns="" val="0"/>
               </a:ext>
             </a:extLst>
           </a:blip>
@@ -7747,7 +7936,7 @@
           <a:noFill/>
           <a:extLst>
             <a:ext uri="{909E8E84-426E-40DD-AFC4-6F175D3DCCD1}">
-              <a14:hiddenFill xmlns:a14="http://schemas.microsoft.com/office/drawing/2010/main">
+              <a14:hiddenFill xmlns:a14="http://schemas.microsoft.com/office/drawing/2010/main" xmlns="">
                 <a:solidFill>
                   <a:srgbClr val="FFFFFF"/>
                 </a:solidFill>
@@ -7864,8 +8053,12 @@
               <a:t>17</a:t>
             </a:fld>
             <a:r>
-              <a:rPr lang="fr-BE" smtClean="0"/>
-              <a:t> sur ?</a:t>
+              <a:rPr lang="fr-BE" dirty="0" smtClean="0"/>
+              <a:t> sur </a:t>
+            </a:r>
+            <a:r>
+              <a:rPr lang="fr-BE" dirty="0" smtClean="0"/>
+              <a:t>21</a:t>
             </a:r>
             <a:endParaRPr lang="fr-BE" dirty="0"/>
           </a:p>
@@ -7898,17 +8091,7 @@
                   </a:schemeClr>
                 </a:solidFill>
               </a:rPr>
-              <a:t>Les « lyrics </a:t>
-            </a:r>
-            <a:r>
-              <a:rPr lang="fr-FR" dirty="0" smtClean="0">
-                <a:solidFill>
-                  <a:schemeClr val="tx2">
-                    <a:lumMod val="75000"/>
-                  </a:schemeClr>
-                </a:solidFill>
-              </a:rPr>
-              <a:t>»</a:t>
+              <a:t>Les « lyrics »</a:t>
             </a:r>
           </a:p>
           <a:p>
@@ -8362,8 +8545,12 @@
               <a:t>18</a:t>
             </a:fld>
             <a:r>
-              <a:rPr lang="fr-BE" smtClean="0"/>
-              <a:t> sur ?</a:t>
+              <a:rPr lang="fr-BE" dirty="0" smtClean="0"/>
+              <a:t> sur </a:t>
+            </a:r>
+            <a:r>
+              <a:rPr lang="fr-BE" dirty="0" smtClean="0"/>
+              <a:t>21</a:t>
             </a:r>
             <a:endParaRPr lang="fr-BE" dirty="0"/>
           </a:p>
@@ -8813,8 +9000,12 @@
               <a:t>19</a:t>
             </a:fld>
             <a:r>
-              <a:rPr lang="fr-BE" smtClean="0"/>
-              <a:t> sur ?</a:t>
+              <a:rPr lang="fr-BE" dirty="0" smtClean="0"/>
+              <a:t> sur </a:t>
+            </a:r>
+            <a:r>
+              <a:rPr lang="fr-BE" dirty="0" smtClean="0"/>
+              <a:t>21</a:t>
             </a:r>
             <a:endParaRPr lang="fr-BE" dirty="0"/>
           </a:p>
@@ -9713,8 +9904,12 @@
               <a:t>2</a:t>
             </a:fld>
             <a:r>
-              <a:rPr lang="fr-BE" smtClean="0"/>
-              <a:t> sur ?</a:t>
+              <a:rPr lang="fr-BE" dirty="0" smtClean="0"/>
+              <a:t> sur </a:t>
+            </a:r>
+            <a:r>
+              <a:rPr lang="fr-BE" dirty="0" smtClean="0"/>
+              <a:t>21</a:t>
             </a:r>
             <a:endParaRPr lang="fr-BE" dirty="0"/>
           </a:p>
@@ -9828,8 +10023,12 @@
               <a:t>20</a:t>
             </a:fld>
             <a:r>
-              <a:rPr lang="fr-BE" smtClean="0"/>
-              <a:t> sur ?</a:t>
+              <a:rPr lang="fr-BE" dirty="0" smtClean="0"/>
+              <a:t> sur </a:t>
+            </a:r>
+            <a:r>
+              <a:rPr lang="fr-BE" dirty="0" smtClean="0"/>
+              <a:t>21</a:t>
             </a:r>
             <a:endParaRPr lang="fr-BE" dirty="0"/>
           </a:p>
@@ -10270,8 +10469,12 @@
               <a:t>21</a:t>
             </a:fld>
             <a:r>
-              <a:rPr lang="fr-BE" smtClean="0"/>
-              <a:t> sur ?</a:t>
+              <a:rPr lang="fr-BE" dirty="0" smtClean="0"/>
+              <a:t> sur </a:t>
+            </a:r>
+            <a:r>
+              <a:rPr lang="fr-BE" dirty="0" smtClean="0"/>
+              <a:t>21</a:t>
             </a:r>
             <a:endParaRPr lang="fr-BE" dirty="0"/>
           </a:p>
@@ -10409,8 +10612,12 @@
               <a:t>3</a:t>
             </a:fld>
             <a:r>
-              <a:rPr lang="fr-BE" smtClean="0"/>
-              <a:t> sur ?</a:t>
+              <a:rPr lang="fr-BE" dirty="0" smtClean="0"/>
+              <a:t> sur </a:t>
+            </a:r>
+            <a:r>
+              <a:rPr lang="fr-BE" dirty="0" smtClean="0"/>
+              <a:t>21</a:t>
             </a:r>
             <a:endParaRPr lang="fr-BE" dirty="0"/>
           </a:p>
@@ -10884,8 +11091,12 @@
               <a:t>4</a:t>
             </a:fld>
             <a:r>
-              <a:rPr lang="fr-BE" smtClean="0"/>
-              <a:t> sur ?</a:t>
+              <a:rPr lang="fr-BE" dirty="0" smtClean="0"/>
+              <a:t> sur </a:t>
+            </a:r>
+            <a:r>
+              <a:rPr lang="fr-BE" dirty="0" smtClean="0"/>
+              <a:t>21</a:t>
             </a:r>
             <a:endParaRPr lang="fr-BE" dirty="0"/>
           </a:p>
@@ -11380,8 +11591,12 @@
               <a:t>5</a:t>
             </a:fld>
             <a:r>
-              <a:rPr lang="fr-BE" smtClean="0"/>
-              <a:t> sur ?</a:t>
+              <a:rPr lang="fr-BE" dirty="0" smtClean="0"/>
+              <a:t> sur </a:t>
+            </a:r>
+            <a:r>
+              <a:rPr lang="fr-BE" dirty="0" smtClean="0"/>
+              <a:t>21</a:t>
             </a:r>
             <a:endParaRPr lang="fr-BE" dirty="0"/>
           </a:p>
@@ -11756,8 +11971,12 @@
               <a:t>6</a:t>
             </a:fld>
             <a:r>
-              <a:rPr lang="fr-BE" smtClean="0"/>
-              <a:t> sur ?</a:t>
+              <a:rPr lang="fr-BE" dirty="0" smtClean="0"/>
+              <a:t> sur </a:t>
+            </a:r>
+            <a:r>
+              <a:rPr lang="fr-BE" dirty="0" smtClean="0"/>
+              <a:t>21</a:t>
             </a:r>
             <a:endParaRPr lang="fr-BE" dirty="0"/>
           </a:p>
@@ -12198,8 +12417,12 @@
               <a:t>7</a:t>
             </a:fld>
             <a:r>
-              <a:rPr lang="fr-BE" smtClean="0"/>
-              <a:t> sur ?</a:t>
+              <a:rPr lang="fr-BE" dirty="0" smtClean="0"/>
+              <a:t> sur </a:t>
+            </a:r>
+            <a:r>
+              <a:rPr lang="fr-BE" dirty="0" smtClean="0"/>
+              <a:t>21</a:t>
             </a:r>
             <a:endParaRPr lang="fr-BE" dirty="0"/>
           </a:p>
@@ -12574,8 +12797,12 @@
               <a:t>8</a:t>
             </a:fld>
             <a:r>
-              <a:rPr lang="fr-BE" smtClean="0"/>
-              <a:t> sur ?</a:t>
+              <a:rPr lang="fr-BE" dirty="0" smtClean="0"/>
+              <a:t> sur </a:t>
+            </a:r>
+            <a:r>
+              <a:rPr lang="fr-BE" dirty="0" smtClean="0"/>
+              <a:t>21</a:t>
             </a:r>
             <a:endParaRPr lang="fr-BE" dirty="0"/>
           </a:p>
@@ -13084,8 +13311,12 @@
               <a:t>9</a:t>
             </a:fld>
             <a:r>
-              <a:rPr lang="fr-BE" smtClean="0"/>
-              <a:t> sur ?</a:t>
+              <a:rPr lang="fr-BE" dirty="0" smtClean="0"/>
+              <a:t> sur </a:t>
+            </a:r>
+            <a:r>
+              <a:rPr lang="fr-BE" dirty="0" smtClean="0"/>
+              <a:t>21</a:t>
             </a:r>
             <a:endParaRPr lang="fr-BE" dirty="0"/>
           </a:p>
@@ -14000,4 +14231,287 @@
   <a:objectDefaults/>
   <a:extraClrSchemeLst/>
 </a:theme>
+</file>
+
+<file path=ppt/theme/theme3.xml><?xml version="1.0" encoding="utf-8"?>
+<a:theme xmlns:a="http://schemas.openxmlformats.org/drawingml/2006/main" name="Thème Office">
+  <a:themeElements>
+    <a:clrScheme name="Office">
+      <a:dk1>
+        <a:sysClr val="windowText" lastClr="000000"/>
+      </a:dk1>
+      <a:lt1>
+        <a:sysClr val="window" lastClr="FFFFFF"/>
+      </a:lt1>
+      <a:dk2>
+        <a:srgbClr val="1F497D"/>
+      </a:dk2>
+      <a:lt2>
+        <a:srgbClr val="EEECE1"/>
+      </a:lt2>
+      <a:accent1>
+        <a:srgbClr val="4F81BD"/>
+      </a:accent1>
+      <a:accent2>
+        <a:srgbClr val="C0504D"/>
+      </a:accent2>
+      <a:accent3>
+        <a:srgbClr val="9BBB59"/>
+      </a:accent3>
+      <a:accent4>
+        <a:srgbClr val="8064A2"/>
+      </a:accent4>
+      <a:accent5>
+        <a:srgbClr val="4BACC6"/>
+      </a:accent5>
+      <a:accent6>
+        <a:srgbClr val="F79646"/>
+      </a:accent6>
+      <a:hlink>
+        <a:srgbClr val="0000FF"/>
+      </a:hlink>
+      <a:folHlink>
+        <a:srgbClr val="800080"/>
+      </a:folHlink>
+    </a:clrScheme>
+    <a:fontScheme name="Office">
+      <a:majorFont>
+        <a:latin typeface="Calibri"/>
+        <a:ea typeface=""/>
+        <a:cs typeface=""/>
+        <a:font script="Jpan" typeface="ＭＳ Ｐゴシック"/>
+        <a:font script="Hang" typeface="맑은 고딕"/>
+        <a:font script="Hans" typeface="宋体"/>
+        <a:font script="Hant" typeface="新細明體"/>
+        <a:font script="Arab" typeface="Times New Roman"/>
+        <a:font script="Hebr" typeface="Times New Roman"/>
+        <a:font script="Thai" typeface="Angsana New"/>
+        <a:font script="Ethi" typeface="Nyala"/>
+        <a:font script="Beng" typeface="Vrinda"/>
+        <a:font script="Gujr" typeface="Shruti"/>
+        <a:font script="Khmr" typeface="MoolBoran"/>
+        <a:font script="Knda" typeface="Tunga"/>
+        <a:font script="Guru" typeface="Raavi"/>
+        <a:font script="Cans" typeface="Euphemia"/>
+        <a:font script="Cher" typeface="Plantagenet Cherokee"/>
+        <a:font script="Yiii" typeface="Microsoft Yi Baiti"/>
+        <a:font script="Tibt" typeface="Microsoft Himalaya"/>
+        <a:font script="Thaa" typeface="MV Boli"/>
+        <a:font script="Deva" typeface="Mangal"/>
+        <a:font script="Telu" typeface="Gautami"/>
+        <a:font script="Taml" typeface="Latha"/>
+        <a:font script="Syrc" typeface="Estrangelo Edessa"/>
+        <a:font script="Orya" typeface="Kalinga"/>
+        <a:font script="Mlym" typeface="Kartika"/>
+        <a:font script="Laoo" typeface="DokChampa"/>
+        <a:font script="Sinh" typeface="Iskoola Pota"/>
+        <a:font script="Mong" typeface="Mongolian Baiti"/>
+        <a:font script="Viet" typeface="Times New Roman"/>
+        <a:font script="Uigh" typeface="Microsoft Uighur"/>
+      </a:majorFont>
+      <a:minorFont>
+        <a:latin typeface="Calibri"/>
+        <a:ea typeface=""/>
+        <a:cs typeface=""/>
+        <a:font script="Jpan" typeface="ＭＳ Ｐゴシック"/>
+        <a:font script="Hang" typeface="맑은 고딕"/>
+        <a:font script="Hans" typeface="宋体"/>
+        <a:font script="Hant" typeface="新細明體"/>
+        <a:font script="Arab" typeface="Arial"/>
+        <a:font script="Hebr" typeface="Arial"/>
+        <a:font script="Thai" typeface="Cordia New"/>
+        <a:font script="Ethi" typeface="Nyala"/>
+        <a:font script="Beng" typeface="Vrinda"/>
+        <a:font script="Gujr" typeface="Shruti"/>
+        <a:font script="Khmr" typeface="DaunPenh"/>
+        <a:font script="Knda" typeface="Tunga"/>
+        <a:font script="Guru" typeface="Raavi"/>
+        <a:font script="Cans" typeface="Euphemia"/>
+        <a:font script="Cher" typeface="Plantagenet Cherokee"/>
+        <a:font script="Yiii" typeface="Microsoft Yi Baiti"/>
+        <a:font script="Tibt" typeface="Microsoft Himalaya"/>
+        <a:font script="Thaa" typeface="MV Boli"/>
+        <a:font script="Deva" typeface="Mangal"/>
+        <a:font script="Telu" typeface="Gautami"/>
+        <a:font script="Taml" typeface="Latha"/>
+        <a:font script="Syrc" typeface="Estrangelo Edessa"/>
+        <a:font script="Orya" typeface="Kalinga"/>
+        <a:font script="Mlym" typeface="Kartika"/>
+        <a:font script="Laoo" typeface="DokChampa"/>
+        <a:font script="Sinh" typeface="Iskoola Pota"/>
+        <a:font script="Mong" typeface="Mongolian Baiti"/>
+        <a:font script="Viet" typeface="Arial"/>
+        <a:font script="Uigh" typeface="Microsoft Uighur"/>
+      </a:minorFont>
+    </a:fontScheme>
+    <a:fmtScheme name="Office">
+      <a:fillStyleLst>
+        <a:solidFill>
+          <a:schemeClr val="phClr"/>
+        </a:solidFill>
+        <a:gradFill rotWithShape="1">
+          <a:gsLst>
+            <a:gs pos="0">
+              <a:schemeClr val="phClr">
+                <a:tint val="50000"/>
+                <a:satMod val="300000"/>
+              </a:schemeClr>
+            </a:gs>
+            <a:gs pos="35000">
+              <a:schemeClr val="phClr">
+                <a:tint val="37000"/>
+                <a:satMod val="300000"/>
+              </a:schemeClr>
+            </a:gs>
+            <a:gs pos="100000">
+              <a:schemeClr val="phClr">
+                <a:tint val="15000"/>
+                <a:satMod val="350000"/>
+              </a:schemeClr>
+            </a:gs>
+          </a:gsLst>
+          <a:lin ang="16200000" scaled="1"/>
+        </a:gradFill>
+        <a:gradFill rotWithShape="1">
+          <a:gsLst>
+            <a:gs pos="0">
+              <a:schemeClr val="phClr">
+                <a:shade val="51000"/>
+                <a:satMod val="130000"/>
+              </a:schemeClr>
+            </a:gs>
+            <a:gs pos="80000">
+              <a:schemeClr val="phClr">
+                <a:shade val="93000"/>
+                <a:satMod val="130000"/>
+              </a:schemeClr>
+            </a:gs>
+            <a:gs pos="100000">
+              <a:schemeClr val="phClr">
+                <a:shade val="94000"/>
+                <a:satMod val="135000"/>
+              </a:schemeClr>
+            </a:gs>
+          </a:gsLst>
+          <a:lin ang="16200000" scaled="0"/>
+        </a:gradFill>
+      </a:fillStyleLst>
+      <a:lnStyleLst>
+        <a:ln w="9525" cap="flat" cmpd="sng" algn="ctr">
+          <a:solidFill>
+            <a:schemeClr val="phClr">
+              <a:shade val="95000"/>
+              <a:satMod val="105000"/>
+            </a:schemeClr>
+          </a:solidFill>
+          <a:prstDash val="solid"/>
+        </a:ln>
+        <a:ln w="25400" cap="flat" cmpd="sng" algn="ctr">
+          <a:solidFill>
+            <a:schemeClr val="phClr"/>
+          </a:solidFill>
+          <a:prstDash val="solid"/>
+        </a:ln>
+        <a:ln w="38100" cap="flat" cmpd="sng" algn="ctr">
+          <a:solidFill>
+            <a:schemeClr val="phClr"/>
+          </a:solidFill>
+          <a:prstDash val="solid"/>
+        </a:ln>
+      </a:lnStyleLst>
+      <a:effectStyleLst>
+        <a:effectStyle>
+          <a:effectLst>
+            <a:outerShdw blurRad="40000" dist="20000" dir="5400000" rotWithShape="0">
+              <a:srgbClr val="000000">
+                <a:alpha val="38000"/>
+              </a:srgbClr>
+            </a:outerShdw>
+          </a:effectLst>
+        </a:effectStyle>
+        <a:effectStyle>
+          <a:effectLst>
+            <a:outerShdw blurRad="40000" dist="23000" dir="5400000" rotWithShape="0">
+              <a:srgbClr val="000000">
+                <a:alpha val="35000"/>
+              </a:srgbClr>
+            </a:outerShdw>
+          </a:effectLst>
+        </a:effectStyle>
+        <a:effectStyle>
+          <a:effectLst>
+            <a:outerShdw blurRad="40000" dist="23000" dir="5400000" rotWithShape="0">
+              <a:srgbClr val="000000">
+                <a:alpha val="35000"/>
+              </a:srgbClr>
+            </a:outerShdw>
+          </a:effectLst>
+          <a:scene3d>
+            <a:camera prst="orthographicFront">
+              <a:rot lat="0" lon="0" rev="0"/>
+            </a:camera>
+            <a:lightRig rig="threePt" dir="t">
+              <a:rot lat="0" lon="0" rev="1200000"/>
+            </a:lightRig>
+          </a:scene3d>
+          <a:sp3d>
+            <a:bevelT w="63500" h="25400"/>
+          </a:sp3d>
+        </a:effectStyle>
+      </a:effectStyleLst>
+      <a:bgFillStyleLst>
+        <a:solidFill>
+          <a:schemeClr val="phClr"/>
+        </a:solidFill>
+        <a:gradFill rotWithShape="1">
+          <a:gsLst>
+            <a:gs pos="0">
+              <a:schemeClr val="phClr">
+                <a:tint val="40000"/>
+                <a:satMod val="350000"/>
+              </a:schemeClr>
+            </a:gs>
+            <a:gs pos="40000">
+              <a:schemeClr val="phClr">
+                <a:tint val="45000"/>
+                <a:shade val="99000"/>
+                <a:satMod val="350000"/>
+              </a:schemeClr>
+            </a:gs>
+            <a:gs pos="100000">
+              <a:schemeClr val="phClr">
+                <a:shade val="20000"/>
+                <a:satMod val="255000"/>
+              </a:schemeClr>
+            </a:gs>
+          </a:gsLst>
+          <a:path path="circle">
+            <a:fillToRect l="50000" t="-80000" r="50000" b="180000"/>
+          </a:path>
+        </a:gradFill>
+        <a:gradFill rotWithShape="1">
+          <a:gsLst>
+            <a:gs pos="0">
+              <a:schemeClr val="phClr">
+                <a:tint val="80000"/>
+                <a:satMod val="300000"/>
+              </a:schemeClr>
+            </a:gs>
+            <a:gs pos="100000">
+              <a:schemeClr val="phClr">
+                <a:shade val="30000"/>
+                <a:satMod val="200000"/>
+              </a:schemeClr>
+            </a:gs>
+          </a:gsLst>
+          <a:path path="circle">
+            <a:fillToRect l="50000" t="50000" r="50000" b="50000"/>
+          </a:path>
+        </a:gradFill>
+      </a:bgFillStyleLst>
+    </a:fmtScheme>
+  </a:themeElements>
+  <a:objectDefaults/>
+  <a:extraClrSchemeLst/>
+</a:theme>
 </file>
</xml_diff>

<commit_message>
mise a jour images + rapport + presentation -> suppression partition et enregistrement son
</commit_message>
<xml_diff>
--- a/AAP/docs/Presentation.pptx
+++ b/AAP/docs/Presentation.pptx
@@ -215,7 +215,8 @@
           <a:p>
             <a:fld id="{678F24D5-C480-446D-B22C-7F566331EF41}" type="datetimeFigureOut">
               <a:rPr lang="fr-FR" smtClean="0"/>
-              <a:t>01/06/2011</a:t>
+              <a:pPr/>
+              <a:t>02/06/2011</a:t>
             </a:fld>
             <a:endParaRPr lang="fr-FR"/>
           </a:p>
@@ -281,6 +282,7 @@
           <a:p>
             <a:fld id="{89D2BD42-B79F-43F3-A49D-57ED4F980C67}" type="slidenum">
               <a:rPr lang="fr-FR" smtClean="0"/>
+              <a:pPr/>
               <a:t>‹N°›</a:t>
             </a:fld>
             <a:endParaRPr lang="fr-FR"/>
@@ -376,7 +378,7 @@
             <a:fld id="{9F7A5740-AB0E-48E6-BCE9-09FA638B6FD3}" type="datetimeFigureOut">
               <a:rPr lang="fr-FR" smtClean="0"/>
               <a:pPr/>
-              <a:t>01/06/2011</a:t>
+              <a:t>02/06/2011</a:t>
             </a:fld>
             <a:endParaRPr lang="fr-FR"/>
           </a:p>
@@ -547,7 +549,7 @@
     </p:spTree>
     <p:extLst>
       <p:ext uri="{BB962C8B-B14F-4D97-AF65-F5344CB8AC3E}">
-        <p14:creationId xmlns:p14="http://schemas.microsoft.com/office/powerpoint/2010/main" xmlns="" val="2884352748"/>
+        <p14:creationId xmlns="" xmlns:p14="http://schemas.microsoft.com/office/powerpoint/2010/main" val="2884352748"/>
       </p:ext>
     </p:extLst>
   </p:cSld>
@@ -851,7 +853,7 @@
             <a:fld id="{DF9D4494-96E0-4406-9347-E80FE7704387}" type="datetime1">
               <a:rPr lang="fr-FR" smtClean="0"/>
               <a:pPr/>
-              <a:t>01/06/2011</a:t>
+              <a:t>02/06/2011</a:t>
             </a:fld>
             <a:endParaRPr lang="fr-BE"/>
           </a:p>
@@ -1112,7 +1114,7 @@
             <a:fld id="{A89CA437-F84A-4BDD-8C20-46077FA11AD7}" type="datetime1">
               <a:rPr lang="fr-FR" smtClean="0"/>
               <a:pPr/>
-              <a:t>01/06/2011</a:t>
+              <a:t>02/06/2011</a:t>
             </a:fld>
             <a:endParaRPr lang="fr-BE"/>
           </a:p>
@@ -1283,7 +1285,7 @@
             <a:fld id="{24135A20-DC24-4C20-9F62-FD3DD13F2969}" type="datetime1">
               <a:rPr lang="fr-FR" smtClean="0"/>
               <a:pPr/>
-              <a:t>01/06/2011</a:t>
+              <a:t>02/06/2011</a:t>
             </a:fld>
             <a:endParaRPr lang="fr-BE"/>
           </a:p>
@@ -1464,7 +1466,7 @@
             <a:fld id="{C74C95C5-D393-4D2F-A12B-633BD3C7E534}" type="datetime1">
               <a:rPr lang="fr-FR" smtClean="0"/>
               <a:pPr/>
-              <a:t>01/06/2011</a:t>
+              <a:t>02/06/2011</a:t>
             </a:fld>
             <a:endParaRPr lang="fr-BE"/>
           </a:p>
@@ -2446,7 +2448,7 @@
             <a:fld id="{9DEFE777-74D9-46A9-AF63-ECD7CA5CB743}" type="datetime1">
               <a:rPr lang="fr-FR" smtClean="0"/>
               <a:pPr/>
-              <a:t>01/06/2011</a:t>
+              <a:t>02/06/2011</a:t>
             </a:fld>
             <a:endParaRPr lang="fr-BE"/>
           </a:p>
@@ -2735,7 +2737,7 @@
             <a:fld id="{9ACF5AB4-72D0-4411-8F4F-4D9D79E948BF}" type="datetime1">
               <a:rPr lang="fr-FR" smtClean="0"/>
               <a:pPr/>
-              <a:t>01/06/2011</a:t>
+              <a:t>02/06/2011</a:t>
             </a:fld>
             <a:endParaRPr lang="fr-BE"/>
           </a:p>
@@ -3158,7 +3160,7 @@
             <a:fld id="{D2811741-81B4-41E5-A5E9-7992F4B62001}" type="datetime1">
               <a:rPr lang="fr-FR" smtClean="0"/>
               <a:pPr/>
-              <a:t>01/06/2011</a:t>
+              <a:t>02/06/2011</a:t>
             </a:fld>
             <a:endParaRPr lang="fr-BE"/>
           </a:p>
@@ -3277,7 +3279,7 @@
             <a:fld id="{FA06DA9A-0216-4D5C-BA8D-BFCD89B87CAB}" type="datetime1">
               <a:rPr lang="fr-FR" smtClean="0"/>
               <a:pPr/>
-              <a:t>01/06/2011</a:t>
+              <a:t>02/06/2011</a:t>
             </a:fld>
             <a:endParaRPr lang="fr-BE"/>
           </a:p>
@@ -3373,7 +3375,7 @@
             <a:fld id="{3EDB268D-CAC0-4A46-8E29-E987593C3F48}" type="datetime1">
               <a:rPr lang="fr-FR" smtClean="0"/>
               <a:pPr/>
-              <a:t>01/06/2011</a:t>
+              <a:t>02/06/2011</a:t>
             </a:fld>
             <a:endParaRPr lang="fr-BE"/>
           </a:p>
@@ -3651,7 +3653,7 @@
             <a:fld id="{5B09ACAE-89F7-4AA2-AF12-DFB25BECD9F8}" type="datetime1">
               <a:rPr lang="fr-FR" smtClean="0"/>
               <a:pPr/>
-              <a:t>01/06/2011</a:t>
+              <a:t>02/06/2011</a:t>
             </a:fld>
             <a:endParaRPr lang="fr-BE"/>
           </a:p>
@@ -3865,7 +3867,7 @@
             <a:fld id="{C2D67580-B034-40FA-BDF9-08E33D7DD05F}" type="datetime1">
               <a:rPr lang="fr-FR" smtClean="0"/>
               <a:pPr/>
-              <a:t>01/06/2011</a:t>
+              <a:t>02/06/2011</a:t>
             </a:fld>
             <a:endParaRPr lang="fr-BE"/>
           </a:p>
@@ -4544,11 +4546,7 @@
             </a:fld>
             <a:r>
               <a:rPr lang="fr-BE" dirty="0" smtClean="0"/>
-              <a:t> sur </a:t>
-            </a:r>
-            <a:r>
-              <a:rPr lang="fr-BE" dirty="0" smtClean="0"/>
-              <a:t>21</a:t>
+              <a:t> sur 21</a:t>
             </a:r>
             <a:endParaRPr lang="fr-BE" dirty="0"/>
           </a:p>
@@ -4995,11 +4993,7 @@
             </a:fld>
             <a:r>
               <a:rPr lang="fr-BE" dirty="0" smtClean="0"/>
-              <a:t> sur </a:t>
-            </a:r>
-            <a:r>
-              <a:rPr lang="fr-BE" dirty="0" smtClean="0"/>
-              <a:t>21</a:t>
+              <a:t> sur 21</a:t>
             </a:r>
             <a:endParaRPr lang="fr-BE" dirty="0"/>
           </a:p>
@@ -5541,11 +5535,7 @@
             </a:fld>
             <a:r>
               <a:rPr lang="fr-BE" dirty="0" smtClean="0"/>
-              <a:t> sur </a:t>
-            </a:r>
-            <a:r>
-              <a:rPr lang="fr-BE" dirty="0" smtClean="0"/>
-              <a:t>21</a:t>
+              <a:t> sur 21</a:t>
             </a:r>
             <a:endParaRPr lang="fr-BE" dirty="0"/>
           </a:p>
@@ -5883,8 +5873,8 @@
         </p:blipFill>
         <p:spPr>
           <a:xfrm>
-            <a:off x="2123728" y="1916832"/>
-            <a:ext cx="2606040" cy="3840480"/>
+            <a:off x="2123728" y="1922664"/>
+            <a:ext cx="2606040" cy="3828815"/>
           </a:xfrm>
           <a:prstGeom prst="rect">
             <a:avLst/>
@@ -5907,8 +5897,8 @@
         </p:blipFill>
         <p:spPr>
           <a:xfrm>
-            <a:off x="5018092" y="2564904"/>
-            <a:ext cx="3802380" cy="2598420"/>
+            <a:off x="5018092" y="2571305"/>
+            <a:ext cx="3802380" cy="2585618"/>
           </a:xfrm>
           <a:prstGeom prst="rect">
             <a:avLst/>
@@ -6024,11 +6014,7 @@
             </a:fld>
             <a:r>
               <a:rPr lang="fr-BE" dirty="0" smtClean="0"/>
-              <a:t> sur </a:t>
-            </a:r>
-            <a:r>
-              <a:rPr lang="fr-BE" dirty="0" smtClean="0"/>
-              <a:t>21</a:t>
+              <a:t> sur 21</a:t>
             </a:r>
             <a:endParaRPr lang="fr-BE" dirty="0"/>
           </a:p>
@@ -6512,11 +6498,7 @@
             </a:fld>
             <a:r>
               <a:rPr lang="fr-BE" dirty="0" smtClean="0"/>
-              <a:t> sur </a:t>
-            </a:r>
-            <a:r>
-              <a:rPr lang="fr-BE" dirty="0" smtClean="0"/>
-              <a:t>21</a:t>
+              <a:t> sur 21</a:t>
             </a:r>
             <a:endParaRPr lang="fr-BE" dirty="0"/>
           </a:p>
@@ -7070,11 +7052,7 @@
             </a:fld>
             <a:r>
               <a:rPr lang="fr-BE" dirty="0" smtClean="0"/>
-              <a:t> sur </a:t>
-            </a:r>
-            <a:r>
-              <a:rPr lang="fr-BE" dirty="0" smtClean="0"/>
-              <a:t>21</a:t>
+              <a:t> sur 21</a:t>
             </a:r>
             <a:endParaRPr lang="fr-BE" dirty="0"/>
           </a:p>
@@ -7571,11 +7549,7 @@
             </a:fld>
             <a:r>
               <a:rPr lang="fr-BE" dirty="0" smtClean="0"/>
-              <a:t> sur </a:t>
-            </a:r>
-            <a:r>
-              <a:rPr lang="fr-BE" dirty="0" smtClean="0"/>
-              <a:t>21</a:t>
+              <a:t> sur 21</a:t>
             </a:r>
             <a:endParaRPr lang="fr-BE" dirty="0"/>
           </a:p>
@@ -7916,7 +7890,7 @@
           <a:blip r:embed="rId2" cstate="print">
             <a:extLst>
               <a:ext uri="{28A0092B-C50C-407E-A947-70E740481C1C}">
-                <a14:useLocalDpi xmlns:a14="http://schemas.microsoft.com/office/drawing/2010/main" xmlns="" val="0"/>
+                <a14:useLocalDpi xmlns="" xmlns:a14="http://schemas.microsoft.com/office/drawing/2010/main" val="0"/>
               </a:ext>
             </a:extLst>
           </a:blip>
@@ -7936,7 +7910,7 @@
           <a:noFill/>
           <a:extLst>
             <a:ext uri="{909E8E84-426E-40DD-AFC4-6F175D3DCCD1}">
-              <a14:hiddenFill xmlns:a14="http://schemas.microsoft.com/office/drawing/2010/main" xmlns="">
+              <a14:hiddenFill xmlns="" xmlns:a14="http://schemas.microsoft.com/office/drawing/2010/main">
                 <a:solidFill>
                   <a:srgbClr val="FFFFFF"/>
                 </a:solidFill>
@@ -8054,11 +8028,7 @@
             </a:fld>
             <a:r>
               <a:rPr lang="fr-BE" dirty="0" smtClean="0"/>
-              <a:t> sur </a:t>
-            </a:r>
-            <a:r>
-              <a:rPr lang="fr-BE" dirty="0" smtClean="0"/>
-              <a:t>21</a:t>
+              <a:t> sur 21</a:t>
             </a:r>
             <a:endParaRPr lang="fr-BE" dirty="0"/>
           </a:p>
@@ -8546,11 +8516,7 @@
             </a:fld>
             <a:r>
               <a:rPr lang="fr-BE" dirty="0" smtClean="0"/>
-              <a:t> sur </a:t>
-            </a:r>
-            <a:r>
-              <a:rPr lang="fr-BE" dirty="0" smtClean="0"/>
-              <a:t>21</a:t>
+              <a:t> sur 21</a:t>
             </a:r>
             <a:endParaRPr lang="fr-BE" dirty="0"/>
           </a:p>
@@ -9001,11 +8967,7 @@
             </a:fld>
             <a:r>
               <a:rPr lang="fr-BE" dirty="0" smtClean="0"/>
-              <a:t> sur </a:t>
-            </a:r>
-            <a:r>
-              <a:rPr lang="fr-BE" dirty="0" smtClean="0"/>
-              <a:t>21</a:t>
+              <a:t> sur 21</a:t>
             </a:r>
             <a:endParaRPr lang="fr-BE" dirty="0"/>
           </a:p>
@@ -9905,11 +9867,7 @@
             </a:fld>
             <a:r>
               <a:rPr lang="fr-BE" dirty="0" smtClean="0"/>
-              <a:t> sur </a:t>
-            </a:r>
-            <a:r>
-              <a:rPr lang="fr-BE" dirty="0" smtClean="0"/>
-              <a:t>21</a:t>
+              <a:t> sur 21</a:t>
             </a:r>
             <a:endParaRPr lang="fr-BE" dirty="0"/>
           </a:p>
@@ -10024,11 +9982,7 @@
             </a:fld>
             <a:r>
               <a:rPr lang="fr-BE" dirty="0" smtClean="0"/>
-              <a:t> sur </a:t>
-            </a:r>
-            <a:r>
-              <a:rPr lang="fr-BE" dirty="0" smtClean="0"/>
-              <a:t>21</a:t>
+              <a:t> sur 21</a:t>
             </a:r>
             <a:endParaRPr lang="fr-BE" dirty="0"/>
           </a:p>
@@ -10470,11 +10424,7 @@
             </a:fld>
             <a:r>
               <a:rPr lang="fr-BE" dirty="0" smtClean="0"/>
-              <a:t> sur </a:t>
-            </a:r>
-            <a:r>
-              <a:rPr lang="fr-BE" dirty="0" smtClean="0"/>
-              <a:t>21</a:t>
+              <a:t> sur 21</a:t>
             </a:r>
             <a:endParaRPr lang="fr-BE" dirty="0"/>
           </a:p>
@@ -10613,11 +10563,7 @@
             </a:fld>
             <a:r>
               <a:rPr lang="fr-BE" dirty="0" smtClean="0"/>
-              <a:t> sur </a:t>
-            </a:r>
-            <a:r>
-              <a:rPr lang="fr-BE" dirty="0" smtClean="0"/>
-              <a:t>21</a:t>
+              <a:t> sur 21</a:t>
             </a:r>
             <a:endParaRPr lang="fr-BE" dirty="0"/>
           </a:p>
@@ -11092,11 +11038,7 @@
             </a:fld>
             <a:r>
               <a:rPr lang="fr-BE" dirty="0" smtClean="0"/>
-              <a:t> sur </a:t>
-            </a:r>
-            <a:r>
-              <a:rPr lang="fr-BE" dirty="0" smtClean="0"/>
-              <a:t>21</a:t>
+              <a:t> sur 21</a:t>
             </a:r>
             <a:endParaRPr lang="fr-BE" dirty="0"/>
           </a:p>
@@ -11592,11 +11534,7 @@
             </a:fld>
             <a:r>
               <a:rPr lang="fr-BE" dirty="0" smtClean="0"/>
-              <a:t> sur </a:t>
-            </a:r>
-            <a:r>
-              <a:rPr lang="fr-BE" dirty="0" smtClean="0"/>
-              <a:t>21</a:t>
+              <a:t> sur 21</a:t>
             </a:r>
             <a:endParaRPr lang="fr-BE" dirty="0"/>
           </a:p>
@@ -11972,11 +11910,7 @@
             </a:fld>
             <a:r>
               <a:rPr lang="fr-BE" dirty="0" smtClean="0"/>
-              <a:t> sur </a:t>
-            </a:r>
-            <a:r>
-              <a:rPr lang="fr-BE" dirty="0" smtClean="0"/>
-              <a:t>21</a:t>
+              <a:t> sur 21</a:t>
             </a:r>
             <a:endParaRPr lang="fr-BE" dirty="0"/>
           </a:p>
@@ -12418,11 +12352,7 @@
             </a:fld>
             <a:r>
               <a:rPr lang="fr-BE" dirty="0" smtClean="0"/>
-              <a:t> sur </a:t>
-            </a:r>
-            <a:r>
-              <a:rPr lang="fr-BE" dirty="0" smtClean="0"/>
-              <a:t>21</a:t>
+              <a:t> sur 21</a:t>
             </a:r>
             <a:endParaRPr lang="fr-BE" dirty="0"/>
           </a:p>
@@ -12798,11 +12728,7 @@
             </a:fld>
             <a:r>
               <a:rPr lang="fr-BE" dirty="0" smtClean="0"/>
-              <a:t> sur </a:t>
-            </a:r>
-            <a:r>
-              <a:rPr lang="fr-BE" dirty="0" smtClean="0"/>
-              <a:t>21</a:t>
+              <a:t> sur 21</a:t>
             </a:r>
             <a:endParaRPr lang="fr-BE" dirty="0"/>
           </a:p>
@@ -13312,11 +13238,7 @@
             </a:fld>
             <a:r>
               <a:rPr lang="fr-BE" dirty="0" smtClean="0"/>
-              <a:t> sur </a:t>
-            </a:r>
-            <a:r>
-              <a:rPr lang="fr-BE" dirty="0" smtClean="0"/>
-              <a:t>21</a:t>
+              <a:t> sur 21</a:t>
             </a:r>
             <a:endParaRPr lang="fr-BE" dirty="0"/>
           </a:p>

</xml_diff>

<commit_message>
Amélioration présentation calage animation avec musique.
</commit_message>
<xml_diff>
--- a/AAP/docs/Presentation.pptx
+++ b/AAP/docs/Presentation.pptx
@@ -212,7 +212,7 @@
             <a:fld id="{678F24D5-C480-446D-B22C-7F566331EF41}" type="datetimeFigureOut">
               <a:rPr lang="fr-FR" smtClean="0"/>
               <a:pPr/>
-              <a:t>04/06/2011</a:t>
+              <a:t>05/06/2011</a:t>
             </a:fld>
             <a:endParaRPr lang="fr-FR"/>
           </a:p>
@@ -374,7 +374,7 @@
             <a:fld id="{9F7A5740-AB0E-48E6-BCE9-09FA638B6FD3}" type="datetimeFigureOut">
               <a:rPr lang="fr-FR" smtClean="0"/>
               <a:pPr/>
-              <a:t>04/06/2011</a:t>
+              <a:t>05/06/2011</a:t>
             </a:fld>
             <a:endParaRPr lang="fr-FR"/>
           </a:p>
@@ -545,7 +545,7 @@
     </p:spTree>
     <p:extLst>
       <p:ext uri="{BB962C8B-B14F-4D97-AF65-F5344CB8AC3E}">
-        <p14:creationId xmlns="" xmlns:p14="http://schemas.microsoft.com/office/powerpoint/2010/main" val="2884352748"/>
+        <p14:creationId xmlns:p14="http://schemas.microsoft.com/office/powerpoint/2010/main" xmlns="" val="2884352748"/>
       </p:ext>
     </p:extLst>
   </p:cSld>
@@ -1170,7 +1170,7 @@
             <a:fld id="{DF9D4494-96E0-4406-9347-E80FE7704387}" type="datetime1">
               <a:rPr lang="fr-FR" smtClean="0"/>
               <a:pPr/>
-              <a:t>04/06/2011</a:t>
+              <a:t>05/06/2011</a:t>
             </a:fld>
             <a:endParaRPr lang="fr-BE"/>
           </a:p>
@@ -1431,7 +1431,7 @@
             <a:fld id="{A89CA437-F84A-4BDD-8C20-46077FA11AD7}" type="datetime1">
               <a:rPr lang="fr-FR" smtClean="0"/>
               <a:pPr/>
-              <a:t>04/06/2011</a:t>
+              <a:t>05/06/2011</a:t>
             </a:fld>
             <a:endParaRPr lang="fr-BE"/>
           </a:p>
@@ -1602,7 +1602,7 @@
             <a:fld id="{24135A20-DC24-4C20-9F62-FD3DD13F2969}" type="datetime1">
               <a:rPr lang="fr-FR" smtClean="0"/>
               <a:pPr/>
-              <a:t>04/06/2011</a:t>
+              <a:t>05/06/2011</a:t>
             </a:fld>
             <a:endParaRPr lang="fr-BE"/>
           </a:p>
@@ -1783,7 +1783,7 @@
             <a:fld id="{C74C95C5-D393-4D2F-A12B-633BD3C7E534}" type="datetime1">
               <a:rPr lang="fr-FR" smtClean="0"/>
               <a:pPr/>
-              <a:t>04/06/2011</a:t>
+              <a:t>05/06/2011</a:t>
             </a:fld>
             <a:endParaRPr lang="fr-BE"/>
           </a:p>
@@ -2785,7 +2785,7 @@
             <a:fld id="{9DEFE777-74D9-46A9-AF63-ECD7CA5CB743}" type="datetime1">
               <a:rPr lang="fr-FR" smtClean="0"/>
               <a:pPr/>
-              <a:t>04/06/2011</a:t>
+              <a:t>05/06/2011</a:t>
             </a:fld>
             <a:endParaRPr lang="fr-BE"/>
           </a:p>
@@ -3074,7 +3074,7 @@
             <a:fld id="{9ACF5AB4-72D0-4411-8F4F-4D9D79E948BF}" type="datetime1">
               <a:rPr lang="fr-FR" smtClean="0"/>
               <a:pPr/>
-              <a:t>04/06/2011</a:t>
+              <a:t>05/06/2011</a:t>
             </a:fld>
             <a:endParaRPr lang="fr-BE"/>
           </a:p>
@@ -3497,7 +3497,7 @@
             <a:fld id="{D2811741-81B4-41E5-A5E9-7992F4B62001}" type="datetime1">
               <a:rPr lang="fr-FR" smtClean="0"/>
               <a:pPr/>
-              <a:t>04/06/2011</a:t>
+              <a:t>05/06/2011</a:t>
             </a:fld>
             <a:endParaRPr lang="fr-BE"/>
           </a:p>
@@ -3616,7 +3616,7 @@
             <a:fld id="{FA06DA9A-0216-4D5C-BA8D-BFCD89B87CAB}" type="datetime1">
               <a:rPr lang="fr-FR" smtClean="0"/>
               <a:pPr/>
-              <a:t>04/06/2011</a:t>
+              <a:t>05/06/2011</a:t>
             </a:fld>
             <a:endParaRPr lang="fr-BE"/>
           </a:p>
@@ -3712,7 +3712,7 @@
             <a:fld id="{3EDB268D-CAC0-4A46-8E29-E987593C3F48}" type="datetime1">
               <a:rPr lang="fr-FR" smtClean="0"/>
               <a:pPr/>
-              <a:t>04/06/2011</a:t>
+              <a:t>05/06/2011</a:t>
             </a:fld>
             <a:endParaRPr lang="fr-BE"/>
           </a:p>
@@ -3990,7 +3990,7 @@
             <a:fld id="{5B09ACAE-89F7-4AA2-AF12-DFB25BECD9F8}" type="datetime1">
               <a:rPr lang="fr-FR" smtClean="0"/>
               <a:pPr/>
-              <a:t>04/06/2011</a:t>
+              <a:t>05/06/2011</a:t>
             </a:fld>
             <a:endParaRPr lang="fr-BE"/>
           </a:p>
@@ -4213,7 +4213,7 @@
             <a:fld id="{C2D67580-B034-40FA-BDF9-08E33D7DD05F}" type="datetime1">
               <a:rPr lang="fr-FR" smtClean="0"/>
               <a:pPr/>
-              <a:t>04/06/2011</a:t>
+              <a:t>05/06/2011</a:t>
             </a:fld>
             <a:endParaRPr lang="fr-BE"/>
           </a:p>
@@ -6752,7 +6752,7 @@
           <a:blip r:embed="rId2" cstate="print">
             <a:extLst>
               <a:ext uri="{28A0092B-C50C-407E-A947-70E740481C1C}">
-                <a14:useLocalDpi xmlns="" xmlns:a14="http://schemas.microsoft.com/office/drawing/2010/main" val="0"/>
+                <a14:useLocalDpi xmlns:a14="http://schemas.microsoft.com/office/drawing/2010/main" xmlns="" val="0"/>
               </a:ext>
             </a:extLst>
           </a:blip>
@@ -6772,7 +6772,7 @@
           <a:noFill/>
           <a:extLst>
             <a:ext uri="{909E8E84-426E-40DD-AFC4-6F175D3DCCD1}">
-              <a14:hiddenFill xmlns="" xmlns:a14="http://schemas.microsoft.com/office/drawing/2010/main">
+              <a14:hiddenFill xmlns:a14="http://schemas.microsoft.com/office/drawing/2010/main" xmlns="">
                 <a:solidFill>
                   <a:srgbClr val="FFFFFF"/>
                 </a:solidFill>
@@ -10792,7 +10792,7 @@
                               <p:par>
                                 <p:cTn id="56" presetID="39" presetClass="exit" presetSubtype="0" decel="100000" fill="hold" nodeType="withEffect">
                                   <p:stCondLst>
-                                    <p:cond delay="26400"/>
+                                    <p:cond delay="26000"/>
                                   </p:stCondLst>
                                   <p:childTnLst>
                                     <p:anim calcmode="lin" valueType="num">
@@ -10926,7 +10926,7 @@
                               <p:par>
                                 <p:cTn id="62" presetID="39" presetClass="exit" presetSubtype="0" decel="100000" fill="hold" nodeType="withEffect">
                                   <p:stCondLst>
-                                    <p:cond delay="26400"/>
+                                    <p:cond delay="26000"/>
                                   </p:stCondLst>
                                   <p:childTnLst>
                                     <p:anim calcmode="lin" valueType="num">
@@ -11060,7 +11060,7 @@
                               <p:par>
                                 <p:cTn id="68" presetID="39" presetClass="exit" presetSubtype="0" decel="100000" fill="hold" nodeType="withEffect">
                                   <p:stCondLst>
-                                    <p:cond delay="26400"/>
+                                    <p:cond delay="26000"/>
                                   </p:stCondLst>
                                   <p:childTnLst>
                                     <p:anim calcmode="lin" valueType="num">
@@ -11194,7 +11194,7 @@
                               <p:par>
                                 <p:cTn id="74" presetID="39" presetClass="exit" presetSubtype="0" decel="100000" fill="hold" nodeType="withEffect">
                                   <p:stCondLst>
-                                    <p:cond delay="26400"/>
+                                    <p:cond delay="26000"/>
                                   </p:stCondLst>
                                   <p:childTnLst>
                                     <p:anim calcmode="lin" valueType="num">
@@ -11351,7 +11351,7 @@
                                     </p:set>
                                     <p:anim calcmode="lin" valueType="num">
                                       <p:cBhvr additive="base">
-                                        <p:cTn id="82" dur="1000" fill="hold"/>
+                                        <p:cTn id="82" dur="500" fill="hold"/>
                                         <p:tgtEl>
                                           <p:spTgt spid="22"/>
                                         </p:tgtEl>
@@ -11374,7 +11374,7 @@
                                     </p:anim>
                                     <p:anim calcmode="lin" valueType="num">
                                       <p:cBhvr additive="base">
-                                        <p:cTn id="83" dur="1000" fill="hold"/>
+                                        <p:cTn id="83" dur="500" fill="hold"/>
                                         <p:tgtEl>
                                           <p:spTgt spid="22"/>
                                         </p:tgtEl>

</xml_diff>

<commit_message>
Maj - PowerPoint - Images (pour PPT)
</commit_message>
<xml_diff>
--- a/AAP/docs/Presentation.pptx
+++ b/AAP/docs/Presentation.pptx
@@ -285,6 +285,11 @@
         </p:txBody>
       </p:sp>
     </p:spTree>
+    <p:extLst>
+      <p:ext uri="{BB962C8B-B14F-4D97-AF65-F5344CB8AC3E}">
+        <p14:creationId xmlns:p14="http://schemas.microsoft.com/office/powerpoint/2010/main" val="2207784617"/>
+      </p:ext>
+    </p:extLst>
   </p:cSld>
   <p:clrMap bg1="lt1" tx1="dk1" bg2="lt2" tx2="dk2" accent1="accent1" accent2="accent2" accent3="accent3" accent4="accent4" accent5="accent5" accent6="accent6" hlink="hlink" folHlink="folHlink"/>
 </p:handoutMaster>
@@ -544,7 +549,7 @@
     </p:spTree>
     <p:extLst>
       <p:ext uri="{BB962C8B-B14F-4D97-AF65-F5344CB8AC3E}">
-        <p14:creationId xmlns:p14="http://schemas.microsoft.com/office/powerpoint/2010/main" xmlns="" val="2884352748"/>
+        <p14:creationId xmlns:p14="http://schemas.microsoft.com/office/powerpoint/2010/main" val="2884352748"/>
       </p:ext>
     </p:extLst>
   </p:cSld>
@@ -5495,6 +5500,156 @@
           </a:p>
         </p:txBody>
       </p:sp>
+      <p:pic>
+        <p:nvPicPr>
+          <p:cNvPr id="3" name="Image 2"/>
+          <p:cNvPicPr>
+            <a:picLocks noChangeAspect="1"/>
+          </p:cNvPicPr>
+          <p:nvPr/>
+        </p:nvPicPr>
+        <p:blipFill>
+          <a:blip r:embed="rId2">
+            <a:extLst>
+              <a:ext uri="{28A0092B-C50C-407E-A947-70E740481C1C}">
+                <a14:useLocalDpi xmlns:a14="http://schemas.microsoft.com/office/drawing/2010/main" val="0"/>
+              </a:ext>
+            </a:extLst>
+          </a:blip>
+          <a:stretch>
+            <a:fillRect/>
+          </a:stretch>
+        </p:blipFill>
+        <p:spPr>
+          <a:xfrm>
+            <a:off x="5868144" y="4486569"/>
+            <a:ext cx="1722514" cy="1322645"/>
+          </a:xfrm>
+          <a:prstGeom prst="rect">
+            <a:avLst/>
+          </a:prstGeom>
+        </p:spPr>
+      </p:pic>
+      <p:pic>
+        <p:nvPicPr>
+          <p:cNvPr id="11" name="Image 10"/>
+          <p:cNvPicPr>
+            <a:picLocks noChangeAspect="1"/>
+          </p:cNvPicPr>
+          <p:nvPr/>
+        </p:nvPicPr>
+        <p:blipFill>
+          <a:blip r:embed="rId3">
+            <a:extLst>
+              <a:ext uri="{28A0092B-C50C-407E-A947-70E740481C1C}">
+                <a14:useLocalDpi xmlns:a14="http://schemas.microsoft.com/office/drawing/2010/main" val="0"/>
+              </a:ext>
+            </a:extLst>
+          </a:blip>
+          <a:stretch>
+            <a:fillRect/>
+          </a:stretch>
+        </p:blipFill>
+        <p:spPr>
+          <a:xfrm>
+            <a:off x="5743145" y="4486569"/>
+            <a:ext cx="1972511" cy="1338689"/>
+          </a:xfrm>
+          <a:prstGeom prst="rect">
+            <a:avLst/>
+          </a:prstGeom>
+        </p:spPr>
+      </p:pic>
+      <p:pic>
+        <p:nvPicPr>
+          <p:cNvPr id="12" name="Image 11"/>
+          <p:cNvPicPr>
+            <a:picLocks noChangeAspect="1"/>
+          </p:cNvPicPr>
+          <p:nvPr/>
+        </p:nvPicPr>
+        <p:blipFill>
+          <a:blip r:embed="rId4">
+            <a:extLst>
+              <a:ext uri="{28A0092B-C50C-407E-A947-70E740481C1C}">
+                <a14:useLocalDpi xmlns:a14="http://schemas.microsoft.com/office/drawing/2010/main" val="0"/>
+              </a:ext>
+            </a:extLst>
+          </a:blip>
+          <a:stretch>
+            <a:fillRect/>
+          </a:stretch>
+        </p:blipFill>
+        <p:spPr>
+          <a:xfrm>
+            <a:off x="5770811" y="4470525"/>
+            <a:ext cx="1917180" cy="1338689"/>
+          </a:xfrm>
+          <a:prstGeom prst="rect">
+            <a:avLst/>
+          </a:prstGeom>
+        </p:spPr>
+      </p:pic>
+      <p:pic>
+        <p:nvPicPr>
+          <p:cNvPr id="13" name="Image 12"/>
+          <p:cNvPicPr>
+            <a:picLocks noChangeAspect="1"/>
+          </p:cNvPicPr>
+          <p:nvPr/>
+        </p:nvPicPr>
+        <p:blipFill>
+          <a:blip r:embed="rId5">
+            <a:extLst>
+              <a:ext uri="{28A0092B-C50C-407E-A947-70E740481C1C}">
+                <a14:useLocalDpi xmlns:a14="http://schemas.microsoft.com/office/drawing/2010/main" val="0"/>
+              </a:ext>
+            </a:extLst>
+          </a:blip>
+          <a:stretch>
+            <a:fillRect/>
+          </a:stretch>
+        </p:blipFill>
+        <p:spPr>
+          <a:xfrm>
+            <a:off x="7092280" y="4519063"/>
+            <a:ext cx="1465485" cy="1306195"/>
+          </a:xfrm>
+          <a:prstGeom prst="rect">
+            <a:avLst/>
+          </a:prstGeom>
+        </p:spPr>
+      </p:pic>
+      <p:pic>
+        <p:nvPicPr>
+          <p:cNvPr id="14" name="Image 13"/>
+          <p:cNvPicPr>
+            <a:picLocks noChangeAspect="1"/>
+          </p:cNvPicPr>
+          <p:nvPr/>
+        </p:nvPicPr>
+        <p:blipFill>
+          <a:blip r:embed="rId6">
+            <a:extLst>
+              <a:ext uri="{28A0092B-C50C-407E-A947-70E740481C1C}">
+                <a14:useLocalDpi xmlns:a14="http://schemas.microsoft.com/office/drawing/2010/main" val="0"/>
+              </a:ext>
+            </a:extLst>
+          </a:blip>
+          <a:stretch>
+            <a:fillRect/>
+          </a:stretch>
+        </p:blipFill>
+        <p:spPr>
+          <a:xfrm>
+            <a:off x="4862195" y="4293096"/>
+            <a:ext cx="1761900" cy="1991025"/>
+          </a:xfrm>
+          <a:prstGeom prst="rect">
+            <a:avLst/>
+          </a:prstGeom>
+        </p:spPr>
+      </p:pic>
     </p:spTree>
   </p:cSld>
   <p:clrMapOvr>
@@ -5506,7 +5661,686 @@
   <p:timing>
     <p:tnLst>
       <p:par>
-        <p:cTn id="1" dur="indefinite" restart="never" nodeType="tmRoot"/>
+        <p:cTn id="1" dur="indefinite" restart="never" nodeType="tmRoot">
+          <p:childTnLst>
+            <p:seq concurrent="1" nextAc="seek">
+              <p:cTn id="2" dur="indefinite" nodeType="mainSeq">
+                <p:childTnLst>
+                  <p:par>
+                    <p:cTn id="3" fill="hold">
+                      <p:stCondLst>
+                        <p:cond delay="indefinite"/>
+                      </p:stCondLst>
+                      <p:childTnLst>
+                        <p:par>
+                          <p:cTn id="4" fill="hold">
+                            <p:stCondLst>
+                              <p:cond delay="0"/>
+                            </p:stCondLst>
+                            <p:childTnLst>
+                              <p:par>
+                                <p:cTn id="5" presetID="2" presetClass="entr" presetSubtype="8" fill="hold" nodeType="clickEffect">
+                                  <p:stCondLst>
+                                    <p:cond delay="0"/>
+                                  </p:stCondLst>
+                                  <p:childTnLst>
+                                    <p:set>
+                                      <p:cBhvr>
+                                        <p:cTn id="6" dur="1" fill="hold">
+                                          <p:stCondLst>
+                                            <p:cond delay="0"/>
+                                          </p:stCondLst>
+                                        </p:cTn>
+                                        <p:tgtEl>
+                                          <p:spTgt spid="3"/>
+                                        </p:tgtEl>
+                                        <p:attrNameLst>
+                                          <p:attrName>style.visibility</p:attrName>
+                                        </p:attrNameLst>
+                                      </p:cBhvr>
+                                      <p:to>
+                                        <p:strVal val="visible"/>
+                                      </p:to>
+                                    </p:set>
+                                    <p:anim calcmode="lin" valueType="num">
+                                      <p:cBhvr additive="base">
+                                        <p:cTn id="7" dur="1000" fill="hold"/>
+                                        <p:tgtEl>
+                                          <p:spTgt spid="3"/>
+                                        </p:tgtEl>
+                                        <p:attrNameLst>
+                                          <p:attrName>ppt_x</p:attrName>
+                                        </p:attrNameLst>
+                                      </p:cBhvr>
+                                      <p:tavLst>
+                                        <p:tav tm="0">
+                                          <p:val>
+                                            <p:strVal val="0-#ppt_w/2"/>
+                                          </p:val>
+                                        </p:tav>
+                                        <p:tav tm="100000">
+                                          <p:val>
+                                            <p:strVal val="#ppt_x"/>
+                                          </p:val>
+                                        </p:tav>
+                                      </p:tavLst>
+                                    </p:anim>
+                                    <p:anim calcmode="lin" valueType="num">
+                                      <p:cBhvr additive="base">
+                                        <p:cTn id="8" dur="1000" fill="hold"/>
+                                        <p:tgtEl>
+                                          <p:spTgt spid="3"/>
+                                        </p:tgtEl>
+                                        <p:attrNameLst>
+                                          <p:attrName>ppt_y</p:attrName>
+                                        </p:attrNameLst>
+                                      </p:cBhvr>
+                                      <p:tavLst>
+                                        <p:tav tm="0">
+                                          <p:val>
+                                            <p:strVal val="#ppt_y"/>
+                                          </p:val>
+                                        </p:tav>
+                                        <p:tav tm="100000">
+                                          <p:val>
+                                            <p:strVal val="#ppt_y"/>
+                                          </p:val>
+                                        </p:tav>
+                                      </p:tavLst>
+                                    </p:anim>
+                                  </p:childTnLst>
+                                </p:cTn>
+                              </p:par>
+                            </p:childTnLst>
+                          </p:cTn>
+                        </p:par>
+                      </p:childTnLst>
+                    </p:cTn>
+                  </p:par>
+                  <p:par>
+                    <p:cTn id="9" fill="hold">
+                      <p:stCondLst>
+                        <p:cond delay="indefinite"/>
+                      </p:stCondLst>
+                      <p:childTnLst>
+                        <p:par>
+                          <p:cTn id="10" fill="hold">
+                            <p:stCondLst>
+                              <p:cond delay="0"/>
+                            </p:stCondLst>
+                            <p:childTnLst>
+                              <p:par>
+                                <p:cTn id="11" presetID="2" presetClass="exit" presetSubtype="2" fill="hold" nodeType="clickEffect">
+                                  <p:stCondLst>
+                                    <p:cond delay="0"/>
+                                  </p:stCondLst>
+                                  <p:childTnLst>
+                                    <p:anim calcmode="lin" valueType="num">
+                                      <p:cBhvr additive="base">
+                                        <p:cTn id="12" dur="500"/>
+                                        <p:tgtEl>
+                                          <p:spTgt spid="3"/>
+                                        </p:tgtEl>
+                                        <p:attrNameLst>
+                                          <p:attrName>ppt_x</p:attrName>
+                                        </p:attrNameLst>
+                                      </p:cBhvr>
+                                      <p:tavLst>
+                                        <p:tav tm="0">
+                                          <p:val>
+                                            <p:strVal val="ppt_x"/>
+                                          </p:val>
+                                        </p:tav>
+                                        <p:tav tm="100000">
+                                          <p:val>
+                                            <p:strVal val="1+ppt_w/2"/>
+                                          </p:val>
+                                        </p:tav>
+                                      </p:tavLst>
+                                    </p:anim>
+                                    <p:anim calcmode="lin" valueType="num">
+                                      <p:cBhvr additive="base">
+                                        <p:cTn id="13" dur="500"/>
+                                        <p:tgtEl>
+                                          <p:spTgt spid="3"/>
+                                        </p:tgtEl>
+                                        <p:attrNameLst>
+                                          <p:attrName>ppt_y</p:attrName>
+                                        </p:attrNameLst>
+                                      </p:cBhvr>
+                                      <p:tavLst>
+                                        <p:tav tm="0">
+                                          <p:val>
+                                            <p:strVal val="ppt_y"/>
+                                          </p:val>
+                                        </p:tav>
+                                        <p:tav tm="100000">
+                                          <p:val>
+                                            <p:strVal val="ppt_y"/>
+                                          </p:val>
+                                        </p:tav>
+                                      </p:tavLst>
+                                    </p:anim>
+                                    <p:set>
+                                      <p:cBhvr>
+                                        <p:cTn id="14" dur="1" fill="hold">
+                                          <p:stCondLst>
+                                            <p:cond delay="499"/>
+                                          </p:stCondLst>
+                                        </p:cTn>
+                                        <p:tgtEl>
+                                          <p:spTgt spid="3"/>
+                                        </p:tgtEl>
+                                        <p:attrNameLst>
+                                          <p:attrName>style.visibility</p:attrName>
+                                        </p:attrNameLst>
+                                      </p:cBhvr>
+                                      <p:to>
+                                        <p:strVal val="hidden"/>
+                                      </p:to>
+                                    </p:set>
+                                  </p:childTnLst>
+                                </p:cTn>
+                              </p:par>
+                              <p:par>
+                                <p:cTn id="15" presetID="2" presetClass="entr" presetSubtype="8" fill="hold" nodeType="withEffect">
+                                  <p:stCondLst>
+                                    <p:cond delay="0"/>
+                                  </p:stCondLst>
+                                  <p:childTnLst>
+                                    <p:set>
+                                      <p:cBhvr>
+                                        <p:cTn id="16" dur="1" fill="hold">
+                                          <p:stCondLst>
+                                            <p:cond delay="0"/>
+                                          </p:stCondLst>
+                                        </p:cTn>
+                                        <p:tgtEl>
+                                          <p:spTgt spid="11"/>
+                                        </p:tgtEl>
+                                        <p:attrNameLst>
+                                          <p:attrName>style.visibility</p:attrName>
+                                        </p:attrNameLst>
+                                      </p:cBhvr>
+                                      <p:to>
+                                        <p:strVal val="visible"/>
+                                      </p:to>
+                                    </p:set>
+                                    <p:anim calcmode="lin" valueType="num">
+                                      <p:cBhvr additive="base">
+                                        <p:cTn id="17" dur="1000" fill="hold"/>
+                                        <p:tgtEl>
+                                          <p:spTgt spid="11"/>
+                                        </p:tgtEl>
+                                        <p:attrNameLst>
+                                          <p:attrName>ppt_x</p:attrName>
+                                        </p:attrNameLst>
+                                      </p:cBhvr>
+                                      <p:tavLst>
+                                        <p:tav tm="0">
+                                          <p:val>
+                                            <p:strVal val="0-#ppt_w/2"/>
+                                          </p:val>
+                                        </p:tav>
+                                        <p:tav tm="100000">
+                                          <p:val>
+                                            <p:strVal val="#ppt_x"/>
+                                          </p:val>
+                                        </p:tav>
+                                      </p:tavLst>
+                                    </p:anim>
+                                    <p:anim calcmode="lin" valueType="num">
+                                      <p:cBhvr additive="base">
+                                        <p:cTn id="18" dur="1000" fill="hold"/>
+                                        <p:tgtEl>
+                                          <p:spTgt spid="11"/>
+                                        </p:tgtEl>
+                                        <p:attrNameLst>
+                                          <p:attrName>ppt_y</p:attrName>
+                                        </p:attrNameLst>
+                                      </p:cBhvr>
+                                      <p:tavLst>
+                                        <p:tav tm="0">
+                                          <p:val>
+                                            <p:strVal val="#ppt_y"/>
+                                          </p:val>
+                                        </p:tav>
+                                        <p:tav tm="100000">
+                                          <p:val>
+                                            <p:strVal val="#ppt_y"/>
+                                          </p:val>
+                                        </p:tav>
+                                      </p:tavLst>
+                                    </p:anim>
+                                  </p:childTnLst>
+                                </p:cTn>
+                              </p:par>
+                            </p:childTnLst>
+                          </p:cTn>
+                        </p:par>
+                      </p:childTnLst>
+                    </p:cTn>
+                  </p:par>
+                  <p:par>
+                    <p:cTn id="19" fill="hold">
+                      <p:stCondLst>
+                        <p:cond delay="indefinite"/>
+                      </p:stCondLst>
+                      <p:childTnLst>
+                        <p:par>
+                          <p:cTn id="20" fill="hold">
+                            <p:stCondLst>
+                              <p:cond delay="0"/>
+                            </p:stCondLst>
+                            <p:childTnLst>
+                              <p:par>
+                                <p:cTn id="21" presetID="2" presetClass="exit" presetSubtype="2" fill="hold" nodeType="clickEffect">
+                                  <p:stCondLst>
+                                    <p:cond delay="0"/>
+                                  </p:stCondLst>
+                                  <p:childTnLst>
+                                    <p:anim calcmode="lin" valueType="num">
+                                      <p:cBhvr additive="base">
+                                        <p:cTn id="22" dur="500"/>
+                                        <p:tgtEl>
+                                          <p:spTgt spid="11"/>
+                                        </p:tgtEl>
+                                        <p:attrNameLst>
+                                          <p:attrName>ppt_x</p:attrName>
+                                        </p:attrNameLst>
+                                      </p:cBhvr>
+                                      <p:tavLst>
+                                        <p:tav tm="0">
+                                          <p:val>
+                                            <p:strVal val="ppt_x"/>
+                                          </p:val>
+                                        </p:tav>
+                                        <p:tav tm="100000">
+                                          <p:val>
+                                            <p:strVal val="1+ppt_w/2"/>
+                                          </p:val>
+                                        </p:tav>
+                                      </p:tavLst>
+                                    </p:anim>
+                                    <p:anim calcmode="lin" valueType="num">
+                                      <p:cBhvr additive="base">
+                                        <p:cTn id="23" dur="500"/>
+                                        <p:tgtEl>
+                                          <p:spTgt spid="11"/>
+                                        </p:tgtEl>
+                                        <p:attrNameLst>
+                                          <p:attrName>ppt_y</p:attrName>
+                                        </p:attrNameLst>
+                                      </p:cBhvr>
+                                      <p:tavLst>
+                                        <p:tav tm="0">
+                                          <p:val>
+                                            <p:strVal val="ppt_y"/>
+                                          </p:val>
+                                        </p:tav>
+                                        <p:tav tm="100000">
+                                          <p:val>
+                                            <p:strVal val="ppt_y"/>
+                                          </p:val>
+                                        </p:tav>
+                                      </p:tavLst>
+                                    </p:anim>
+                                    <p:set>
+                                      <p:cBhvr>
+                                        <p:cTn id="24" dur="1" fill="hold">
+                                          <p:stCondLst>
+                                            <p:cond delay="499"/>
+                                          </p:stCondLst>
+                                        </p:cTn>
+                                        <p:tgtEl>
+                                          <p:spTgt spid="11"/>
+                                        </p:tgtEl>
+                                        <p:attrNameLst>
+                                          <p:attrName>style.visibility</p:attrName>
+                                        </p:attrNameLst>
+                                      </p:cBhvr>
+                                      <p:to>
+                                        <p:strVal val="hidden"/>
+                                      </p:to>
+                                    </p:set>
+                                  </p:childTnLst>
+                                </p:cTn>
+                              </p:par>
+                              <p:par>
+                                <p:cTn id="25" presetID="2" presetClass="entr" presetSubtype="8" fill="hold" nodeType="withEffect">
+                                  <p:stCondLst>
+                                    <p:cond delay="0"/>
+                                  </p:stCondLst>
+                                  <p:childTnLst>
+                                    <p:set>
+                                      <p:cBhvr>
+                                        <p:cTn id="26" dur="1" fill="hold">
+                                          <p:stCondLst>
+                                            <p:cond delay="0"/>
+                                          </p:stCondLst>
+                                        </p:cTn>
+                                        <p:tgtEl>
+                                          <p:spTgt spid="12"/>
+                                        </p:tgtEl>
+                                        <p:attrNameLst>
+                                          <p:attrName>style.visibility</p:attrName>
+                                        </p:attrNameLst>
+                                      </p:cBhvr>
+                                      <p:to>
+                                        <p:strVal val="visible"/>
+                                      </p:to>
+                                    </p:set>
+                                    <p:anim calcmode="lin" valueType="num">
+                                      <p:cBhvr additive="base">
+                                        <p:cTn id="27" dur="1000" fill="hold"/>
+                                        <p:tgtEl>
+                                          <p:spTgt spid="12"/>
+                                        </p:tgtEl>
+                                        <p:attrNameLst>
+                                          <p:attrName>ppt_x</p:attrName>
+                                        </p:attrNameLst>
+                                      </p:cBhvr>
+                                      <p:tavLst>
+                                        <p:tav tm="0">
+                                          <p:val>
+                                            <p:strVal val="0-#ppt_w/2"/>
+                                          </p:val>
+                                        </p:tav>
+                                        <p:tav tm="100000">
+                                          <p:val>
+                                            <p:strVal val="#ppt_x"/>
+                                          </p:val>
+                                        </p:tav>
+                                      </p:tavLst>
+                                    </p:anim>
+                                    <p:anim calcmode="lin" valueType="num">
+                                      <p:cBhvr additive="base">
+                                        <p:cTn id="28" dur="1000" fill="hold"/>
+                                        <p:tgtEl>
+                                          <p:spTgt spid="12"/>
+                                        </p:tgtEl>
+                                        <p:attrNameLst>
+                                          <p:attrName>ppt_y</p:attrName>
+                                        </p:attrNameLst>
+                                      </p:cBhvr>
+                                      <p:tavLst>
+                                        <p:tav tm="0">
+                                          <p:val>
+                                            <p:strVal val="#ppt_y"/>
+                                          </p:val>
+                                        </p:tav>
+                                        <p:tav tm="100000">
+                                          <p:val>
+                                            <p:strVal val="#ppt_y"/>
+                                          </p:val>
+                                        </p:tav>
+                                      </p:tavLst>
+                                    </p:anim>
+                                  </p:childTnLst>
+                                </p:cTn>
+                              </p:par>
+                            </p:childTnLst>
+                          </p:cTn>
+                        </p:par>
+                      </p:childTnLst>
+                    </p:cTn>
+                  </p:par>
+                  <p:par>
+                    <p:cTn id="29" fill="hold">
+                      <p:stCondLst>
+                        <p:cond delay="indefinite"/>
+                      </p:stCondLst>
+                      <p:childTnLst>
+                        <p:par>
+                          <p:cTn id="30" fill="hold">
+                            <p:stCondLst>
+                              <p:cond delay="0"/>
+                            </p:stCondLst>
+                            <p:childTnLst>
+                              <p:par>
+                                <p:cTn id="31" presetID="2" presetClass="exit" presetSubtype="2" fill="hold" nodeType="clickEffect">
+                                  <p:stCondLst>
+                                    <p:cond delay="0"/>
+                                  </p:stCondLst>
+                                  <p:childTnLst>
+                                    <p:anim calcmode="lin" valueType="num">
+                                      <p:cBhvr additive="base">
+                                        <p:cTn id="32" dur="500"/>
+                                        <p:tgtEl>
+                                          <p:spTgt spid="12"/>
+                                        </p:tgtEl>
+                                        <p:attrNameLst>
+                                          <p:attrName>ppt_x</p:attrName>
+                                        </p:attrNameLst>
+                                      </p:cBhvr>
+                                      <p:tavLst>
+                                        <p:tav tm="0">
+                                          <p:val>
+                                            <p:strVal val="ppt_x"/>
+                                          </p:val>
+                                        </p:tav>
+                                        <p:tav tm="100000">
+                                          <p:val>
+                                            <p:strVal val="1+ppt_w/2"/>
+                                          </p:val>
+                                        </p:tav>
+                                      </p:tavLst>
+                                    </p:anim>
+                                    <p:anim calcmode="lin" valueType="num">
+                                      <p:cBhvr additive="base">
+                                        <p:cTn id="33" dur="500"/>
+                                        <p:tgtEl>
+                                          <p:spTgt spid="12"/>
+                                        </p:tgtEl>
+                                        <p:attrNameLst>
+                                          <p:attrName>ppt_y</p:attrName>
+                                        </p:attrNameLst>
+                                      </p:cBhvr>
+                                      <p:tavLst>
+                                        <p:tav tm="0">
+                                          <p:val>
+                                            <p:strVal val="ppt_y"/>
+                                          </p:val>
+                                        </p:tav>
+                                        <p:tav tm="100000">
+                                          <p:val>
+                                            <p:strVal val="ppt_y"/>
+                                          </p:val>
+                                        </p:tav>
+                                      </p:tavLst>
+                                    </p:anim>
+                                    <p:set>
+                                      <p:cBhvr>
+                                        <p:cTn id="34" dur="1" fill="hold">
+                                          <p:stCondLst>
+                                            <p:cond delay="499"/>
+                                          </p:stCondLst>
+                                        </p:cTn>
+                                        <p:tgtEl>
+                                          <p:spTgt spid="12"/>
+                                        </p:tgtEl>
+                                        <p:attrNameLst>
+                                          <p:attrName>style.visibility</p:attrName>
+                                        </p:attrNameLst>
+                                      </p:cBhvr>
+                                      <p:to>
+                                        <p:strVal val="hidden"/>
+                                      </p:to>
+                                    </p:set>
+                                  </p:childTnLst>
+                                </p:cTn>
+                              </p:par>
+                              <p:par>
+                                <p:cTn id="35" presetID="2" presetClass="entr" presetSubtype="8" fill="hold" nodeType="withEffect">
+                                  <p:stCondLst>
+                                    <p:cond delay="0"/>
+                                  </p:stCondLst>
+                                  <p:childTnLst>
+                                    <p:set>
+                                      <p:cBhvr>
+                                        <p:cTn id="36" dur="1" fill="hold">
+                                          <p:stCondLst>
+                                            <p:cond delay="0"/>
+                                          </p:stCondLst>
+                                        </p:cTn>
+                                        <p:tgtEl>
+                                          <p:spTgt spid="13"/>
+                                        </p:tgtEl>
+                                        <p:attrNameLst>
+                                          <p:attrName>style.visibility</p:attrName>
+                                        </p:attrNameLst>
+                                      </p:cBhvr>
+                                      <p:to>
+                                        <p:strVal val="visible"/>
+                                      </p:to>
+                                    </p:set>
+                                    <p:anim calcmode="lin" valueType="num">
+                                      <p:cBhvr additive="base">
+                                        <p:cTn id="37" dur="1000" fill="hold"/>
+                                        <p:tgtEl>
+                                          <p:spTgt spid="13"/>
+                                        </p:tgtEl>
+                                        <p:attrNameLst>
+                                          <p:attrName>ppt_x</p:attrName>
+                                        </p:attrNameLst>
+                                      </p:cBhvr>
+                                      <p:tavLst>
+                                        <p:tav tm="0">
+                                          <p:val>
+                                            <p:strVal val="0-#ppt_w/2"/>
+                                          </p:val>
+                                        </p:tav>
+                                        <p:tav tm="100000">
+                                          <p:val>
+                                            <p:strVal val="#ppt_x"/>
+                                          </p:val>
+                                        </p:tav>
+                                      </p:tavLst>
+                                    </p:anim>
+                                    <p:anim calcmode="lin" valueType="num">
+                                      <p:cBhvr additive="base">
+                                        <p:cTn id="38" dur="1000" fill="hold"/>
+                                        <p:tgtEl>
+                                          <p:spTgt spid="13"/>
+                                        </p:tgtEl>
+                                        <p:attrNameLst>
+                                          <p:attrName>ppt_y</p:attrName>
+                                        </p:attrNameLst>
+                                      </p:cBhvr>
+                                      <p:tavLst>
+                                        <p:tav tm="0">
+                                          <p:val>
+                                            <p:strVal val="#ppt_y"/>
+                                          </p:val>
+                                        </p:tav>
+                                        <p:tav tm="100000">
+                                          <p:val>
+                                            <p:strVal val="#ppt_y"/>
+                                          </p:val>
+                                        </p:tav>
+                                      </p:tavLst>
+                                    </p:anim>
+                                  </p:childTnLst>
+                                </p:cTn>
+                              </p:par>
+                              <p:par>
+                                <p:cTn id="39" presetID="2" presetClass="entr" presetSubtype="8" fill="hold" nodeType="withEffect">
+                                  <p:stCondLst>
+                                    <p:cond delay="500"/>
+                                  </p:stCondLst>
+                                  <p:childTnLst>
+                                    <p:set>
+                                      <p:cBhvr>
+                                        <p:cTn id="40" dur="1" fill="hold">
+                                          <p:stCondLst>
+                                            <p:cond delay="0"/>
+                                          </p:stCondLst>
+                                        </p:cTn>
+                                        <p:tgtEl>
+                                          <p:spTgt spid="14"/>
+                                        </p:tgtEl>
+                                        <p:attrNameLst>
+                                          <p:attrName>style.visibility</p:attrName>
+                                        </p:attrNameLst>
+                                      </p:cBhvr>
+                                      <p:to>
+                                        <p:strVal val="visible"/>
+                                      </p:to>
+                                    </p:set>
+                                    <p:anim calcmode="lin" valueType="num">
+                                      <p:cBhvr additive="base">
+                                        <p:cTn id="41" dur="1000" fill="hold"/>
+                                        <p:tgtEl>
+                                          <p:spTgt spid="14"/>
+                                        </p:tgtEl>
+                                        <p:attrNameLst>
+                                          <p:attrName>ppt_x</p:attrName>
+                                        </p:attrNameLst>
+                                      </p:cBhvr>
+                                      <p:tavLst>
+                                        <p:tav tm="0">
+                                          <p:val>
+                                            <p:strVal val="0-#ppt_w/2"/>
+                                          </p:val>
+                                        </p:tav>
+                                        <p:tav tm="100000">
+                                          <p:val>
+                                            <p:strVal val="#ppt_x"/>
+                                          </p:val>
+                                        </p:tav>
+                                      </p:tavLst>
+                                    </p:anim>
+                                    <p:anim calcmode="lin" valueType="num">
+                                      <p:cBhvr additive="base">
+                                        <p:cTn id="42" dur="1000" fill="hold"/>
+                                        <p:tgtEl>
+                                          <p:spTgt spid="14"/>
+                                        </p:tgtEl>
+                                        <p:attrNameLst>
+                                          <p:attrName>ppt_y</p:attrName>
+                                        </p:attrNameLst>
+                                      </p:cBhvr>
+                                      <p:tavLst>
+                                        <p:tav tm="0">
+                                          <p:val>
+                                            <p:strVal val="#ppt_y"/>
+                                          </p:val>
+                                        </p:tav>
+                                        <p:tav tm="100000">
+                                          <p:val>
+                                            <p:strVal val="#ppt_y"/>
+                                          </p:val>
+                                        </p:tav>
+                                      </p:tavLst>
+                                    </p:anim>
+                                  </p:childTnLst>
+                                </p:cTn>
+                              </p:par>
+                            </p:childTnLst>
+                          </p:cTn>
+                        </p:par>
+                      </p:childTnLst>
+                    </p:cTn>
+                  </p:par>
+                </p:childTnLst>
+              </p:cTn>
+              <p:prevCondLst>
+                <p:cond evt="onPrev" delay="0">
+                  <p:tgtEl>
+                    <p:sldTgt/>
+                  </p:tgtEl>
+                </p:cond>
+              </p:prevCondLst>
+              <p:nextCondLst>
+                <p:cond evt="onNext" delay="0">
+                  <p:tgtEl>
+                    <p:sldTgt/>
+                  </p:tgtEl>
+                </p:cond>
+              </p:nextCondLst>
+            </p:seq>
+          </p:childTnLst>
+        </p:cTn>
       </p:par>
     </p:tnLst>
   </p:timing>
@@ -5850,30 +6684,6 @@
           </a:p>
         </p:txBody>
       </p:sp>
-      <p:pic>
-        <p:nvPicPr>
-          <p:cNvPr id="9" name="Image 8" descr="paramLoopXML.png"/>
-          <p:cNvPicPr>
-            <a:picLocks noChangeAspect="1"/>
-          </p:cNvPicPr>
-          <p:nvPr/>
-        </p:nvPicPr>
-        <p:blipFill>
-          <a:blip r:embed="rId2" cstate="print"/>
-          <a:stretch>
-            <a:fillRect/>
-          </a:stretch>
-        </p:blipFill>
-        <p:spPr>
-          <a:xfrm>
-            <a:off x="3635896" y="1844824"/>
-            <a:ext cx="3543795" cy="4067743"/>
-          </a:xfrm>
-          <a:prstGeom prst="rect">
-            <a:avLst/>
-          </a:prstGeom>
-        </p:spPr>
-      </p:pic>
       <p:graphicFrame>
         <p:nvGraphicFramePr>
           <p:cNvPr id="10" name="Tableau 9"/>
@@ -5963,6 +6773,109 @@
           </a:graphicData>
         </a:graphic>
       </p:graphicFrame>
+      <p:pic>
+        <p:nvPicPr>
+          <p:cNvPr id="2" name="Image 1"/>
+          <p:cNvPicPr>
+            <a:picLocks noChangeAspect="1"/>
+          </p:cNvPicPr>
+          <p:nvPr/>
+        </p:nvPicPr>
+        <p:blipFill>
+          <a:blip r:embed="rId2">
+            <a:extLst>
+              <a:ext uri="{28A0092B-C50C-407E-A947-70E740481C1C}">
+                <a14:useLocalDpi xmlns:a14="http://schemas.microsoft.com/office/drawing/2010/main" val="0"/>
+              </a:ext>
+            </a:extLst>
+          </a:blip>
+          <a:stretch>
+            <a:fillRect/>
+          </a:stretch>
+        </p:blipFill>
+        <p:spPr>
+          <a:xfrm>
+            <a:off x="2411760" y="1798504"/>
+            <a:ext cx="3015078" cy="4143672"/>
+          </a:xfrm>
+          <a:prstGeom prst="rect">
+            <a:avLst/>
+          </a:prstGeom>
+        </p:spPr>
+      </p:pic>
+      <p:sp>
+        <p:nvSpPr>
+          <p:cNvPr id="3" name="ZoneTexte 2"/>
+          <p:cNvSpPr txBox="1"/>
+          <p:nvPr/>
+        </p:nvSpPr>
+        <p:spPr>
+          <a:xfrm>
+            <a:off x="5652120" y="2746955"/>
+            <a:ext cx="3491880" cy="2246769"/>
+          </a:xfrm>
+          <a:prstGeom prst="rect">
+            <a:avLst/>
+          </a:prstGeom>
+          <a:noFill/>
+        </p:spPr>
+        <p:txBody>
+          <a:bodyPr wrap="square" rtlCol="0">
+            <a:spAutoFit/>
+          </a:bodyPr>
+          <a:lstStyle/>
+          <a:p>
+            <a:pPr marL="457200" indent="-457200">
+              <a:buFont typeface="Arial" pitchFamily="34" charset="0"/>
+              <a:buChar char="•"/>
+            </a:pPr>
+            <a:r>
+              <a:rPr lang="fr-FR" sz="2800" dirty="0" smtClean="0">
+                <a:solidFill>
+                  <a:schemeClr val="tx2">
+                    <a:lumMod val="75000"/>
+                  </a:schemeClr>
+                </a:solidFill>
+              </a:rPr>
+              <a:t>Permet l’échange </a:t>
+            </a:r>
+            <a:r>
+              <a:rPr lang="fr-FR" sz="2800" smtClean="0">
+                <a:solidFill>
+                  <a:schemeClr val="tx2">
+                    <a:lumMod val="75000"/>
+                  </a:schemeClr>
+                </a:solidFill>
+              </a:rPr>
+              <a:t>de boucles</a:t>
+            </a:r>
+            <a:endParaRPr lang="fr-FR" sz="2800" dirty="0" smtClean="0">
+              <a:solidFill>
+                <a:schemeClr val="tx2">
+                  <a:lumMod val="75000"/>
+                </a:schemeClr>
+              </a:solidFill>
+            </a:endParaRPr>
+          </a:p>
+          <a:p>
+            <a:pPr marL="457200" indent="-457200">
+              <a:buFont typeface="Arial" pitchFamily="34" charset="0"/>
+              <a:buChar char="•"/>
+            </a:pPr>
+            <a:r>
+              <a:rPr lang="fr-FR" sz="2800" dirty="0" smtClean="0">
+                <a:solidFill>
+                  <a:schemeClr val="tx2">
+                    <a:lumMod val="75000"/>
+                  </a:schemeClr>
+                </a:solidFill>
+              </a:rPr>
+              <a:t>Plusieurs boucles pour une seule chanson</a:t>
+            </a:r>
+            <a:endParaRPr lang="fr-FR" dirty="0"/>
+          </a:p>
+        </p:txBody>
+      </p:sp>
     </p:spTree>
   </p:cSld>
   <p:clrMapOvr>
@@ -5974,9 +6887,202 @@
   <p:timing>
     <p:tnLst>
       <p:par>
-        <p:cTn id="1" dur="indefinite" restart="never" nodeType="tmRoot"/>
+        <p:cTn id="1" dur="indefinite" restart="never" nodeType="tmRoot">
+          <p:childTnLst>
+            <p:seq concurrent="1" nextAc="seek">
+              <p:cTn id="2" dur="indefinite" nodeType="mainSeq">
+                <p:childTnLst>
+                  <p:par>
+                    <p:cTn id="3" fill="hold">
+                      <p:stCondLst>
+                        <p:cond delay="indefinite"/>
+                        <p:cond evt="onBegin" delay="0">
+                          <p:tn val="2"/>
+                        </p:cond>
+                      </p:stCondLst>
+                      <p:childTnLst>
+                        <p:par>
+                          <p:cTn id="4" fill="hold">
+                            <p:stCondLst>
+                              <p:cond delay="0"/>
+                            </p:stCondLst>
+                            <p:childTnLst>
+                              <p:par>
+                                <p:cTn id="5" presetID="2" presetClass="entr" presetSubtype="8" fill="hold" nodeType="withEffect">
+                                  <p:stCondLst>
+                                    <p:cond delay="0"/>
+                                  </p:stCondLst>
+                                  <p:childTnLst>
+                                    <p:set>
+                                      <p:cBhvr>
+                                        <p:cTn id="6" dur="1" fill="hold">
+                                          <p:stCondLst>
+                                            <p:cond delay="0"/>
+                                          </p:stCondLst>
+                                        </p:cTn>
+                                        <p:tgtEl>
+                                          <p:spTgt spid="2"/>
+                                        </p:tgtEl>
+                                        <p:attrNameLst>
+                                          <p:attrName>style.visibility</p:attrName>
+                                        </p:attrNameLst>
+                                      </p:cBhvr>
+                                      <p:to>
+                                        <p:strVal val="visible"/>
+                                      </p:to>
+                                    </p:set>
+                                    <p:anim calcmode="lin" valueType="num">
+                                      <p:cBhvr additive="base">
+                                        <p:cTn id="7" dur="1000" fill="hold"/>
+                                        <p:tgtEl>
+                                          <p:spTgt spid="2"/>
+                                        </p:tgtEl>
+                                        <p:attrNameLst>
+                                          <p:attrName>ppt_x</p:attrName>
+                                        </p:attrNameLst>
+                                      </p:cBhvr>
+                                      <p:tavLst>
+                                        <p:tav tm="0">
+                                          <p:val>
+                                            <p:strVal val="0-#ppt_w/2"/>
+                                          </p:val>
+                                        </p:tav>
+                                        <p:tav tm="100000">
+                                          <p:val>
+                                            <p:strVal val="#ppt_x"/>
+                                          </p:val>
+                                        </p:tav>
+                                      </p:tavLst>
+                                    </p:anim>
+                                    <p:anim calcmode="lin" valueType="num">
+                                      <p:cBhvr additive="base">
+                                        <p:cTn id="8" dur="1000" fill="hold"/>
+                                        <p:tgtEl>
+                                          <p:spTgt spid="2"/>
+                                        </p:tgtEl>
+                                        <p:attrNameLst>
+                                          <p:attrName>ppt_y</p:attrName>
+                                        </p:attrNameLst>
+                                      </p:cBhvr>
+                                      <p:tavLst>
+                                        <p:tav tm="0">
+                                          <p:val>
+                                            <p:strVal val="#ppt_y"/>
+                                          </p:val>
+                                        </p:tav>
+                                        <p:tav tm="100000">
+                                          <p:val>
+                                            <p:strVal val="#ppt_y"/>
+                                          </p:val>
+                                        </p:tav>
+                                      </p:tavLst>
+                                    </p:anim>
+                                  </p:childTnLst>
+                                </p:cTn>
+                              </p:par>
+                              <p:par>
+                                <p:cTn id="9" presetID="2" presetClass="entr" presetSubtype="2" fill="hold" grpId="0" nodeType="withEffect">
+                                  <p:stCondLst>
+                                    <p:cond delay="0"/>
+                                  </p:stCondLst>
+                                  <p:childTnLst>
+                                    <p:set>
+                                      <p:cBhvr>
+                                        <p:cTn id="10" dur="1" fill="hold">
+                                          <p:stCondLst>
+                                            <p:cond delay="0"/>
+                                          </p:stCondLst>
+                                        </p:cTn>
+                                        <p:tgtEl>
+                                          <p:spTgt spid="3"/>
+                                        </p:tgtEl>
+                                        <p:attrNameLst>
+                                          <p:attrName>style.visibility</p:attrName>
+                                        </p:attrNameLst>
+                                      </p:cBhvr>
+                                      <p:to>
+                                        <p:strVal val="visible"/>
+                                      </p:to>
+                                    </p:set>
+                                    <p:anim calcmode="lin" valueType="num">
+                                      <p:cBhvr additive="base">
+                                        <p:cTn id="11" dur="1000" fill="hold"/>
+                                        <p:tgtEl>
+                                          <p:spTgt spid="3"/>
+                                        </p:tgtEl>
+                                        <p:attrNameLst>
+                                          <p:attrName>ppt_x</p:attrName>
+                                        </p:attrNameLst>
+                                      </p:cBhvr>
+                                      <p:tavLst>
+                                        <p:tav tm="0">
+                                          <p:val>
+                                            <p:strVal val="1+#ppt_w/2"/>
+                                          </p:val>
+                                        </p:tav>
+                                        <p:tav tm="100000">
+                                          <p:val>
+                                            <p:strVal val="#ppt_x"/>
+                                          </p:val>
+                                        </p:tav>
+                                      </p:tavLst>
+                                    </p:anim>
+                                    <p:anim calcmode="lin" valueType="num">
+                                      <p:cBhvr additive="base">
+                                        <p:cTn id="12" dur="1000" fill="hold"/>
+                                        <p:tgtEl>
+                                          <p:spTgt spid="3"/>
+                                        </p:tgtEl>
+                                        <p:attrNameLst>
+                                          <p:attrName>ppt_y</p:attrName>
+                                        </p:attrNameLst>
+                                      </p:cBhvr>
+                                      <p:tavLst>
+                                        <p:tav tm="0">
+                                          <p:val>
+                                            <p:strVal val="#ppt_y"/>
+                                          </p:val>
+                                        </p:tav>
+                                        <p:tav tm="100000">
+                                          <p:val>
+                                            <p:strVal val="#ppt_y"/>
+                                          </p:val>
+                                        </p:tav>
+                                      </p:tavLst>
+                                    </p:anim>
+                                  </p:childTnLst>
+                                </p:cTn>
+                              </p:par>
+                            </p:childTnLst>
+                          </p:cTn>
+                        </p:par>
+                      </p:childTnLst>
+                    </p:cTn>
+                  </p:par>
+                </p:childTnLst>
+              </p:cTn>
+              <p:prevCondLst>
+                <p:cond evt="onPrev" delay="0">
+                  <p:tgtEl>
+                    <p:sldTgt/>
+                  </p:tgtEl>
+                </p:cond>
+              </p:prevCondLst>
+              <p:nextCondLst>
+                <p:cond evt="onNext" delay="0">
+                  <p:tgtEl>
+                    <p:sldTgt/>
+                  </p:tgtEl>
+                </p:cond>
+              </p:nextCondLst>
+            </p:seq>
+          </p:childTnLst>
+        </p:cTn>
       </p:par>
     </p:tnLst>
+    <p:bldLst>
+      <p:bldP spid="3" grpId="0"/>
+    </p:bldLst>
   </p:timing>
 </p:sld>
 </file>
@@ -6384,7 +7490,7 @@
           <a:blip r:embed="rId2" cstate="print">
             <a:extLst>
               <a:ext uri="{28A0092B-C50C-407E-A947-70E740481C1C}">
-                <a14:useLocalDpi xmlns:a14="http://schemas.microsoft.com/office/drawing/2010/main" xmlns="" val="0"/>
+                <a14:useLocalDpi xmlns:a14="http://schemas.microsoft.com/office/drawing/2010/main" val="0"/>
               </a:ext>
             </a:extLst>
           </a:blip>
@@ -6404,7 +7510,7 @@
           <a:noFill/>
           <a:extLst>
             <a:ext uri="{909E8E84-426E-40DD-AFC4-6F175D3DCCD1}">
-              <a14:hiddenFill xmlns:a14="http://schemas.microsoft.com/office/drawing/2010/main" xmlns="">
+              <a14:hiddenFill xmlns:a14="http://schemas.microsoft.com/office/drawing/2010/main">
                 <a:solidFill>
                   <a:srgbClr val="FFFFFF"/>
                 </a:solidFill>
@@ -15801,7 +16907,7 @@
                                           <p:attrName>ppt_y</p:attrName>
                                         </p:attrNameLst>
                                       </p:cBhvr>
-                                      <p:rCtr x="100" y="-3"/>
+                                      <p:rCtr x="10000" y="-300"/>
                                     </p:animMotion>
                                   </p:childTnLst>
                                 </p:cTn>

</xml_diff>

<commit_message>
Maj - PPT - Image PPT
</commit_message>
<xml_diff>
--- a/AAP/docs/Presentation.pptx
+++ b/AAP/docs/Presentation.pptx
@@ -287,7 +287,7 @@
     </p:spTree>
     <p:extLst>
       <p:ext uri="{BB962C8B-B14F-4D97-AF65-F5344CB8AC3E}">
-        <p14:creationId xmlns:p14="http://schemas.microsoft.com/office/powerpoint/2010/main" xmlns="" val="2207784617"/>
+        <p14:creationId xmlns:p14="http://schemas.microsoft.com/office/powerpoint/2010/main" val="2207784617"/>
       </p:ext>
     </p:extLst>
   </p:cSld>
@@ -549,7 +549,7 @@
     </p:spTree>
     <p:extLst>
       <p:ext uri="{BB962C8B-B14F-4D97-AF65-F5344CB8AC3E}">
-        <p14:creationId xmlns:p14="http://schemas.microsoft.com/office/powerpoint/2010/main" xmlns="" val="2884352748"/>
+        <p14:creationId xmlns:p14="http://schemas.microsoft.com/office/powerpoint/2010/main" val="2884352748"/>
       </p:ext>
     </p:extLst>
   </p:cSld>
@@ -5512,7 +5512,7 @@
           <a:blip r:embed="rId2" cstate="print">
             <a:extLst>
               <a:ext uri="{28A0092B-C50C-407E-A947-70E740481C1C}">
-                <a14:useLocalDpi xmlns:a14="http://schemas.microsoft.com/office/drawing/2010/main" xmlns="" val="0"/>
+                <a14:useLocalDpi xmlns:a14="http://schemas.microsoft.com/office/drawing/2010/main" val="0"/>
               </a:ext>
             </a:extLst>
           </a:blip>
@@ -5542,7 +5542,7 @@
           <a:blip r:embed="rId3" cstate="print">
             <a:extLst>
               <a:ext uri="{28A0092B-C50C-407E-A947-70E740481C1C}">
-                <a14:useLocalDpi xmlns:a14="http://schemas.microsoft.com/office/drawing/2010/main" xmlns="" val="0"/>
+                <a14:useLocalDpi xmlns:a14="http://schemas.microsoft.com/office/drawing/2010/main" val="0"/>
               </a:ext>
             </a:extLst>
           </a:blip>
@@ -5572,7 +5572,7 @@
           <a:blip r:embed="rId4" cstate="print">
             <a:extLst>
               <a:ext uri="{28A0092B-C50C-407E-A947-70E740481C1C}">
-                <a14:useLocalDpi xmlns:a14="http://schemas.microsoft.com/office/drawing/2010/main" xmlns="" val="0"/>
+                <a14:useLocalDpi xmlns:a14="http://schemas.microsoft.com/office/drawing/2010/main" val="0"/>
               </a:ext>
             </a:extLst>
           </a:blip>
@@ -5602,7 +5602,7 @@
           <a:blip r:embed="rId5" cstate="print">
             <a:extLst>
               <a:ext uri="{28A0092B-C50C-407E-A947-70E740481C1C}">
-                <a14:useLocalDpi xmlns:a14="http://schemas.microsoft.com/office/drawing/2010/main" xmlns="" val="0"/>
+                <a14:useLocalDpi xmlns:a14="http://schemas.microsoft.com/office/drawing/2010/main" val="0"/>
               </a:ext>
             </a:extLst>
           </a:blip>
@@ -5632,7 +5632,7 @@
           <a:blip r:embed="rId6" cstate="print">
             <a:extLst>
               <a:ext uri="{28A0092B-C50C-407E-A947-70E740481C1C}">
-                <a14:useLocalDpi xmlns:a14="http://schemas.microsoft.com/office/drawing/2010/main" xmlns="" val="0"/>
+                <a14:useLocalDpi xmlns:a14="http://schemas.microsoft.com/office/drawing/2010/main" val="0"/>
               </a:ext>
             </a:extLst>
           </a:blip>
@@ -5642,8 +5642,8 @@
         </p:blipFill>
         <p:spPr>
           <a:xfrm>
-            <a:off x="4862195" y="4293096"/>
-            <a:ext cx="1761900" cy="1991025"/>
+            <a:off x="4716016" y="4373149"/>
+            <a:ext cx="1529314" cy="1533440"/>
           </a:xfrm>
           <a:prstGeom prst="rect">
             <a:avLst/>
@@ -6785,7 +6785,7 @@
           <a:blip r:embed="rId2" cstate="print">
             <a:extLst>
               <a:ext uri="{28A0092B-C50C-407E-A947-70E740481C1C}">
-                <a14:useLocalDpi xmlns:a14="http://schemas.microsoft.com/office/drawing/2010/main" xmlns="" val="0"/>
+                <a14:useLocalDpi xmlns:a14="http://schemas.microsoft.com/office/drawing/2010/main" val="0"/>
               </a:ext>
             </a:extLst>
           </a:blip>
@@ -6837,25 +6837,28 @@
                   </a:schemeClr>
                 </a:solidFill>
               </a:rPr>
-              <a:t>Permet l’échange </a:t>
-            </a:r>
-            <a:r>
-              <a:rPr lang="fr-FR" sz="2800" smtClean="0">
+              <a:t>Permet </a:t>
+            </a:r>
+            <a:r>
+              <a:rPr lang="fr-FR" sz="2800" dirty="0" smtClean="0">
                 <a:solidFill>
                   <a:schemeClr val="tx2">
                     <a:lumMod val="75000"/>
                   </a:schemeClr>
                 </a:solidFill>
               </a:rPr>
+              <a:t>l’export </a:t>
+            </a:r>
+            <a:r>
+              <a:rPr lang="fr-FR" sz="2800" dirty="0" smtClean="0">
+                <a:solidFill>
+                  <a:schemeClr val="tx2">
+                    <a:lumMod val="75000"/>
+                  </a:schemeClr>
+                </a:solidFill>
+              </a:rPr>
               <a:t>de boucles</a:t>
             </a:r>
-            <a:endParaRPr lang="fr-FR" sz="2800" dirty="0" smtClean="0">
-              <a:solidFill>
-                <a:schemeClr val="tx2">
-                  <a:lumMod val="75000"/>
-                </a:schemeClr>
-              </a:solidFill>
-            </a:endParaRPr>
           </a:p>
           <a:p>
             <a:pPr marL="457200" indent="-457200">
@@ -7490,7 +7493,7 @@
           <a:blip r:embed="rId2" cstate="print">
             <a:extLst>
               <a:ext uri="{28A0092B-C50C-407E-A947-70E740481C1C}">
-                <a14:useLocalDpi xmlns:a14="http://schemas.microsoft.com/office/drawing/2010/main" xmlns="" val="0"/>
+                <a14:useLocalDpi xmlns:a14="http://schemas.microsoft.com/office/drawing/2010/main" val="0"/>
               </a:ext>
             </a:extLst>
           </a:blip>
@@ -7510,7 +7513,7 @@
           <a:noFill/>
           <a:extLst>
             <a:ext uri="{909E8E84-426E-40DD-AFC4-6F175D3DCCD1}">
-              <a14:hiddenFill xmlns:a14="http://schemas.microsoft.com/office/drawing/2010/main" xmlns="">
+              <a14:hiddenFill xmlns:a14="http://schemas.microsoft.com/office/drawing/2010/main">
                 <a:solidFill>
                   <a:srgbClr val="FFFFFF"/>
                 </a:solidFill>

</xml_diff>